<commit_message>
Added global findings slide
</commit_message>
<xml_diff>
--- a/P2 – Group 1.pptx
+++ b/P2 – Group 1.pptx
@@ -21,6 +21,7 @@
     <p:sldId id="271" r:id="rId15"/>
     <p:sldId id="272" r:id="rId16"/>
     <p:sldId id="273" r:id="rId17"/>
+    <p:sldId id="274" r:id="rId18"/>
   </p:sldIdLst>
   <p:sldSz cx="12192000" cy="6858000"/>
   <p:notesSz cx="6858000" cy="9144000"/>
@@ -2668,6 +2669,13 @@
         </dgm:presLayoutVars>
       </dgm:prSet>
       <dgm:spPr/>
+      <dgm:t>
+        <a:bodyPr/>
+        <a:lstStyle/>
+        <a:p>
+          <a:endParaRPr lang="en-US"/>
+        </a:p>
+      </dgm:t>
     </dgm:pt>
     <dgm:pt modelId="{27946E24-3D78-4E16-8A3F-0E588799684C}" type="pres">
       <dgm:prSet presAssocID="{F85B9CD4-BAD3-4FE9-B63F-B79D3E877CFA}" presName="compNode" presStyleCnt="0"/>
@@ -2683,7 +2691,7 @@
                 <a14:useLocalDpi xmlns:a14="http://schemas.microsoft.com/office/drawing/2010/main" val="0"/>
               </a:ext>
               <a:ext uri="{96DAC541-7B7A-43D3-8B79-37D633B846F1}">
-                <asvg:svgBlip xmlns:asvg="http://schemas.microsoft.com/office/drawing/2016/SVG/main" r:embed="rId2"/>
+                <asvg:svgBlip xmlns:asvg="http://schemas.microsoft.com/office/drawing/2016/SVG/main" xmlns="" r:embed="rId2"/>
               </a:ext>
             </a:extLst>
           </a:blip>
@@ -2713,6 +2721,13 @@
         </dgm:presLayoutVars>
       </dgm:prSet>
       <dgm:spPr/>
+      <dgm:t>
+        <a:bodyPr/>
+        <a:lstStyle/>
+        <a:p>
+          <a:endParaRPr lang="en-US"/>
+        </a:p>
+      </dgm:t>
     </dgm:pt>
     <dgm:pt modelId="{86961A20-E4DD-4DB4-A65B-97E54510296B}" type="pres">
       <dgm:prSet presAssocID="{D86A2033-0D40-47F7-928B-D8D23396BCEA}" presName="sibTrans" presStyleCnt="0"/>
@@ -2732,7 +2747,7 @@
                 <a14:useLocalDpi xmlns:a14="http://schemas.microsoft.com/office/drawing/2010/main" val="0"/>
               </a:ext>
               <a:ext uri="{96DAC541-7B7A-43D3-8B79-37D633B846F1}">
-                <asvg:svgBlip xmlns:asvg="http://schemas.microsoft.com/office/drawing/2016/SVG/main" r:embed="rId4"/>
+                <asvg:svgBlip xmlns:asvg="http://schemas.microsoft.com/office/drawing/2016/SVG/main" xmlns="" r:embed="rId4"/>
               </a:ext>
             </a:extLst>
           </a:blip>
@@ -2762,14 +2777,21 @@
         </dgm:presLayoutVars>
       </dgm:prSet>
       <dgm:spPr/>
+      <dgm:t>
+        <a:bodyPr/>
+        <a:lstStyle/>
+        <a:p>
+          <a:endParaRPr lang="en-US"/>
+        </a:p>
+      </dgm:t>
     </dgm:pt>
   </dgm:ptLst>
   <dgm:cxnLst>
-    <dgm:cxn modelId="{EADE463F-067A-4C5E-A4B8-CDD2B7F9D0EC}" srcId="{0AA7EE45-48AE-46E3-A6D8-7BCC5D267D74}" destId="{F85B9CD4-BAD3-4FE9-B63F-B79D3E877CFA}" srcOrd="0" destOrd="0" parTransId="{47C639D7-B316-4CA0-99E4-62F741AD95BA}" sibTransId="{D86A2033-0D40-47F7-928B-D8D23396BCEA}"/>
-    <dgm:cxn modelId="{BBC11040-14C2-473E-A45C-22B74E6A5AF6}" type="presOf" srcId="{F85B9CD4-BAD3-4FE9-B63F-B79D3E877CFA}" destId="{AD2AAF4D-F665-4F5B-860B-F9AA097AA5D3}" srcOrd="0" destOrd="0" presId="urn:microsoft.com/office/officeart/2018/2/layout/IconLabelList"/>
-    <dgm:cxn modelId="{28708452-1EC8-4962-AFA3-6B37DF8B21EB}" srcId="{0AA7EE45-48AE-46E3-A6D8-7BCC5D267D74}" destId="{BF902134-CFF8-4D53-BCC6-C5A754F0CC7B}" srcOrd="1" destOrd="0" parTransId="{FCEDF328-B1F1-4CB6-8EEF-16424BE0A08B}" sibTransId="{9CD61A03-D8BD-4DF6-817E-159190E7CC0B}"/>
     <dgm:cxn modelId="{D1DD8EAA-5A48-49FC-9DB2-8D3CF0DF0080}" type="presOf" srcId="{0AA7EE45-48AE-46E3-A6D8-7BCC5D267D74}" destId="{997B5C68-4019-432A-B572-60735DF2DD16}" srcOrd="0" destOrd="0" presId="urn:microsoft.com/office/officeart/2018/2/layout/IconLabelList"/>
     <dgm:cxn modelId="{D40274EE-3933-4240-B607-541A8FA64657}" type="presOf" srcId="{BF902134-CFF8-4D53-BCC6-C5A754F0CC7B}" destId="{F50B3B7B-6947-433E-8622-18F49B3CE7A1}" srcOrd="0" destOrd="0" presId="urn:microsoft.com/office/officeart/2018/2/layout/IconLabelList"/>
+    <dgm:cxn modelId="{28708452-1EC8-4962-AFA3-6B37DF8B21EB}" srcId="{0AA7EE45-48AE-46E3-A6D8-7BCC5D267D74}" destId="{BF902134-CFF8-4D53-BCC6-C5A754F0CC7B}" srcOrd="1" destOrd="0" parTransId="{FCEDF328-B1F1-4CB6-8EEF-16424BE0A08B}" sibTransId="{9CD61A03-D8BD-4DF6-817E-159190E7CC0B}"/>
+    <dgm:cxn modelId="{BBC11040-14C2-473E-A45C-22B74E6A5AF6}" type="presOf" srcId="{F85B9CD4-BAD3-4FE9-B63F-B79D3E877CFA}" destId="{AD2AAF4D-F665-4F5B-860B-F9AA097AA5D3}" srcOrd="0" destOrd="0" presId="urn:microsoft.com/office/officeart/2018/2/layout/IconLabelList"/>
+    <dgm:cxn modelId="{EADE463F-067A-4C5E-A4B8-CDD2B7F9D0EC}" srcId="{0AA7EE45-48AE-46E3-A6D8-7BCC5D267D74}" destId="{F85B9CD4-BAD3-4FE9-B63F-B79D3E877CFA}" srcOrd="0" destOrd="0" parTransId="{47C639D7-B316-4CA0-99E4-62F741AD95BA}" sibTransId="{D86A2033-0D40-47F7-928B-D8D23396BCEA}"/>
     <dgm:cxn modelId="{FE297B6D-536D-41E0-B2A5-A1B6A30BE79E}" type="presParOf" srcId="{997B5C68-4019-432A-B572-60735DF2DD16}" destId="{27946E24-3D78-4E16-8A3F-0E588799684C}" srcOrd="0" destOrd="0" presId="urn:microsoft.com/office/officeart/2018/2/layout/IconLabelList"/>
     <dgm:cxn modelId="{C56004CE-B883-4B8E-9091-2DDED11D571A}" type="presParOf" srcId="{27946E24-3D78-4E16-8A3F-0E588799684C}" destId="{12D9E96E-8FE0-4AFE-89A1-B4DC1ED4FBF6}" srcOrd="0" destOrd="0" presId="urn:microsoft.com/office/officeart/2018/2/layout/IconLabelList"/>
     <dgm:cxn modelId="{45DADE0C-9406-4EC2-B926-8FE226332C83}" type="presParOf" srcId="{27946E24-3D78-4E16-8A3F-0E588799684C}" destId="{30C40FB2-E13D-4C6F-8CAB-093296155D6D}" srcOrd="1" destOrd="0" presId="urn:microsoft.com/office/officeart/2018/2/layout/IconLabelList"/>
@@ -3062,6 +3084,13 @@
         </dgm:presLayoutVars>
       </dgm:prSet>
       <dgm:spPr/>
+      <dgm:t>
+        <a:bodyPr/>
+        <a:lstStyle/>
+        <a:p>
+          <a:endParaRPr lang="en-US"/>
+        </a:p>
+      </dgm:t>
     </dgm:pt>
     <dgm:pt modelId="{C3F9C80B-9405-4FA7-AC3C-0C945666B357}" type="pres">
       <dgm:prSet presAssocID="{5BE8912E-F7E6-4741-AD28-CD50A0F3FE44}" presName="hierRoot1" presStyleCnt="0"/>
@@ -3082,6 +3111,13 @@
         </dgm:presLayoutVars>
       </dgm:prSet>
       <dgm:spPr/>
+      <dgm:t>
+        <a:bodyPr/>
+        <a:lstStyle/>
+        <a:p>
+          <a:endParaRPr lang="en-US"/>
+        </a:p>
+      </dgm:t>
     </dgm:pt>
     <dgm:pt modelId="{DDA209B8-4B8D-48DB-B0DB-4A3002B616EF}" type="pres">
       <dgm:prSet presAssocID="{5BE8912E-F7E6-4741-AD28-CD50A0F3FE44}" presName="hierChild2" presStyleCnt="0"/>
@@ -3106,6 +3142,13 @@
         </dgm:presLayoutVars>
       </dgm:prSet>
       <dgm:spPr/>
+      <dgm:t>
+        <a:bodyPr/>
+        <a:lstStyle/>
+        <a:p>
+          <a:endParaRPr lang="en-US"/>
+        </a:p>
+      </dgm:t>
     </dgm:pt>
     <dgm:pt modelId="{115000C5-73F8-40E9-BCE9-DB29957E48E2}" type="pres">
       <dgm:prSet presAssocID="{9643240F-2EA4-4743-B38B-E754AFDD0BD3}" presName="hierChild2" presStyleCnt="0"/>
@@ -3130,6 +3173,13 @@
         </dgm:presLayoutVars>
       </dgm:prSet>
       <dgm:spPr/>
+      <dgm:t>
+        <a:bodyPr/>
+        <a:lstStyle/>
+        <a:p>
+          <a:endParaRPr lang="en-US"/>
+        </a:p>
+      </dgm:t>
     </dgm:pt>
     <dgm:pt modelId="{4C8F14A5-660B-4735-9DDB-2DECCC98835A}" type="pres">
       <dgm:prSet presAssocID="{C1F74533-A485-40FE-A076-533BE33557CB}" presName="hierChild2" presStyleCnt="0"/>
@@ -3154,6 +3204,13 @@
         </dgm:presLayoutVars>
       </dgm:prSet>
       <dgm:spPr/>
+      <dgm:t>
+        <a:bodyPr/>
+        <a:lstStyle/>
+        <a:p>
+          <a:endParaRPr lang="en-US"/>
+        </a:p>
+      </dgm:t>
     </dgm:pt>
     <dgm:pt modelId="{1D9C4608-5EEF-4FBC-8A95-FF3C699F86C2}" type="pres">
       <dgm:prSet presAssocID="{41BC46B4-BDE9-423F-8906-3CE849E62A0F}" presName="hierChild2" presStyleCnt="0"/>
@@ -3178,6 +3235,13 @@
         </dgm:presLayoutVars>
       </dgm:prSet>
       <dgm:spPr/>
+      <dgm:t>
+        <a:bodyPr/>
+        <a:lstStyle/>
+        <a:p>
+          <a:endParaRPr lang="en-US"/>
+        </a:p>
+      </dgm:t>
     </dgm:pt>
     <dgm:pt modelId="{5BA95E23-781A-4E36-ADB8-C1F9BA13958C}" type="pres">
       <dgm:prSet presAssocID="{4ED107CA-8285-4DE2-BA66-9D4A615CAE4F}" presName="hierChild2" presStyleCnt="0"/>
@@ -3202,6 +3266,13 @@
         </dgm:presLayoutVars>
       </dgm:prSet>
       <dgm:spPr/>
+      <dgm:t>
+        <a:bodyPr/>
+        <a:lstStyle/>
+        <a:p>
+          <a:endParaRPr lang="en-US"/>
+        </a:p>
+      </dgm:t>
     </dgm:pt>
     <dgm:pt modelId="{806A4E8B-D656-4798-8DD4-4888423AE2F3}" type="pres">
       <dgm:prSet presAssocID="{CE1D68A5-D2DC-4199-8043-ECF5EEB262FC}" presName="hierChild2" presStyleCnt="0"/>
@@ -3226,6 +3297,13 @@
         </dgm:presLayoutVars>
       </dgm:prSet>
       <dgm:spPr/>
+      <dgm:t>
+        <a:bodyPr/>
+        <a:lstStyle/>
+        <a:p>
+          <a:endParaRPr lang="en-US"/>
+        </a:p>
+      </dgm:t>
     </dgm:pt>
     <dgm:pt modelId="{22FC7D11-3F2A-4705-A1A1-E6EF365B9572}" type="pres">
       <dgm:prSet presAssocID="{FBFBE81D-1280-43A7-B0EE-8A75D5885A47}" presName="hierChild2" presStyleCnt="0"/>
@@ -3233,21 +3311,21 @@
     </dgm:pt>
   </dgm:ptLst>
   <dgm:cxnLst>
+    <dgm:cxn modelId="{483147DE-DF2D-4383-8A0D-B5AB9931B73A}" srcId="{30B61FC0-6916-4B93-8E53-5797D7790B59}" destId="{5BE8912E-F7E6-4741-AD28-CD50A0F3FE44}" srcOrd="0" destOrd="0" parTransId="{C8FEA318-3924-4899-A2E8-A1364F402575}" sibTransId="{FD83C4B1-223B-442A-83EB-DDC69F7A4E5B}"/>
+    <dgm:cxn modelId="{00D20F50-7921-45E2-9DE9-6A4258565866}" srcId="{30B61FC0-6916-4B93-8E53-5797D7790B59}" destId="{FBFBE81D-1280-43A7-B0EE-8A75D5885A47}" srcOrd="6" destOrd="0" parTransId="{A8F460DF-102C-4A4D-92E8-31EEBB42F5C4}" sibTransId="{69E80C92-3388-4BA2-B497-94BD00BA6F66}"/>
+    <dgm:cxn modelId="{8C0D4711-41B6-4BC9-BB47-093CD28C31C3}" type="presOf" srcId="{41BC46B4-BDE9-423F-8906-3CE849E62A0F}" destId="{71EA9CD4-3EDF-4CF5-8F59-27BEC082950C}" srcOrd="0" destOrd="0" presId="urn:microsoft.com/office/officeart/2005/8/layout/hierarchy1"/>
+    <dgm:cxn modelId="{089E2499-DB10-405D-9227-4F77C30DBA24}" type="presOf" srcId="{5BE8912E-F7E6-4741-AD28-CD50A0F3FE44}" destId="{AD6B6B89-1ECF-453F-912B-B1A6F8AE1265}" srcOrd="0" destOrd="0" presId="urn:microsoft.com/office/officeart/2005/8/layout/hierarchy1"/>
+    <dgm:cxn modelId="{BBE23D94-9B13-4F60-91AE-5DE796C02FB3}" type="presOf" srcId="{CE1D68A5-D2DC-4199-8043-ECF5EEB262FC}" destId="{1C8B9953-92A0-46D4-BAC8-CA7F10B55BD1}" srcOrd="0" destOrd="0" presId="urn:microsoft.com/office/officeart/2005/8/layout/hierarchy1"/>
     <dgm:cxn modelId="{6A908209-7FE8-4A30-BC52-E18F9CF5C69D}" srcId="{30B61FC0-6916-4B93-8E53-5797D7790B59}" destId="{4ED107CA-8285-4DE2-BA66-9D4A615CAE4F}" srcOrd="4" destOrd="0" parTransId="{29C70813-4109-40A4-B8E5-DFE6BAD972B1}" sibTransId="{8D06C245-CC47-497B-A521-361C950D2E29}"/>
-    <dgm:cxn modelId="{8C0D4711-41B6-4BC9-BB47-093CD28C31C3}" type="presOf" srcId="{41BC46B4-BDE9-423F-8906-3CE849E62A0F}" destId="{71EA9CD4-3EDF-4CF5-8F59-27BEC082950C}" srcOrd="0" destOrd="0" presId="urn:microsoft.com/office/officeart/2005/8/layout/hierarchy1"/>
+    <dgm:cxn modelId="{A2A3F5D4-33E5-49FD-91E9-B0DDFF19CE73}" type="presOf" srcId="{FBFBE81D-1280-43A7-B0EE-8A75D5885A47}" destId="{FB858AB2-ECF6-4E44-B50D-C334C8F0A141}" srcOrd="0" destOrd="0" presId="urn:microsoft.com/office/officeart/2005/8/layout/hierarchy1"/>
     <dgm:cxn modelId="{E277FA2B-0CED-46B1-9A2D-65359A4CF684}" type="presOf" srcId="{9643240F-2EA4-4743-B38B-E754AFDD0BD3}" destId="{8275085D-A526-4531-A609-26C3A8D97E3D}" srcOrd="0" destOrd="0" presId="urn:microsoft.com/office/officeart/2005/8/layout/hierarchy1"/>
+    <dgm:cxn modelId="{93FCFB8A-D450-46EB-BD80-A7A04FCBEE13}" type="presOf" srcId="{4ED107CA-8285-4DE2-BA66-9D4A615CAE4F}" destId="{B88B3516-6B79-470F-B106-1B0BC6A30CC1}" srcOrd="0" destOrd="0" presId="urn:microsoft.com/office/officeart/2005/8/layout/hierarchy1"/>
+    <dgm:cxn modelId="{2BBC37EB-894B-421D-BF1D-7B6EB2EB8CC1}" srcId="{30B61FC0-6916-4B93-8E53-5797D7790B59}" destId="{9643240F-2EA4-4743-B38B-E754AFDD0BD3}" srcOrd="1" destOrd="0" parTransId="{060E55F1-7310-48FE-B31E-3480C6222EF8}" sibTransId="{9AD560D0-78DA-4521-AEB5-47F0E29F5FBC}"/>
     <dgm:cxn modelId="{53B8304B-C520-4C50-BC51-D954F126CCF7}" srcId="{30B61FC0-6916-4B93-8E53-5797D7790B59}" destId="{C1F74533-A485-40FE-A076-533BE33557CB}" srcOrd="2" destOrd="0" parTransId="{6A54022B-2CDF-4FDD-B3BF-884E4F64FEF6}" sibTransId="{9D8044DC-19E6-4BD8-A466-4E120D6CFD8A}"/>
+    <dgm:cxn modelId="{7A05F9DB-AA3D-4501-B484-569E80199AFF}" srcId="{30B61FC0-6916-4B93-8E53-5797D7790B59}" destId="{41BC46B4-BDE9-423F-8906-3CE849E62A0F}" srcOrd="3" destOrd="0" parTransId="{3DB32D63-50B1-4A40-BC8F-16FD88AAAEB9}" sibTransId="{E5159E96-7206-4C6F-8266-5323CDFC54F7}"/>
+    <dgm:cxn modelId="{5AAE7D56-44FA-4356-8E0F-3BDBCEF71831}" srcId="{30B61FC0-6916-4B93-8E53-5797D7790B59}" destId="{CE1D68A5-D2DC-4199-8043-ECF5EEB262FC}" srcOrd="5" destOrd="0" parTransId="{2054F4C8-8273-4378-9A3F-F9A86F4C8C7B}" sibTransId="{24D379E1-CA8F-460F-B153-FE6939270DC3}"/>
+    <dgm:cxn modelId="{57D2CFB6-F80C-4683-B571-DD42C3903BD3}" type="presOf" srcId="{C1F74533-A485-40FE-A076-533BE33557CB}" destId="{1D0B4E1E-33A1-40A1-8A3E-0DB1E21DCA3A}" srcOrd="0" destOrd="0" presId="urn:microsoft.com/office/officeart/2005/8/layout/hierarchy1"/>
     <dgm:cxn modelId="{0F94086D-4038-4353-AF3B-889F2D91DBF5}" type="presOf" srcId="{30B61FC0-6916-4B93-8E53-5797D7790B59}" destId="{D382EBAF-A88C-4ED6-B155-125AA0C1898C}" srcOrd="0" destOrd="0" presId="urn:microsoft.com/office/officeart/2005/8/layout/hierarchy1"/>
-    <dgm:cxn modelId="{00D20F50-7921-45E2-9DE9-6A4258565866}" srcId="{30B61FC0-6916-4B93-8E53-5797D7790B59}" destId="{FBFBE81D-1280-43A7-B0EE-8A75D5885A47}" srcOrd="6" destOrd="0" parTransId="{A8F460DF-102C-4A4D-92E8-31EEBB42F5C4}" sibTransId="{69E80C92-3388-4BA2-B497-94BD00BA6F66}"/>
-    <dgm:cxn modelId="{5AAE7D56-44FA-4356-8E0F-3BDBCEF71831}" srcId="{30B61FC0-6916-4B93-8E53-5797D7790B59}" destId="{CE1D68A5-D2DC-4199-8043-ECF5EEB262FC}" srcOrd="5" destOrd="0" parTransId="{2054F4C8-8273-4378-9A3F-F9A86F4C8C7B}" sibTransId="{24D379E1-CA8F-460F-B153-FE6939270DC3}"/>
-    <dgm:cxn modelId="{93FCFB8A-D450-46EB-BD80-A7A04FCBEE13}" type="presOf" srcId="{4ED107CA-8285-4DE2-BA66-9D4A615CAE4F}" destId="{B88B3516-6B79-470F-B106-1B0BC6A30CC1}" srcOrd="0" destOrd="0" presId="urn:microsoft.com/office/officeart/2005/8/layout/hierarchy1"/>
-    <dgm:cxn modelId="{BBE23D94-9B13-4F60-91AE-5DE796C02FB3}" type="presOf" srcId="{CE1D68A5-D2DC-4199-8043-ECF5EEB262FC}" destId="{1C8B9953-92A0-46D4-BAC8-CA7F10B55BD1}" srcOrd="0" destOrd="0" presId="urn:microsoft.com/office/officeart/2005/8/layout/hierarchy1"/>
-    <dgm:cxn modelId="{089E2499-DB10-405D-9227-4F77C30DBA24}" type="presOf" srcId="{5BE8912E-F7E6-4741-AD28-CD50A0F3FE44}" destId="{AD6B6B89-1ECF-453F-912B-B1A6F8AE1265}" srcOrd="0" destOrd="0" presId="urn:microsoft.com/office/officeart/2005/8/layout/hierarchy1"/>
-    <dgm:cxn modelId="{57D2CFB6-F80C-4683-B571-DD42C3903BD3}" type="presOf" srcId="{C1F74533-A485-40FE-A076-533BE33557CB}" destId="{1D0B4E1E-33A1-40A1-8A3E-0DB1E21DCA3A}" srcOrd="0" destOrd="0" presId="urn:microsoft.com/office/officeart/2005/8/layout/hierarchy1"/>
-    <dgm:cxn modelId="{A2A3F5D4-33E5-49FD-91E9-B0DDFF19CE73}" type="presOf" srcId="{FBFBE81D-1280-43A7-B0EE-8A75D5885A47}" destId="{FB858AB2-ECF6-4E44-B50D-C334C8F0A141}" srcOrd="0" destOrd="0" presId="urn:microsoft.com/office/officeart/2005/8/layout/hierarchy1"/>
-    <dgm:cxn modelId="{7A05F9DB-AA3D-4501-B484-569E80199AFF}" srcId="{30B61FC0-6916-4B93-8E53-5797D7790B59}" destId="{41BC46B4-BDE9-423F-8906-3CE849E62A0F}" srcOrd="3" destOrd="0" parTransId="{3DB32D63-50B1-4A40-BC8F-16FD88AAAEB9}" sibTransId="{E5159E96-7206-4C6F-8266-5323CDFC54F7}"/>
-    <dgm:cxn modelId="{483147DE-DF2D-4383-8A0D-B5AB9931B73A}" srcId="{30B61FC0-6916-4B93-8E53-5797D7790B59}" destId="{5BE8912E-F7E6-4741-AD28-CD50A0F3FE44}" srcOrd="0" destOrd="0" parTransId="{C8FEA318-3924-4899-A2E8-A1364F402575}" sibTransId="{FD83C4B1-223B-442A-83EB-DDC69F7A4E5B}"/>
-    <dgm:cxn modelId="{2BBC37EB-894B-421D-BF1D-7B6EB2EB8CC1}" srcId="{30B61FC0-6916-4B93-8E53-5797D7790B59}" destId="{9643240F-2EA4-4743-B38B-E754AFDD0BD3}" srcOrd="1" destOrd="0" parTransId="{060E55F1-7310-48FE-B31E-3480C6222EF8}" sibTransId="{9AD560D0-78DA-4521-AEB5-47F0E29F5FBC}"/>
     <dgm:cxn modelId="{62BDB2ED-483B-4422-948C-2260A7F19ACB}" type="presParOf" srcId="{D382EBAF-A88C-4ED6-B155-125AA0C1898C}" destId="{C3F9C80B-9405-4FA7-AC3C-0C945666B357}" srcOrd="0" destOrd="0" presId="urn:microsoft.com/office/officeart/2005/8/layout/hierarchy1"/>
     <dgm:cxn modelId="{315CB453-7BC8-4F9C-84C1-F6D1E30ED56C}" type="presParOf" srcId="{C3F9C80B-9405-4FA7-AC3C-0C945666B357}" destId="{A110C856-4886-4CD0-84C0-92933E4F0C5F}" srcOrd="0" destOrd="0" presId="urn:microsoft.com/office/officeart/2005/8/layout/hierarchy1"/>
     <dgm:cxn modelId="{7102147C-CD2B-498E-83A0-21DCD5FF1DAE}" type="presParOf" srcId="{A110C856-4886-4CD0-84C0-92933E4F0C5F}" destId="{5ADC3D4B-B3A5-4B78-8223-E12DEBC8DDED}" srcOrd="0" destOrd="0" presId="urn:microsoft.com/office/officeart/2005/8/layout/hierarchy1"/>
@@ -3427,6 +3505,13 @@
         </dgm:presLayoutVars>
       </dgm:prSet>
       <dgm:spPr/>
+      <dgm:t>
+        <a:bodyPr/>
+        <a:lstStyle/>
+        <a:p>
+          <a:endParaRPr lang="en-US"/>
+        </a:p>
+      </dgm:t>
     </dgm:pt>
     <dgm:pt modelId="{4AA4CE58-D451-4ACB-86D1-52C5317FFC6F}" type="pres">
       <dgm:prSet presAssocID="{6E91D42A-B735-411E-B998-D907F8BB622B}" presName="parentText" presStyleLbl="node1" presStyleIdx="0" presStyleCnt="3">
@@ -3436,6 +3521,13 @@
         </dgm:presLayoutVars>
       </dgm:prSet>
       <dgm:spPr/>
+      <dgm:t>
+        <a:bodyPr/>
+        <a:lstStyle/>
+        <a:p>
+          <a:endParaRPr lang="en-US"/>
+        </a:p>
+      </dgm:t>
     </dgm:pt>
     <dgm:pt modelId="{76F7D7C5-14B1-49F7-AA2E-D3CBEC097DBE}" type="pres">
       <dgm:prSet presAssocID="{EACCB02A-769F-4057-B50D-BDE5805B1B14}" presName="spacer" presStyleCnt="0"/>
@@ -3449,6 +3541,13 @@
         </dgm:presLayoutVars>
       </dgm:prSet>
       <dgm:spPr/>
+      <dgm:t>
+        <a:bodyPr/>
+        <a:lstStyle/>
+        <a:p>
+          <a:endParaRPr lang="en-US"/>
+        </a:p>
+      </dgm:t>
     </dgm:pt>
     <dgm:pt modelId="{397D2CB8-FB79-4BC2-A937-1D79CEE4EC3C}" type="pres">
       <dgm:prSet presAssocID="{FBFEED40-EB4C-4599-8814-184A141EEEC5}" presName="spacer" presStyleCnt="0"/>
@@ -3462,16 +3561,23 @@
         </dgm:presLayoutVars>
       </dgm:prSet>
       <dgm:spPr/>
+      <dgm:t>
+        <a:bodyPr/>
+        <a:lstStyle/>
+        <a:p>
+          <a:endParaRPr lang="en-US"/>
+        </a:p>
+      </dgm:t>
     </dgm:pt>
   </dgm:ptLst>
   <dgm:cxnLst>
+    <dgm:cxn modelId="{F2FC140E-7B73-459A-9C2C-4FAA0E74E50D}" type="presOf" srcId="{C3D8D874-FE24-421D-94FA-F836C33F0278}" destId="{D120A8E9-9295-4604-A66A-4A5478433D3B}" srcOrd="0" destOrd="0" presId="urn:microsoft.com/office/officeart/2005/8/layout/vList2"/>
+    <dgm:cxn modelId="{3282E7F6-160D-4DC7-9627-6958C703A287}" srcId="{771DB913-69A1-458A-8801-CE6C9A84DC4A}" destId="{C3D8D874-FE24-421D-94FA-F836C33F0278}" srcOrd="2" destOrd="0" parTransId="{0CA8D8D8-BB5B-49C8-8E5C-12A8D1BD0C49}" sibTransId="{9A9E2545-A51E-4DBA-B599-F299AA3030D4}"/>
+    <dgm:cxn modelId="{4427BDB6-02B8-4361-933D-117AD7D711D4}" type="presOf" srcId="{771DB913-69A1-458A-8801-CE6C9A84DC4A}" destId="{0C0D151C-5042-4199-9BF9-EA7851D46770}" srcOrd="0" destOrd="0" presId="urn:microsoft.com/office/officeart/2005/8/layout/vList2"/>
+    <dgm:cxn modelId="{7268894C-2BFB-4014-AA51-7D80C502A015}" type="presOf" srcId="{6E91D42A-B735-411E-B998-D907F8BB622B}" destId="{4AA4CE58-D451-4ACB-86D1-52C5317FFC6F}" srcOrd="0" destOrd="0" presId="urn:microsoft.com/office/officeart/2005/8/layout/vList2"/>
+    <dgm:cxn modelId="{51AB14BE-C0F7-44C8-A003-E1859B86770A}" type="presOf" srcId="{0DD6AA72-7546-4D31-AA9A-CE4FB76822FC}" destId="{EAC848E8-85E1-4AFA-8307-BC4296BBBFA1}" srcOrd="0" destOrd="0" presId="urn:microsoft.com/office/officeart/2005/8/layout/vList2"/>
     <dgm:cxn modelId="{EBA13F0B-1D8F-4255-8B4C-B155A795DAA0}" srcId="{771DB913-69A1-458A-8801-CE6C9A84DC4A}" destId="{0DD6AA72-7546-4D31-AA9A-CE4FB76822FC}" srcOrd="1" destOrd="0" parTransId="{04037E6B-FA05-4CEE-A7CF-F10E0797FD1A}" sibTransId="{FBFEED40-EB4C-4599-8814-184A141EEEC5}"/>
-    <dgm:cxn modelId="{F2FC140E-7B73-459A-9C2C-4FAA0E74E50D}" type="presOf" srcId="{C3D8D874-FE24-421D-94FA-F836C33F0278}" destId="{D120A8E9-9295-4604-A66A-4A5478433D3B}" srcOrd="0" destOrd="0" presId="urn:microsoft.com/office/officeart/2005/8/layout/vList2"/>
-    <dgm:cxn modelId="{7268894C-2BFB-4014-AA51-7D80C502A015}" type="presOf" srcId="{6E91D42A-B735-411E-B998-D907F8BB622B}" destId="{4AA4CE58-D451-4ACB-86D1-52C5317FFC6F}" srcOrd="0" destOrd="0" presId="urn:microsoft.com/office/officeart/2005/8/layout/vList2"/>
     <dgm:cxn modelId="{ABEE71B1-CD8E-4F3D-B606-57181A1C1B3C}" srcId="{771DB913-69A1-458A-8801-CE6C9A84DC4A}" destId="{6E91D42A-B735-411E-B998-D907F8BB622B}" srcOrd="0" destOrd="0" parTransId="{E37BCB76-5458-4C0C-8AF0-36D61A5E814A}" sibTransId="{EACCB02A-769F-4057-B50D-BDE5805B1B14}"/>
-    <dgm:cxn modelId="{4427BDB6-02B8-4361-933D-117AD7D711D4}" type="presOf" srcId="{771DB913-69A1-458A-8801-CE6C9A84DC4A}" destId="{0C0D151C-5042-4199-9BF9-EA7851D46770}" srcOrd="0" destOrd="0" presId="urn:microsoft.com/office/officeart/2005/8/layout/vList2"/>
-    <dgm:cxn modelId="{51AB14BE-C0F7-44C8-A003-E1859B86770A}" type="presOf" srcId="{0DD6AA72-7546-4D31-AA9A-CE4FB76822FC}" destId="{EAC848E8-85E1-4AFA-8307-BC4296BBBFA1}" srcOrd="0" destOrd="0" presId="urn:microsoft.com/office/officeart/2005/8/layout/vList2"/>
-    <dgm:cxn modelId="{3282E7F6-160D-4DC7-9627-6958C703A287}" srcId="{771DB913-69A1-458A-8801-CE6C9A84DC4A}" destId="{C3D8D874-FE24-421D-94FA-F836C33F0278}" srcOrd="2" destOrd="0" parTransId="{0CA8D8D8-BB5B-49C8-8E5C-12A8D1BD0C49}" sibTransId="{9A9E2545-A51E-4DBA-B599-F299AA3030D4}"/>
     <dgm:cxn modelId="{39E6BD0F-6CFB-4F3A-B2E7-30A3B554B2C4}" type="presParOf" srcId="{0C0D151C-5042-4199-9BF9-EA7851D46770}" destId="{4AA4CE58-D451-4ACB-86D1-52C5317FFC6F}" srcOrd="0" destOrd="0" presId="urn:microsoft.com/office/officeart/2005/8/layout/vList2"/>
     <dgm:cxn modelId="{D1CA4DC4-FDAF-42DE-B738-31313B19E814}" type="presParOf" srcId="{0C0D151C-5042-4199-9BF9-EA7851D46770}" destId="{76F7D7C5-14B1-49F7-AA2E-D3CBEC097DBE}" srcOrd="1" destOrd="0" presId="urn:microsoft.com/office/officeart/2005/8/layout/vList2"/>
     <dgm:cxn modelId="{9F186DEB-8628-441D-95CE-8CC7D982E0F6}" type="presParOf" srcId="{0C0D151C-5042-4199-9BF9-EA7851D46770}" destId="{EAC848E8-85E1-4AFA-8307-BC4296BBBFA1}" srcOrd="2" destOrd="0" presId="urn:microsoft.com/office/officeart/2005/8/layout/vList2"/>
@@ -3516,7 +3622,7 @@
                 <a14:useLocalDpi xmlns:a14="http://schemas.microsoft.com/office/drawing/2010/main" val="0"/>
               </a:ext>
               <a:ext uri="{96DAC541-7B7A-43D3-8B79-37D633B846F1}">
-                <asvg:svgBlip xmlns:asvg="http://schemas.microsoft.com/office/drawing/2016/SVG/main" r:embed="rId2"/>
+                <asvg:svgBlip xmlns:asvg="http://schemas.microsoft.com/office/drawing/2016/SVG/main" xmlns="" r:embed="rId2"/>
               </a:ext>
             </a:extLst>
           </a:blip>
@@ -3582,7 +3688,7 @@
         </a:bodyPr>
         <a:lstStyle/>
         <a:p>
-          <a:pPr marL="0" lvl="0" indent="0" algn="ctr" defTabSz="755650">
+          <a:pPr lvl="0" algn="ctr" defTabSz="755650">
             <a:lnSpc>
               <a:spcPct val="90000"/>
             </a:lnSpc>
@@ -3592,7 +3698,6 @@
             <a:spcAft>
               <a:spcPct val="35000"/>
             </a:spcAft>
-            <a:buNone/>
           </a:pPr>
           <a:r>
             <a:rPr lang="en-US" sz="1700" b="0" i="0" kern="1200"/>
@@ -3626,7 +3731,7 @@
                 <a14:useLocalDpi xmlns:a14="http://schemas.microsoft.com/office/drawing/2010/main" val="0"/>
               </a:ext>
               <a:ext uri="{96DAC541-7B7A-43D3-8B79-37D633B846F1}">
-                <asvg:svgBlip xmlns:asvg="http://schemas.microsoft.com/office/drawing/2016/SVG/main" r:embed="rId4"/>
+                <asvg:svgBlip xmlns:asvg="http://schemas.microsoft.com/office/drawing/2016/SVG/main" xmlns="" r:embed="rId4"/>
               </a:ext>
             </a:extLst>
           </a:blip>
@@ -3692,7 +3797,7 @@
         </a:bodyPr>
         <a:lstStyle/>
         <a:p>
-          <a:pPr marL="0" lvl="0" indent="0" algn="ctr" defTabSz="755650">
+          <a:pPr lvl="0" algn="ctr" defTabSz="755650">
             <a:lnSpc>
               <a:spcPct val="90000"/>
             </a:lnSpc>
@@ -3702,7 +3807,6 @@
             <a:spcAft>
               <a:spcPct val="35000"/>
             </a:spcAft>
-            <a:buNone/>
           </a:pPr>
           <a:r>
             <a:rPr lang="en-US" sz="1700" b="0" i="0" kern="1200"/>
@@ -3834,7 +3938,7 @@
         </a:bodyPr>
         <a:lstStyle/>
         <a:p>
-          <a:pPr marL="0" lvl="0" indent="0" algn="ctr" defTabSz="933450">
+          <a:pPr lvl="0" algn="ctr" defTabSz="933450">
             <a:lnSpc>
               <a:spcPct val="90000"/>
             </a:lnSpc>
@@ -3844,7 +3948,6 @@
             <a:spcAft>
               <a:spcPct val="35000"/>
             </a:spcAft>
-            <a:buNone/>
           </a:pPr>
           <a:r>
             <a:rPr lang="en-US" sz="2100" b="0" i="0" kern="1200" dirty="0"/>
@@ -3964,7 +4067,7 @@
         </a:bodyPr>
         <a:lstStyle/>
         <a:p>
-          <a:pPr marL="0" lvl="0" indent="0" algn="ctr" defTabSz="933450">
+          <a:pPr lvl="0" algn="ctr" defTabSz="933450">
             <a:lnSpc>
               <a:spcPct val="90000"/>
             </a:lnSpc>
@@ -3974,7 +4077,6 @@
             <a:spcAft>
               <a:spcPct val="35000"/>
             </a:spcAft>
-            <a:buNone/>
           </a:pPr>
           <a:r>
             <a:rPr lang="en-US" sz="2100" b="0" i="0" kern="1200" dirty="0"/>
@@ -4094,7 +4196,7 @@
         </a:bodyPr>
         <a:lstStyle/>
         <a:p>
-          <a:pPr marL="0" lvl="0" indent="0" algn="ctr" defTabSz="933450">
+          <a:pPr lvl="0" algn="ctr" defTabSz="933450">
             <a:lnSpc>
               <a:spcPct val="90000"/>
             </a:lnSpc>
@@ -4104,7 +4206,6 @@
             <a:spcAft>
               <a:spcPct val="35000"/>
             </a:spcAft>
-            <a:buNone/>
           </a:pPr>
           <a:r>
             <a:rPr lang="en-US" sz="2100" b="0" i="0" kern="1200"/>
@@ -4224,7 +4325,7 @@
         </a:bodyPr>
         <a:lstStyle/>
         <a:p>
-          <a:pPr marL="0" lvl="0" indent="0" algn="ctr" defTabSz="933450">
+          <a:pPr lvl="0" algn="ctr" defTabSz="933450">
             <a:lnSpc>
               <a:spcPct val="90000"/>
             </a:lnSpc>
@@ -4234,7 +4335,6 @@
             <a:spcAft>
               <a:spcPct val="35000"/>
             </a:spcAft>
-            <a:buNone/>
           </a:pPr>
           <a:r>
             <a:rPr lang="en-US" sz="2100" kern="1200" dirty="0" err="1"/>
@@ -4357,7 +4457,7 @@
         </a:bodyPr>
         <a:lstStyle/>
         <a:p>
-          <a:pPr marL="0" lvl="0" indent="0" algn="ctr" defTabSz="933450">
+          <a:pPr lvl="0" algn="ctr" defTabSz="933450">
             <a:lnSpc>
               <a:spcPct val="90000"/>
             </a:lnSpc>
@@ -4367,7 +4467,6 @@
             <a:spcAft>
               <a:spcPct val="35000"/>
             </a:spcAft>
-            <a:buNone/>
           </a:pPr>
           <a:r>
             <a:rPr lang="en-US" sz="2100" b="0" i="0" kern="1200" dirty="0"/>
@@ -4487,7 +4586,7 @@
         </a:bodyPr>
         <a:lstStyle/>
         <a:p>
-          <a:pPr marL="0" lvl="0" indent="0" algn="ctr" defTabSz="933450">
+          <a:pPr lvl="0" algn="ctr" defTabSz="933450">
             <a:lnSpc>
               <a:spcPct val="90000"/>
             </a:lnSpc>
@@ -4497,7 +4596,6 @@
             <a:spcAft>
               <a:spcPct val="35000"/>
             </a:spcAft>
-            <a:buNone/>
           </a:pPr>
           <a:r>
             <a:rPr lang="en-US" sz="2100" b="0" i="0" kern="1200" dirty="0"/>
@@ -4617,7 +4715,7 @@
         </a:bodyPr>
         <a:lstStyle/>
         <a:p>
-          <a:pPr marL="0" lvl="0" indent="0" algn="ctr" defTabSz="933450">
+          <a:pPr lvl="0" algn="ctr" defTabSz="933450">
             <a:lnSpc>
               <a:spcPct val="90000"/>
             </a:lnSpc>
@@ -4627,7 +4725,6 @@
             <a:spcAft>
               <a:spcPct val="35000"/>
             </a:spcAft>
-            <a:buNone/>
           </a:pPr>
           <a:r>
             <a:rPr lang="en-US" sz="2100" kern="1200" dirty="0"/>
@@ -4721,7 +4818,7 @@
         </a:bodyPr>
         <a:lstStyle/>
         <a:p>
-          <a:pPr marL="0" lvl="0" indent="0" algn="l" defTabSz="1600200">
+          <a:pPr lvl="0" algn="l" defTabSz="1600200">
             <a:lnSpc>
               <a:spcPct val="90000"/>
             </a:lnSpc>
@@ -4731,7 +4828,6 @@
             <a:spcAft>
               <a:spcPct val="35000"/>
             </a:spcAft>
-            <a:buNone/>
           </a:pPr>
           <a:r>
             <a:rPr lang="en-US" sz="3600" b="0" i="0" kern="1200"/>
@@ -4814,7 +4910,7 @@
         </a:bodyPr>
         <a:lstStyle/>
         <a:p>
-          <a:pPr marL="0" lvl="0" indent="0" algn="l" defTabSz="1600200">
+          <a:pPr lvl="0" algn="l" defTabSz="1600200">
             <a:lnSpc>
               <a:spcPct val="90000"/>
             </a:lnSpc>
@@ -4824,7 +4920,6 @@
             <a:spcAft>
               <a:spcPct val="35000"/>
             </a:spcAft>
-            <a:buNone/>
           </a:pPr>
           <a:r>
             <a:rPr lang="en-US" sz="3600" b="0" i="0" kern="1200"/>
@@ -4907,7 +5002,7 @@
         </a:bodyPr>
         <a:lstStyle/>
         <a:p>
-          <a:pPr marL="0" lvl="0" indent="0" algn="l" defTabSz="1600200">
+          <a:pPr lvl="0" algn="l" defTabSz="1600200">
             <a:lnSpc>
               <a:spcPct val="90000"/>
             </a:lnSpc>
@@ -4917,7 +5012,6 @@
             <a:spcAft>
               <a:spcPct val="35000"/>
             </a:spcAft>
-            <a:buNone/>
           </a:pPr>
           <a:r>
             <a:rPr lang="en-US" sz="3600" b="0" i="0" kern="1200"/>
@@ -5113,7 +5207,7 @@
   </dgm:layoutNode>
   <dgm:extLst>
     <a:ext uri="{68A01E43-0DF5-4B5B-8FA6-DAF915123BFB}">
-      <dgm1612:lstStyle xmlns:dgm1612="http://schemas.microsoft.com/office/drawing/2016/12/diagram">
+      <dgm1612:lstStyle xmlns:dgm1612="http://schemas.microsoft.com/office/drawing/2016/12/diagram" xmlns="">
         <a:lvl1pPr>
           <a:lnSpc>
             <a:spcPct val="100000"/>
@@ -14941,7 +15035,7 @@
           <p:cNvPr id="2" name="Title 1">
             <a:extLst>
               <a:ext uri="{FF2B5EF4-FFF2-40B4-BE49-F238E27FC236}">
-                <a16:creationId xmlns:a16="http://schemas.microsoft.com/office/drawing/2014/main" id="{F9640BFD-99C0-4CAE-979D-FF1D0DDEAC29}"/>
+                <a16:creationId xmlns:a16="http://schemas.microsoft.com/office/drawing/2014/main" xmlns="" id="{F9640BFD-99C0-4CAE-979D-FF1D0DDEAC29}"/>
               </a:ext>
             </a:extLst>
           </p:cNvPr>
@@ -14969,7 +15063,7 @@
           <p:cNvPr id="3" name="Subtitle 2">
             <a:extLst>
               <a:ext uri="{FF2B5EF4-FFF2-40B4-BE49-F238E27FC236}">
-                <a16:creationId xmlns:a16="http://schemas.microsoft.com/office/drawing/2014/main" id="{330003F5-5600-47CA-B0D9-5E3666912921}"/>
+                <a16:creationId xmlns:a16="http://schemas.microsoft.com/office/drawing/2014/main" xmlns="" id="{330003F5-5600-47CA-B0D9-5E3666912921}"/>
               </a:ext>
             </a:extLst>
           </p:cNvPr>
@@ -15027,7 +15121,7 @@
           <p:cNvPr id="2" name="Title 1">
             <a:extLst>
               <a:ext uri="{FF2B5EF4-FFF2-40B4-BE49-F238E27FC236}">
-                <a16:creationId xmlns:a16="http://schemas.microsoft.com/office/drawing/2014/main" id="{950A93D4-9BA4-4FD6-919F-F1EAB2636F2F}"/>
+                <a16:creationId xmlns:a16="http://schemas.microsoft.com/office/drawing/2014/main" xmlns="" id="{950A93D4-9BA4-4FD6-919F-F1EAB2636F2F}"/>
               </a:ext>
             </a:extLst>
           </p:cNvPr>
@@ -15052,7 +15146,7 @@
           <p:cNvPr id="5" name="Content Placeholder 4" descr="Chart, line chart&#10;&#10;Description automatically generated">
             <a:extLst>
               <a:ext uri="{FF2B5EF4-FFF2-40B4-BE49-F238E27FC236}">
-                <a16:creationId xmlns:a16="http://schemas.microsoft.com/office/drawing/2014/main" id="{CDFA51B5-FC45-4362-BE5C-C93177B34ABB}"/>
+                <a16:creationId xmlns:a16="http://schemas.microsoft.com/office/drawing/2014/main" xmlns="" id="{CDFA51B5-FC45-4362-BE5C-C93177B34ABB}"/>
               </a:ext>
             </a:extLst>
           </p:cNvPr>
@@ -15117,7 +15211,7 @@
           <p:cNvPr id="2" name="Title 1">
             <a:extLst>
               <a:ext uri="{FF2B5EF4-FFF2-40B4-BE49-F238E27FC236}">
-                <a16:creationId xmlns:a16="http://schemas.microsoft.com/office/drawing/2014/main" id="{9810C2F3-4C8B-4498-8EC1-47E1408B031C}"/>
+                <a16:creationId xmlns:a16="http://schemas.microsoft.com/office/drawing/2014/main" xmlns="" id="{9810C2F3-4C8B-4498-8EC1-47E1408B031C}"/>
               </a:ext>
             </a:extLst>
           </p:cNvPr>
@@ -15142,7 +15236,7 @@
           <p:cNvPr id="5" name="Content Placeholder 4" descr="Chart, line chart&#10;&#10;Description automatically generated">
             <a:extLst>
               <a:ext uri="{FF2B5EF4-FFF2-40B4-BE49-F238E27FC236}">
-                <a16:creationId xmlns:a16="http://schemas.microsoft.com/office/drawing/2014/main" id="{977C57F1-1ADD-4CB0-A9C4-D858A4C4F253}"/>
+                <a16:creationId xmlns:a16="http://schemas.microsoft.com/office/drawing/2014/main" xmlns="" id="{977C57F1-1ADD-4CB0-A9C4-D858A4C4F253}"/>
               </a:ext>
             </a:extLst>
           </p:cNvPr>
@@ -15207,7 +15301,7 @@
           <p:cNvPr id="2" name="Title 1">
             <a:extLst>
               <a:ext uri="{FF2B5EF4-FFF2-40B4-BE49-F238E27FC236}">
-                <a16:creationId xmlns:a16="http://schemas.microsoft.com/office/drawing/2014/main" id="{2A7C19B6-3EC8-411A-B740-5F62ACDC0A8D}"/>
+                <a16:creationId xmlns:a16="http://schemas.microsoft.com/office/drawing/2014/main" xmlns="" id="{2A7C19B6-3EC8-411A-B740-5F62ACDC0A8D}"/>
               </a:ext>
             </a:extLst>
           </p:cNvPr>
@@ -15232,7 +15326,7 @@
           <p:cNvPr id="5" name="Content Placeholder 4" descr="Chart&#10;&#10;Description automatically generated">
             <a:extLst>
               <a:ext uri="{FF2B5EF4-FFF2-40B4-BE49-F238E27FC236}">
-                <a16:creationId xmlns:a16="http://schemas.microsoft.com/office/drawing/2014/main" id="{E0637F0F-3CF8-4D9C-8FE3-B293DBA476DA}"/>
+                <a16:creationId xmlns:a16="http://schemas.microsoft.com/office/drawing/2014/main" xmlns="" id="{E0637F0F-3CF8-4D9C-8FE3-B293DBA476DA}"/>
               </a:ext>
             </a:extLst>
           </p:cNvPr>
@@ -15297,7 +15391,7 @@
           <p:cNvPr id="2" name="Title 1">
             <a:extLst>
               <a:ext uri="{FF2B5EF4-FFF2-40B4-BE49-F238E27FC236}">
-                <a16:creationId xmlns:a16="http://schemas.microsoft.com/office/drawing/2014/main" id="{858C5976-5E4A-4FF5-8062-3391AD44CE50}"/>
+                <a16:creationId xmlns:a16="http://schemas.microsoft.com/office/drawing/2014/main" xmlns="" id="{858C5976-5E4A-4FF5-8062-3391AD44CE50}"/>
               </a:ext>
             </a:extLst>
           </p:cNvPr>
@@ -15322,7 +15416,7 @@
           <p:cNvPr id="5" name="Content Placeholder 4" descr="Chart, bar chart&#10;&#10;Description automatically generated">
             <a:extLst>
               <a:ext uri="{FF2B5EF4-FFF2-40B4-BE49-F238E27FC236}">
-                <a16:creationId xmlns:a16="http://schemas.microsoft.com/office/drawing/2014/main" id="{9AB88672-C06F-4E84-BD1D-90263C2D80FB}"/>
+                <a16:creationId xmlns:a16="http://schemas.microsoft.com/office/drawing/2014/main" xmlns="" id="{9AB88672-C06F-4E84-BD1D-90263C2D80FB}"/>
               </a:ext>
             </a:extLst>
           </p:cNvPr>
@@ -15411,10 +15505,10 @@
           <p:cNvPr id="8" name="Picture 7">
             <a:extLst>
               <a:ext uri="{FF2B5EF4-FFF2-40B4-BE49-F238E27FC236}">
-                <a16:creationId xmlns:a16="http://schemas.microsoft.com/office/drawing/2014/main" id="{91B28F63-CF00-448F-B141-FE33C33B1891}"/>
+                <a16:creationId xmlns:a16="http://schemas.microsoft.com/office/drawing/2014/main" xmlns="" id="{91B28F63-CF00-448F-B141-FE33C33B1891}"/>
               </a:ext>
               <a:ext uri="{C183D7F6-B498-43B3-948B-1728B52AA6E4}">
-                <adec:decorative xmlns:adec="http://schemas.microsoft.com/office/drawing/2017/decorative" val="1"/>
+                <adec:decorative xmlns:adec="http://schemas.microsoft.com/office/drawing/2017/decorative" xmlns="" val="1"/>
               </a:ext>
             </a:extLst>
           </p:cNvPr>
@@ -15424,7 +15518,7 @@
           <p:nvPr>
             <p:extLst>
               <p:ext uri="{386F3935-93C4-4BCD-93E2-E3B085C9AB24}">
-                <p16:designElem xmlns:p16="http://schemas.microsoft.com/office/powerpoint/2015/main" val="1"/>
+                <p16:designElem xmlns:p16="http://schemas.microsoft.com/office/powerpoint/2015/main" xmlns="" val="1"/>
               </p:ext>
             </p:extLst>
           </p:nvPr>
@@ -15455,10 +15549,10 @@
           <p:cNvPr id="10" name="Picture 9">
             <a:extLst>
               <a:ext uri="{FF2B5EF4-FFF2-40B4-BE49-F238E27FC236}">
-                <a16:creationId xmlns:a16="http://schemas.microsoft.com/office/drawing/2014/main" id="{2AE609E2-8522-44E4-9077-980E5BCF3E14}"/>
+                <a16:creationId xmlns:a16="http://schemas.microsoft.com/office/drawing/2014/main" xmlns="" id="{2AE609E2-8522-44E4-9077-980E5BCF3E14}"/>
               </a:ext>
               <a:ext uri="{C183D7F6-B498-43B3-948B-1728B52AA6E4}">
-                <adec:decorative xmlns:adec="http://schemas.microsoft.com/office/drawing/2017/decorative" val="1"/>
+                <adec:decorative xmlns:adec="http://schemas.microsoft.com/office/drawing/2017/decorative" xmlns="" val="1"/>
               </a:ext>
             </a:extLst>
           </p:cNvPr>
@@ -15468,7 +15562,7 @@
           <p:nvPr>
             <p:extLst>
               <p:ext uri="{386F3935-93C4-4BCD-93E2-E3B085C9AB24}">
-                <p16:designElem xmlns:p16="http://schemas.microsoft.com/office/powerpoint/2015/main" val="1"/>
+                <p16:designElem xmlns:p16="http://schemas.microsoft.com/office/powerpoint/2015/main" xmlns="" val="1"/>
               </p:ext>
             </p:extLst>
           </p:nvPr>
@@ -15499,10 +15593,10 @@
           <p:cNvPr id="12" name="Oval 11">
             <a:extLst>
               <a:ext uri="{FF2B5EF4-FFF2-40B4-BE49-F238E27FC236}">
-                <a16:creationId xmlns:a16="http://schemas.microsoft.com/office/drawing/2014/main" id="{4FA533C5-33E3-4611-AF9F-72811D8B26A6}"/>
+                <a16:creationId xmlns:a16="http://schemas.microsoft.com/office/drawing/2014/main" xmlns="" id="{4FA533C5-33E3-4611-AF9F-72811D8B26A6}"/>
               </a:ext>
               <a:ext uri="{C183D7F6-B498-43B3-948B-1728B52AA6E4}">
-                <adec:decorative xmlns:adec="http://schemas.microsoft.com/office/drawing/2017/decorative" val="1"/>
+                <adec:decorative xmlns:adec="http://schemas.microsoft.com/office/drawing/2017/decorative" xmlns="" val="1"/>
               </a:ext>
             </a:extLst>
           </p:cNvPr>
@@ -15512,7 +15606,7 @@
           <p:nvPr>
             <p:extLst>
               <p:ext uri="{386F3935-93C4-4BCD-93E2-E3B085C9AB24}">
-                <p16:designElem xmlns:p16="http://schemas.microsoft.com/office/powerpoint/2015/main" val="1"/>
+                <p16:designElem xmlns:p16="http://schemas.microsoft.com/office/powerpoint/2015/main" xmlns="" val="1"/>
               </p:ext>
             </p:extLst>
           </p:nvPr>
@@ -15579,10 +15673,10 @@
           <p:cNvPr id="14" name="Picture 13">
             <a:extLst>
               <a:ext uri="{FF2B5EF4-FFF2-40B4-BE49-F238E27FC236}">
-                <a16:creationId xmlns:a16="http://schemas.microsoft.com/office/drawing/2014/main" id="{8949AD42-25FD-4C3D-9EEE-B7FEC5809988}"/>
+                <a16:creationId xmlns:a16="http://schemas.microsoft.com/office/drawing/2014/main" xmlns="" id="{8949AD42-25FD-4C3D-9EEE-B7FEC5809988}"/>
               </a:ext>
               <a:ext uri="{C183D7F6-B498-43B3-948B-1728B52AA6E4}">
-                <adec:decorative xmlns:adec="http://schemas.microsoft.com/office/drawing/2017/decorative" val="1"/>
+                <adec:decorative xmlns:adec="http://schemas.microsoft.com/office/drawing/2017/decorative" xmlns="" val="1"/>
               </a:ext>
             </a:extLst>
           </p:cNvPr>
@@ -15592,7 +15686,7 @@
           <p:nvPr>
             <p:extLst>
               <p:ext uri="{386F3935-93C4-4BCD-93E2-E3B085C9AB24}">
-                <p16:designElem xmlns:p16="http://schemas.microsoft.com/office/powerpoint/2015/main" val="1"/>
+                <p16:designElem xmlns:p16="http://schemas.microsoft.com/office/powerpoint/2015/main" xmlns="" val="1"/>
               </p:ext>
             </p:extLst>
           </p:nvPr>
@@ -15623,10 +15717,10 @@
           <p:cNvPr id="16" name="Picture 15">
             <a:extLst>
               <a:ext uri="{FF2B5EF4-FFF2-40B4-BE49-F238E27FC236}">
-                <a16:creationId xmlns:a16="http://schemas.microsoft.com/office/drawing/2014/main" id="{6AC7D913-60B7-4603-881B-831DA5D3A940}"/>
+                <a16:creationId xmlns:a16="http://schemas.microsoft.com/office/drawing/2014/main" xmlns="" id="{6AC7D913-60B7-4603-881B-831DA5D3A940}"/>
               </a:ext>
               <a:ext uri="{C183D7F6-B498-43B3-948B-1728B52AA6E4}">
-                <adec:decorative xmlns:adec="http://schemas.microsoft.com/office/drawing/2017/decorative" val="1"/>
+                <adec:decorative xmlns:adec="http://schemas.microsoft.com/office/drawing/2017/decorative" xmlns="" val="1"/>
               </a:ext>
             </a:extLst>
           </p:cNvPr>
@@ -15636,7 +15730,7 @@
           <p:nvPr>
             <p:extLst>
               <p:ext uri="{386F3935-93C4-4BCD-93E2-E3B085C9AB24}">
-                <p16:designElem xmlns:p16="http://schemas.microsoft.com/office/powerpoint/2015/main" val="1"/>
+                <p16:designElem xmlns:p16="http://schemas.microsoft.com/office/powerpoint/2015/main" xmlns="" val="1"/>
               </p:ext>
             </p:extLst>
           </p:nvPr>
@@ -15667,10 +15761,10 @@
           <p:cNvPr id="18" name="Rectangle 17">
             <a:extLst>
               <a:ext uri="{FF2B5EF4-FFF2-40B4-BE49-F238E27FC236}">
-                <a16:creationId xmlns:a16="http://schemas.microsoft.com/office/drawing/2014/main" id="{87F0FDC4-AD8C-47D9-9131-623C98ADB0AE}"/>
+                <a16:creationId xmlns:a16="http://schemas.microsoft.com/office/drawing/2014/main" xmlns="" id="{87F0FDC4-AD8C-47D9-9131-623C98ADB0AE}"/>
               </a:ext>
               <a:ext uri="{C183D7F6-B498-43B3-948B-1728B52AA6E4}">
-                <adec:decorative xmlns:adec="http://schemas.microsoft.com/office/drawing/2017/decorative" val="1"/>
+                <adec:decorative xmlns:adec="http://schemas.microsoft.com/office/drawing/2017/decorative" xmlns="" val="1"/>
               </a:ext>
             </a:extLst>
           </p:cNvPr>
@@ -15680,7 +15774,7 @@
           <p:nvPr>
             <p:extLst>
               <p:ext uri="{386F3935-93C4-4BCD-93E2-E3B085C9AB24}">
-                <p16:designElem xmlns:p16="http://schemas.microsoft.com/office/powerpoint/2015/main" val="1"/>
+                <p16:designElem xmlns:p16="http://schemas.microsoft.com/office/powerpoint/2015/main" xmlns="" val="1"/>
               </p:ext>
             </p:extLst>
           </p:nvPr>
@@ -15720,10 +15814,10 @@
           <p:cNvPr id="20" name="Rectangle 19">
             <a:extLst>
               <a:ext uri="{FF2B5EF4-FFF2-40B4-BE49-F238E27FC236}">
-                <a16:creationId xmlns:a16="http://schemas.microsoft.com/office/drawing/2014/main" id="{E6A222EB-A81E-4238-B08D-AAB1828C8E0B}"/>
+                <a16:creationId xmlns:a16="http://schemas.microsoft.com/office/drawing/2014/main" xmlns="" id="{E6A222EB-A81E-4238-B08D-AAB1828C8E0B}"/>
               </a:ext>
               <a:ext uri="{C183D7F6-B498-43B3-948B-1728B52AA6E4}">
-                <adec:decorative xmlns:adec="http://schemas.microsoft.com/office/drawing/2017/decorative" val="1"/>
+                <adec:decorative xmlns:adec="http://schemas.microsoft.com/office/drawing/2017/decorative" xmlns="" val="1"/>
               </a:ext>
             </a:extLst>
           </p:cNvPr>
@@ -15733,7 +15827,7 @@
           <p:nvPr>
             <p:extLst>
               <p:ext uri="{386F3935-93C4-4BCD-93E2-E3B085C9AB24}">
-                <p16:designElem xmlns:p16="http://schemas.microsoft.com/office/powerpoint/2015/main" val="1"/>
+                <p16:designElem xmlns:p16="http://schemas.microsoft.com/office/powerpoint/2015/main" xmlns="" val="1"/>
               </p:ext>
             </p:extLst>
           </p:nvPr>
@@ -15780,10 +15874,10 @@
           <p:cNvPr id="22" name="Rectangle 21">
             <a:extLst>
               <a:ext uri="{FF2B5EF4-FFF2-40B4-BE49-F238E27FC236}">
-                <a16:creationId xmlns:a16="http://schemas.microsoft.com/office/drawing/2014/main" id="{E014676C-074B-475A-8346-9C901C86CB97}"/>
+                <a16:creationId xmlns:a16="http://schemas.microsoft.com/office/drawing/2014/main" xmlns="" id="{E014676C-074B-475A-8346-9C901C86CB97}"/>
               </a:ext>
               <a:ext uri="{C183D7F6-B498-43B3-948B-1728B52AA6E4}">
-                <adec:decorative xmlns:adec="http://schemas.microsoft.com/office/drawing/2017/decorative" val="1"/>
+                <adec:decorative xmlns:adec="http://schemas.microsoft.com/office/drawing/2017/decorative" xmlns="" val="1"/>
               </a:ext>
             </a:extLst>
           </p:cNvPr>
@@ -15793,7 +15887,7 @@
           <p:nvPr>
             <p:extLst>
               <p:ext uri="{386F3935-93C4-4BCD-93E2-E3B085C9AB24}">
-                <p16:designElem xmlns:p16="http://schemas.microsoft.com/office/powerpoint/2015/main" val="1"/>
+                <p16:designElem xmlns:p16="http://schemas.microsoft.com/office/powerpoint/2015/main" xmlns="" val="1"/>
               </p:ext>
             </p:extLst>
           </p:nvPr>
@@ -15833,10 +15927,10 @@
           <p:cNvPr id="24" name="Straight Connector 23">
             <a:extLst>
               <a:ext uri="{FF2B5EF4-FFF2-40B4-BE49-F238E27FC236}">
-                <a16:creationId xmlns:a16="http://schemas.microsoft.com/office/drawing/2014/main" id="{179C4C8E-197B-4679-AE96-B5147F971C90}"/>
+                <a16:creationId xmlns:a16="http://schemas.microsoft.com/office/drawing/2014/main" xmlns="" id="{179C4C8E-197B-4679-AE96-B5147F971C90}"/>
               </a:ext>
               <a:ext uri="{C183D7F6-B498-43B3-948B-1728B52AA6E4}">
-                <adec:decorative xmlns:adec="http://schemas.microsoft.com/office/drawing/2017/decorative" val="1"/>
+                <adec:decorative xmlns:adec="http://schemas.microsoft.com/office/drawing/2017/decorative" xmlns="" val="1"/>
               </a:ext>
             </a:extLst>
           </p:cNvPr>
@@ -15846,7 +15940,7 @@
           <p:nvPr>
             <p:extLst>
               <p:ext uri="{386F3935-93C4-4BCD-93E2-E3B085C9AB24}">
-                <p16:designElem xmlns:p16="http://schemas.microsoft.com/office/powerpoint/2015/main" val="1"/>
+                <p16:designElem xmlns:p16="http://schemas.microsoft.com/office/powerpoint/2015/main" xmlns="" val="1"/>
               </p:ext>
             </p:extLst>
           </p:nvPr>
@@ -15888,7 +15982,7 @@
           <p:cNvPr id="2" name="Title 1">
             <a:extLst>
               <a:ext uri="{FF2B5EF4-FFF2-40B4-BE49-F238E27FC236}">
-                <a16:creationId xmlns:a16="http://schemas.microsoft.com/office/drawing/2014/main" id="{B97EC12C-9B56-4DFC-9EFA-9DC39815E5C6}"/>
+                <a16:creationId xmlns:a16="http://schemas.microsoft.com/office/drawing/2014/main" xmlns="" id="{B97EC12C-9B56-4DFC-9EFA-9DC39815E5C6}"/>
               </a:ext>
             </a:extLst>
           </p:cNvPr>
@@ -15960,7 +16054,7 @@
           <p:cNvPr id="2" name="Title 1">
             <a:extLst>
               <a:ext uri="{FF2B5EF4-FFF2-40B4-BE49-F238E27FC236}">
-                <a16:creationId xmlns:a16="http://schemas.microsoft.com/office/drawing/2014/main" id="{C306E98B-F805-4C1B-86EB-047530EA7F03}"/>
+                <a16:creationId xmlns:a16="http://schemas.microsoft.com/office/drawing/2014/main" xmlns="" id="{C306E98B-F805-4C1B-86EB-047530EA7F03}"/>
               </a:ext>
             </a:extLst>
           </p:cNvPr>
@@ -15985,7 +16079,7 @@
           <p:cNvPr id="5" name="Content Placeholder 4" descr="Chart, bar chart&#10;&#10;Description automatically generated">
             <a:extLst>
               <a:ext uri="{FF2B5EF4-FFF2-40B4-BE49-F238E27FC236}">
-                <a16:creationId xmlns:a16="http://schemas.microsoft.com/office/drawing/2014/main" id="{B4665059-3309-410A-9105-66954663C62C}"/>
+                <a16:creationId xmlns:a16="http://schemas.microsoft.com/office/drawing/2014/main" xmlns="" id="{B4665059-3309-410A-9105-66954663C62C}"/>
               </a:ext>
             </a:extLst>
           </p:cNvPr>
@@ -15997,7 +16091,7 @@
           </p:nvPr>
         </p:nvPicPr>
         <p:blipFill>
-          <a:blip r:embed="rId2">
+          <a:blip r:embed="rId2" cstate="print">
             <a:extLst>
               <a:ext uri="{28A0092B-C50C-407E-A947-70E740481C1C}">
                 <a14:useLocalDpi xmlns:a14="http://schemas.microsoft.com/office/drawing/2010/main" val="0"/>
@@ -16050,7 +16144,7 @@
           <p:cNvPr id="2" name="Title 1">
             <a:extLst>
               <a:ext uri="{FF2B5EF4-FFF2-40B4-BE49-F238E27FC236}">
-                <a16:creationId xmlns:a16="http://schemas.microsoft.com/office/drawing/2014/main" id="{B173BA98-212F-4621-B7F5-B71C2DCBA31A}"/>
+                <a16:creationId xmlns:a16="http://schemas.microsoft.com/office/drawing/2014/main" xmlns="" id="{B173BA98-212F-4621-B7F5-B71C2DCBA31A}"/>
               </a:ext>
             </a:extLst>
           </p:cNvPr>
@@ -16078,7 +16172,7 @@
           <p:cNvPr id="3" name="Content Placeholder 2">
             <a:extLst>
               <a:ext uri="{FF2B5EF4-FFF2-40B4-BE49-F238E27FC236}">
-                <a16:creationId xmlns:a16="http://schemas.microsoft.com/office/drawing/2014/main" id="{DFCEA270-C611-4CFE-9C00-D1C7A43458D5}"/>
+                <a16:creationId xmlns:a16="http://schemas.microsoft.com/office/drawing/2014/main" xmlns="" id="{DFCEA270-C611-4CFE-9C00-D1C7A43458D5}"/>
               </a:ext>
             </a:extLst>
           </p:cNvPr>
@@ -16102,6 +16196,185 @@
     <p:extLst>
       <p:ext uri="{BB962C8B-B14F-4D97-AF65-F5344CB8AC3E}">
         <p14:creationId xmlns:p14="http://schemas.microsoft.com/office/powerpoint/2010/main" val="1235116700"/>
+      </p:ext>
+    </p:extLst>
+  </p:cSld>
+  <p:clrMapOvr>
+    <a:masterClrMapping/>
+  </p:clrMapOvr>
+</p:sld>
+</file>
+
+<file path=ppt/slides/slide17.xml><?xml version="1.0" encoding="utf-8"?>
+<p:sld xmlns:a="http://schemas.openxmlformats.org/drawingml/2006/main" xmlns:r="http://schemas.openxmlformats.org/officeDocument/2006/relationships" xmlns:p="http://schemas.openxmlformats.org/presentationml/2006/main">
+  <p:cSld>
+    <p:spTree>
+      <p:nvGrpSpPr>
+        <p:cNvPr id="1" name=""/>
+        <p:cNvGrpSpPr/>
+        <p:nvPr/>
+      </p:nvGrpSpPr>
+      <p:grpSpPr>
+        <a:xfrm>
+          <a:off x="0" y="0"/>
+          <a:ext cx="0" cy="0"/>
+          <a:chOff x="0" y="0"/>
+          <a:chExt cx="0" cy="0"/>
+        </a:xfrm>
+      </p:grpSpPr>
+      <p:sp>
+        <p:nvSpPr>
+          <p:cNvPr id="2" name="Title 1">
+            <a:extLst>
+              <a:ext uri="{FF2B5EF4-FFF2-40B4-BE49-F238E27FC236}">
+                <a16:creationId xmlns:a16="http://schemas.microsoft.com/office/drawing/2014/main" xmlns="" id="{B173BA98-212F-4621-B7F5-B71C2DCBA31A}"/>
+              </a:ext>
+            </a:extLst>
+          </p:cNvPr>
+          <p:cNvSpPr>
+            <a:spLocks noGrp="1"/>
+          </p:cNvSpPr>
+          <p:nvPr>
+            <p:ph type="title"/>
+          </p:nvPr>
+        </p:nvSpPr>
+        <p:spPr/>
+        <p:txBody>
+          <a:bodyPr/>
+          <a:lstStyle/>
+          <a:p>
+            <a:r>
+              <a:rPr lang="en-US" dirty="0" smtClean="0"/>
+              <a:t>Global Findings</a:t>
+            </a:r>
+            <a:endParaRPr lang="en-US" dirty="0"/>
+          </a:p>
+        </p:txBody>
+      </p:sp>
+      <p:sp>
+        <p:nvSpPr>
+          <p:cNvPr id="3" name="Content Placeholder 2">
+            <a:extLst>
+              <a:ext uri="{FF2B5EF4-FFF2-40B4-BE49-F238E27FC236}">
+                <a16:creationId xmlns:a16="http://schemas.microsoft.com/office/drawing/2014/main" xmlns="" id="{DFCEA270-C611-4CFE-9C00-D1C7A43458D5}"/>
+              </a:ext>
+            </a:extLst>
+          </p:cNvPr>
+          <p:cNvSpPr>
+            <a:spLocks noGrp="1"/>
+          </p:cNvSpPr>
+          <p:nvPr>
+            <p:ph idx="1"/>
+          </p:nvPr>
+        </p:nvSpPr>
+        <p:spPr>
+          <a:xfrm>
+            <a:off x="1103312" y="1415332"/>
+            <a:ext cx="8946541" cy="4833067"/>
+          </a:xfrm>
+        </p:spPr>
+        <p:txBody>
+          <a:bodyPr>
+            <a:normAutofit/>
+          </a:bodyPr>
+          <a:lstStyle/>
+          <a:p>
+            <a:r>
+              <a:rPr lang="en-US" dirty="0" smtClean="0"/>
+              <a:t>Underr</a:t>
+            </a:r>
+            <a:r>
+              <a:rPr lang="en-US" dirty="0" smtClean="0"/>
+              <a:t>eporting skews the numbers</a:t>
+            </a:r>
+            <a:endParaRPr lang="en-US" dirty="0" smtClean="0"/>
+          </a:p>
+          <a:p>
+            <a:r>
+              <a:rPr lang="en-US" dirty="0" smtClean="0"/>
+              <a:t>Lack of access to medical treatment may boost death rates</a:t>
+            </a:r>
+          </a:p>
+          <a:p>
+            <a:r>
+              <a:rPr lang="en-US" dirty="0" smtClean="0"/>
+              <a:t>United States (1.78%) death per case ratio lower than global ratio (2.01%)</a:t>
+            </a:r>
+          </a:p>
+          <a:p>
+            <a:pPr lvl="1"/>
+            <a:r>
+              <a:rPr lang="en-US" dirty="0" smtClean="0"/>
+              <a:t>Global ratio is driven up slightly by outliers</a:t>
+            </a:r>
+          </a:p>
+          <a:p>
+            <a:r>
+              <a:rPr lang="en-US" dirty="0" smtClean="0"/>
+              <a:t>Suggested action: </a:t>
+            </a:r>
+          </a:p>
+          <a:p>
+            <a:pPr lvl="1"/>
+            <a:r>
+              <a:rPr lang="en-US" dirty="0" smtClean="0"/>
+              <a:t>Countries with 3.5% &lt; ratio &gt; 2% </a:t>
+            </a:r>
+          </a:p>
+          <a:p>
+            <a:pPr lvl="2"/>
+            <a:r>
+              <a:rPr lang="en-US" dirty="0" smtClean="0"/>
+              <a:t>Hard push for vaccination</a:t>
+            </a:r>
+          </a:p>
+          <a:p>
+            <a:pPr lvl="2"/>
+            <a:r>
+              <a:rPr lang="en-US" dirty="0" smtClean="0"/>
+              <a:t>Continued masking and social distancing </a:t>
+            </a:r>
+          </a:p>
+          <a:p>
+            <a:pPr lvl="1"/>
+            <a:r>
+              <a:rPr lang="en-US" dirty="0" smtClean="0"/>
+              <a:t>Countries with ratio &gt; 3.5%</a:t>
+            </a:r>
+          </a:p>
+          <a:p>
+            <a:pPr lvl="2"/>
+            <a:r>
+              <a:rPr lang="en-US" dirty="0" smtClean="0"/>
+              <a:t>Hard push for vaccination</a:t>
+            </a:r>
+          </a:p>
+          <a:p>
+            <a:pPr lvl="2"/>
+            <a:r>
+              <a:rPr lang="en-US" dirty="0" smtClean="0"/>
+              <a:t>Lockdown, if possible</a:t>
+            </a:r>
+            <a:endParaRPr lang="en-US" dirty="0" smtClean="0"/>
+          </a:p>
+          <a:p>
+            <a:pPr marL="0" indent="0">
+              <a:buNone/>
+            </a:pPr>
+            <a:endParaRPr lang="en-US" dirty="0" smtClean="0"/>
+          </a:p>
+          <a:p>
+            <a:pPr marL="0" indent="0">
+              <a:buNone/>
+            </a:pPr>
+            <a:endParaRPr lang="en-US" dirty="0"/>
+          </a:p>
+        </p:txBody>
+      </p:sp>
+    </p:spTree>
+    <p:extLst>
+      <p:ext uri="{BB962C8B-B14F-4D97-AF65-F5344CB8AC3E}">
+        <p14:creationId xmlns:p14="http://schemas.microsoft.com/office/powerpoint/2010/main" val="3561580519"/>
       </p:ext>
     </p:extLst>
   </p:cSld>
@@ -16141,10 +16414,10 @@
           <p:cNvPr id="9" name="Rectangle 8">
             <a:extLst>
               <a:ext uri="{FF2B5EF4-FFF2-40B4-BE49-F238E27FC236}">
-                <a16:creationId xmlns:a16="http://schemas.microsoft.com/office/drawing/2014/main" id="{F747F1B4-B831-4277-8AB0-32767F7EB7BF}"/>
+                <a16:creationId xmlns:a16="http://schemas.microsoft.com/office/drawing/2014/main" xmlns="" id="{F747F1B4-B831-4277-8AB0-32767F7EB7BF}"/>
               </a:ext>
               <a:ext uri="{C183D7F6-B498-43B3-948B-1728B52AA6E4}">
-                <adec:decorative xmlns:adec="http://schemas.microsoft.com/office/drawing/2017/decorative" val="1"/>
+                <adec:decorative xmlns:adec="http://schemas.microsoft.com/office/drawing/2017/decorative" xmlns="" val="1"/>
               </a:ext>
             </a:extLst>
           </p:cNvPr>
@@ -16154,7 +16427,7 @@
           <p:nvPr>
             <p:extLst>
               <p:ext uri="{386F3935-93C4-4BCD-93E2-E3B085C9AB24}">
-                <p16:designElem xmlns:p16="http://schemas.microsoft.com/office/powerpoint/2015/main" val="1"/>
+                <p16:designElem xmlns:p16="http://schemas.microsoft.com/office/powerpoint/2015/main" xmlns="" val="1"/>
               </p:ext>
             </p:extLst>
           </p:nvPr>
@@ -16201,10 +16474,10 @@
           <p:cNvPr id="11" name="Freeform 7">
             <a:extLst>
               <a:ext uri="{FF2B5EF4-FFF2-40B4-BE49-F238E27FC236}">
-                <a16:creationId xmlns:a16="http://schemas.microsoft.com/office/drawing/2014/main" id="{D80CFA21-AB7C-4BEB-9BFF-05764FBBF3C6}"/>
+                <a16:creationId xmlns:a16="http://schemas.microsoft.com/office/drawing/2014/main" xmlns="" id="{D80CFA21-AB7C-4BEB-9BFF-05764FBBF3C6}"/>
               </a:ext>
               <a:ext uri="{C183D7F6-B498-43B3-948B-1728B52AA6E4}">
-                <adec:decorative xmlns:adec="http://schemas.microsoft.com/office/drawing/2017/decorative" val="1"/>
+                <adec:decorative xmlns:adec="http://schemas.microsoft.com/office/drawing/2017/decorative" xmlns="" val="1"/>
               </a:ext>
             </a:extLst>
           </p:cNvPr>
@@ -16214,7 +16487,7 @@
           <p:nvPr>
             <p:extLst>
               <p:ext uri="{386F3935-93C4-4BCD-93E2-E3B085C9AB24}">
-                <p16:designElem xmlns:p16="http://schemas.microsoft.com/office/powerpoint/2015/main" val="1"/>
+                <p16:designElem xmlns:p16="http://schemas.microsoft.com/office/powerpoint/2015/main" xmlns="" val="1"/>
               </p:ext>
             </p:extLst>
           </p:nvPr>
@@ -16565,7 +16838,7 @@
           <p:cNvPr id="2" name="Title 1">
             <a:extLst>
               <a:ext uri="{FF2B5EF4-FFF2-40B4-BE49-F238E27FC236}">
-                <a16:creationId xmlns:a16="http://schemas.microsoft.com/office/drawing/2014/main" id="{3C8BFDA4-479D-4A5F-9ED8-82EE43FF73C8}"/>
+                <a16:creationId xmlns:a16="http://schemas.microsoft.com/office/drawing/2014/main" xmlns="" id="{3C8BFDA4-479D-4A5F-9ED8-82EE43FF73C8}"/>
               </a:ext>
             </a:extLst>
           </p:cNvPr>
@@ -16604,10 +16877,10 @@
           <p:cNvPr id="13" name="Rectangle 12">
             <a:extLst>
               <a:ext uri="{FF2B5EF4-FFF2-40B4-BE49-F238E27FC236}">
-                <a16:creationId xmlns:a16="http://schemas.microsoft.com/office/drawing/2014/main" id="{12F7E335-851A-4CAE-B09F-E657819D4600}"/>
+                <a16:creationId xmlns:a16="http://schemas.microsoft.com/office/drawing/2014/main" xmlns="" id="{12F7E335-851A-4CAE-B09F-E657819D4600}"/>
               </a:ext>
               <a:ext uri="{C183D7F6-B498-43B3-948B-1728B52AA6E4}">
-                <adec:decorative xmlns:adec="http://schemas.microsoft.com/office/drawing/2017/decorative" val="1"/>
+                <adec:decorative xmlns:adec="http://schemas.microsoft.com/office/drawing/2017/decorative" xmlns="" val="1"/>
               </a:ext>
             </a:extLst>
           </p:cNvPr>
@@ -16617,7 +16890,7 @@
           <p:nvPr>
             <p:extLst>
               <p:ext uri="{386F3935-93C4-4BCD-93E2-E3B085C9AB24}">
-                <p16:designElem xmlns:p16="http://schemas.microsoft.com/office/powerpoint/2015/main" val="1"/>
+                <p16:designElem xmlns:p16="http://schemas.microsoft.com/office/powerpoint/2015/main" xmlns="" val="1"/>
               </p:ext>
             </p:extLst>
           </p:nvPr>
@@ -16657,10 +16930,10 @@
           <p:cNvPr id="15" name="Freeform: Shape 14">
             <a:extLst>
               <a:ext uri="{FF2B5EF4-FFF2-40B4-BE49-F238E27FC236}">
-                <a16:creationId xmlns:a16="http://schemas.microsoft.com/office/drawing/2014/main" id="{10B541F0-7F6E-402E-84D8-CF96EACA5FBC}"/>
+                <a16:creationId xmlns:a16="http://schemas.microsoft.com/office/drawing/2014/main" xmlns="" id="{10B541F0-7F6E-402E-84D8-CF96EACA5FBC}"/>
               </a:ext>
               <a:ext uri="{C183D7F6-B498-43B3-948B-1728B52AA6E4}">
-                <adec:decorative xmlns:adec="http://schemas.microsoft.com/office/drawing/2017/decorative" val="1"/>
+                <adec:decorative xmlns:adec="http://schemas.microsoft.com/office/drawing/2017/decorative" xmlns="" val="1"/>
               </a:ext>
             </a:extLst>
           </p:cNvPr>
@@ -16670,7 +16943,7 @@
           <p:nvPr>
             <p:extLst>
               <p:ext uri="{386F3935-93C4-4BCD-93E2-E3B085C9AB24}">
-                <p16:designElem xmlns:p16="http://schemas.microsoft.com/office/powerpoint/2015/main" val="1"/>
+                <p16:designElem xmlns:p16="http://schemas.microsoft.com/office/powerpoint/2015/main" xmlns="" val="1"/>
               </p:ext>
             </p:extLst>
           </p:nvPr>
@@ -17155,7 +17428,7 @@
           <p:cNvPr id="5" name="Content Placeholder 2">
             <a:extLst>
               <a:ext uri="{FF2B5EF4-FFF2-40B4-BE49-F238E27FC236}">
-                <a16:creationId xmlns:a16="http://schemas.microsoft.com/office/drawing/2014/main" id="{A2D08B7C-073D-441B-BE52-43F2DDDCF7A9}"/>
+                <a16:creationId xmlns:a16="http://schemas.microsoft.com/office/drawing/2014/main" xmlns="" id="{A2D08B7C-073D-441B-BE52-43F2DDDCF7A9}"/>
               </a:ext>
             </a:extLst>
           </p:cNvPr>
@@ -17224,10 +17497,10 @@
           <p:cNvPr id="9" name="Rectangle 8">
             <a:extLst>
               <a:ext uri="{FF2B5EF4-FFF2-40B4-BE49-F238E27FC236}">
-                <a16:creationId xmlns:a16="http://schemas.microsoft.com/office/drawing/2014/main" id="{F747F1B4-B831-4277-8AB0-32767F7EB7BF}"/>
+                <a16:creationId xmlns:a16="http://schemas.microsoft.com/office/drawing/2014/main" xmlns="" id="{F747F1B4-B831-4277-8AB0-32767F7EB7BF}"/>
               </a:ext>
               <a:ext uri="{C183D7F6-B498-43B3-948B-1728B52AA6E4}">
-                <adec:decorative xmlns:adec="http://schemas.microsoft.com/office/drawing/2017/decorative" val="1"/>
+                <adec:decorative xmlns:adec="http://schemas.microsoft.com/office/drawing/2017/decorative" xmlns="" val="1"/>
               </a:ext>
             </a:extLst>
           </p:cNvPr>
@@ -17237,7 +17510,7 @@
           <p:nvPr>
             <p:extLst>
               <p:ext uri="{386F3935-93C4-4BCD-93E2-E3B085C9AB24}">
-                <p16:designElem xmlns:p16="http://schemas.microsoft.com/office/powerpoint/2015/main" val="1"/>
+                <p16:designElem xmlns:p16="http://schemas.microsoft.com/office/powerpoint/2015/main" xmlns="" val="1"/>
               </p:ext>
             </p:extLst>
           </p:nvPr>
@@ -17284,10 +17557,10 @@
           <p:cNvPr id="11" name="Freeform 7">
             <a:extLst>
               <a:ext uri="{FF2B5EF4-FFF2-40B4-BE49-F238E27FC236}">
-                <a16:creationId xmlns:a16="http://schemas.microsoft.com/office/drawing/2014/main" id="{D80CFA21-AB7C-4BEB-9BFF-05764FBBF3C6}"/>
+                <a16:creationId xmlns:a16="http://schemas.microsoft.com/office/drawing/2014/main" xmlns="" id="{D80CFA21-AB7C-4BEB-9BFF-05764FBBF3C6}"/>
               </a:ext>
               <a:ext uri="{C183D7F6-B498-43B3-948B-1728B52AA6E4}">
-                <adec:decorative xmlns:adec="http://schemas.microsoft.com/office/drawing/2017/decorative" val="1"/>
+                <adec:decorative xmlns:adec="http://schemas.microsoft.com/office/drawing/2017/decorative" xmlns="" val="1"/>
               </a:ext>
             </a:extLst>
           </p:cNvPr>
@@ -17297,7 +17570,7 @@
           <p:nvPr>
             <p:extLst>
               <p:ext uri="{386F3935-93C4-4BCD-93E2-E3B085C9AB24}">
-                <p16:designElem xmlns:p16="http://schemas.microsoft.com/office/powerpoint/2015/main" val="1"/>
+                <p16:designElem xmlns:p16="http://schemas.microsoft.com/office/powerpoint/2015/main" xmlns="" val="1"/>
               </p:ext>
             </p:extLst>
           </p:nvPr>
@@ -17648,7 +17921,7 @@
           <p:cNvPr id="2" name="Title 1">
             <a:extLst>
               <a:ext uri="{FF2B5EF4-FFF2-40B4-BE49-F238E27FC236}">
-                <a16:creationId xmlns:a16="http://schemas.microsoft.com/office/drawing/2014/main" id="{3D58399E-D226-453C-9790-F8944ABAC268}"/>
+                <a16:creationId xmlns:a16="http://schemas.microsoft.com/office/drawing/2014/main" xmlns="" id="{3D58399E-D226-453C-9790-F8944ABAC268}"/>
               </a:ext>
             </a:extLst>
           </p:cNvPr>
@@ -17687,10 +17960,10 @@
           <p:cNvPr id="13" name="Rectangle 12">
             <a:extLst>
               <a:ext uri="{FF2B5EF4-FFF2-40B4-BE49-F238E27FC236}">
-                <a16:creationId xmlns:a16="http://schemas.microsoft.com/office/drawing/2014/main" id="{12F7E335-851A-4CAE-B09F-E657819D4600}"/>
+                <a16:creationId xmlns:a16="http://schemas.microsoft.com/office/drawing/2014/main" xmlns="" id="{12F7E335-851A-4CAE-B09F-E657819D4600}"/>
               </a:ext>
               <a:ext uri="{C183D7F6-B498-43B3-948B-1728B52AA6E4}">
-                <adec:decorative xmlns:adec="http://schemas.microsoft.com/office/drawing/2017/decorative" val="1"/>
+                <adec:decorative xmlns:adec="http://schemas.microsoft.com/office/drawing/2017/decorative" xmlns="" val="1"/>
               </a:ext>
             </a:extLst>
           </p:cNvPr>
@@ -17700,7 +17973,7 @@
           <p:nvPr>
             <p:extLst>
               <p:ext uri="{386F3935-93C4-4BCD-93E2-E3B085C9AB24}">
-                <p16:designElem xmlns:p16="http://schemas.microsoft.com/office/powerpoint/2015/main" val="1"/>
+                <p16:designElem xmlns:p16="http://schemas.microsoft.com/office/powerpoint/2015/main" xmlns="" val="1"/>
               </p:ext>
             </p:extLst>
           </p:nvPr>
@@ -17740,10 +18013,10 @@
           <p:cNvPr id="15" name="Freeform: Shape 14">
             <a:extLst>
               <a:ext uri="{FF2B5EF4-FFF2-40B4-BE49-F238E27FC236}">
-                <a16:creationId xmlns:a16="http://schemas.microsoft.com/office/drawing/2014/main" id="{10B541F0-7F6E-402E-84D8-CF96EACA5FBC}"/>
+                <a16:creationId xmlns:a16="http://schemas.microsoft.com/office/drawing/2014/main" xmlns="" id="{10B541F0-7F6E-402E-84D8-CF96EACA5FBC}"/>
               </a:ext>
               <a:ext uri="{C183D7F6-B498-43B3-948B-1728B52AA6E4}">
-                <adec:decorative xmlns:adec="http://schemas.microsoft.com/office/drawing/2017/decorative" val="1"/>
+                <adec:decorative xmlns:adec="http://schemas.microsoft.com/office/drawing/2017/decorative" xmlns="" val="1"/>
               </a:ext>
             </a:extLst>
           </p:cNvPr>
@@ -17753,7 +18026,7 @@
           <p:nvPr>
             <p:extLst>
               <p:ext uri="{386F3935-93C4-4BCD-93E2-E3B085C9AB24}">
-                <p16:designElem xmlns:p16="http://schemas.microsoft.com/office/powerpoint/2015/main" val="1"/>
+                <p16:designElem xmlns:p16="http://schemas.microsoft.com/office/powerpoint/2015/main" xmlns="" val="1"/>
               </p:ext>
             </p:extLst>
           </p:nvPr>
@@ -18238,7 +18511,7 @@
           <p:cNvPr id="5" name="Content Placeholder 2">
             <a:extLst>
               <a:ext uri="{FF2B5EF4-FFF2-40B4-BE49-F238E27FC236}">
-                <a16:creationId xmlns:a16="http://schemas.microsoft.com/office/drawing/2014/main" id="{06D07957-5808-4F93-8BFA-7B88B9E9F6AC}"/>
+                <a16:creationId xmlns:a16="http://schemas.microsoft.com/office/drawing/2014/main" xmlns="" id="{06D07957-5808-4F93-8BFA-7B88B9E9F6AC}"/>
               </a:ext>
             </a:extLst>
           </p:cNvPr>
@@ -18307,10 +18580,10 @@
           <p:cNvPr id="21" name="Picture 20">
             <a:extLst>
               <a:ext uri="{FF2B5EF4-FFF2-40B4-BE49-F238E27FC236}">
-                <a16:creationId xmlns:a16="http://schemas.microsoft.com/office/drawing/2014/main" id="{41B68C77-138E-4BF7-A276-BD0C78A4219F}"/>
+                <a16:creationId xmlns:a16="http://schemas.microsoft.com/office/drawing/2014/main" xmlns="" id="{41B68C77-138E-4BF7-A276-BD0C78A4219F}"/>
               </a:ext>
               <a:ext uri="{C183D7F6-B498-43B3-948B-1728B52AA6E4}">
-                <adec:decorative xmlns:adec="http://schemas.microsoft.com/office/drawing/2017/decorative" val="1"/>
+                <adec:decorative xmlns:adec="http://schemas.microsoft.com/office/drawing/2017/decorative" xmlns="" val="1"/>
               </a:ext>
             </a:extLst>
           </p:cNvPr>
@@ -18320,7 +18593,7 @@
           <p:nvPr>
             <p:extLst>
               <p:ext uri="{386F3935-93C4-4BCD-93E2-E3B085C9AB24}">
-                <p16:designElem xmlns:p16="http://schemas.microsoft.com/office/powerpoint/2015/main" val="1"/>
+                <p16:designElem xmlns:p16="http://schemas.microsoft.com/office/powerpoint/2015/main" xmlns="" val="1"/>
               </p:ext>
             </p:extLst>
           </p:nvPr>
@@ -18351,10 +18624,10 @@
           <p:cNvPr id="23" name="Picture 22">
             <a:extLst>
               <a:ext uri="{FF2B5EF4-FFF2-40B4-BE49-F238E27FC236}">
-                <a16:creationId xmlns:a16="http://schemas.microsoft.com/office/drawing/2014/main" id="{7C268552-D473-46ED-B1B8-422042C4DEF1}"/>
+                <a16:creationId xmlns:a16="http://schemas.microsoft.com/office/drawing/2014/main" xmlns="" id="{7C268552-D473-46ED-B1B8-422042C4DEF1}"/>
               </a:ext>
               <a:ext uri="{C183D7F6-B498-43B3-948B-1728B52AA6E4}">
-                <adec:decorative xmlns:adec="http://schemas.microsoft.com/office/drawing/2017/decorative" val="1"/>
+                <adec:decorative xmlns:adec="http://schemas.microsoft.com/office/drawing/2017/decorative" xmlns="" val="1"/>
               </a:ext>
             </a:extLst>
           </p:cNvPr>
@@ -18364,7 +18637,7 @@
           <p:nvPr>
             <p:extLst>
               <p:ext uri="{386F3935-93C4-4BCD-93E2-E3B085C9AB24}">
-                <p16:designElem xmlns:p16="http://schemas.microsoft.com/office/powerpoint/2015/main" val="1"/>
+                <p16:designElem xmlns:p16="http://schemas.microsoft.com/office/powerpoint/2015/main" xmlns="" val="1"/>
               </p:ext>
             </p:extLst>
           </p:nvPr>
@@ -18395,10 +18668,10 @@
           <p:cNvPr id="25" name="Oval 24">
             <a:extLst>
               <a:ext uri="{FF2B5EF4-FFF2-40B4-BE49-F238E27FC236}">
-                <a16:creationId xmlns:a16="http://schemas.microsoft.com/office/drawing/2014/main" id="{4AC0CD9D-7610-4620-93B4-798CCD9AB581}"/>
+                <a16:creationId xmlns:a16="http://schemas.microsoft.com/office/drawing/2014/main" xmlns="" id="{4AC0CD9D-7610-4620-93B4-798CCD9AB581}"/>
               </a:ext>
               <a:ext uri="{C183D7F6-B498-43B3-948B-1728B52AA6E4}">
-                <adec:decorative xmlns:adec="http://schemas.microsoft.com/office/drawing/2017/decorative" val="1"/>
+                <adec:decorative xmlns:adec="http://schemas.microsoft.com/office/drawing/2017/decorative" xmlns="" val="1"/>
               </a:ext>
             </a:extLst>
           </p:cNvPr>
@@ -18408,7 +18681,7 @@
           <p:nvPr>
             <p:extLst>
               <p:ext uri="{386F3935-93C4-4BCD-93E2-E3B085C9AB24}">
-                <p16:designElem xmlns:p16="http://schemas.microsoft.com/office/powerpoint/2015/main" val="1"/>
+                <p16:designElem xmlns:p16="http://schemas.microsoft.com/office/powerpoint/2015/main" xmlns="" val="1"/>
               </p:ext>
             </p:extLst>
           </p:nvPr>
@@ -18475,10 +18748,10 @@
           <p:cNvPr id="27" name="Picture 26">
             <a:extLst>
               <a:ext uri="{FF2B5EF4-FFF2-40B4-BE49-F238E27FC236}">
-                <a16:creationId xmlns:a16="http://schemas.microsoft.com/office/drawing/2014/main" id="{B9238B3E-24AA-439A-B527-6C5DF6D72145}"/>
+                <a16:creationId xmlns:a16="http://schemas.microsoft.com/office/drawing/2014/main" xmlns="" id="{B9238B3E-24AA-439A-B527-6C5DF6D72145}"/>
               </a:ext>
               <a:ext uri="{C183D7F6-B498-43B3-948B-1728B52AA6E4}">
-                <adec:decorative xmlns:adec="http://schemas.microsoft.com/office/drawing/2017/decorative" val="1"/>
+                <adec:decorative xmlns:adec="http://schemas.microsoft.com/office/drawing/2017/decorative" xmlns="" val="1"/>
               </a:ext>
             </a:extLst>
           </p:cNvPr>
@@ -18488,7 +18761,7 @@
           <p:nvPr>
             <p:extLst>
               <p:ext uri="{386F3935-93C4-4BCD-93E2-E3B085C9AB24}">
-                <p16:designElem xmlns:p16="http://schemas.microsoft.com/office/powerpoint/2015/main" val="1"/>
+                <p16:designElem xmlns:p16="http://schemas.microsoft.com/office/powerpoint/2015/main" xmlns="" val="1"/>
               </p:ext>
             </p:extLst>
           </p:nvPr>
@@ -18519,10 +18792,10 @@
           <p:cNvPr id="29" name="Picture 28">
             <a:extLst>
               <a:ext uri="{FF2B5EF4-FFF2-40B4-BE49-F238E27FC236}">
-                <a16:creationId xmlns:a16="http://schemas.microsoft.com/office/drawing/2014/main" id="{69F01145-BEA3-4CBF-AA21-10077B948CA8}"/>
+                <a16:creationId xmlns:a16="http://schemas.microsoft.com/office/drawing/2014/main" xmlns="" id="{69F01145-BEA3-4CBF-AA21-10077B948CA8}"/>
               </a:ext>
               <a:ext uri="{C183D7F6-B498-43B3-948B-1728B52AA6E4}">
-                <adec:decorative xmlns:adec="http://schemas.microsoft.com/office/drawing/2017/decorative" val="1"/>
+                <adec:decorative xmlns:adec="http://schemas.microsoft.com/office/drawing/2017/decorative" xmlns="" val="1"/>
               </a:ext>
             </a:extLst>
           </p:cNvPr>
@@ -18532,7 +18805,7 @@
           <p:nvPr>
             <p:extLst>
               <p:ext uri="{386F3935-93C4-4BCD-93E2-E3B085C9AB24}">
-                <p16:designElem xmlns:p16="http://schemas.microsoft.com/office/powerpoint/2015/main" val="1"/>
+                <p16:designElem xmlns:p16="http://schemas.microsoft.com/office/powerpoint/2015/main" xmlns="" val="1"/>
               </p:ext>
             </p:extLst>
           </p:nvPr>
@@ -18563,10 +18836,10 @@
           <p:cNvPr id="31" name="Rectangle 30">
             <a:extLst>
               <a:ext uri="{FF2B5EF4-FFF2-40B4-BE49-F238E27FC236}">
-                <a16:creationId xmlns:a16="http://schemas.microsoft.com/office/drawing/2014/main" id="{DE4D62F9-188E-4530-84C2-24BDEE4BEB82}"/>
+                <a16:creationId xmlns:a16="http://schemas.microsoft.com/office/drawing/2014/main" xmlns="" id="{DE4D62F9-188E-4530-84C2-24BDEE4BEB82}"/>
               </a:ext>
               <a:ext uri="{C183D7F6-B498-43B3-948B-1728B52AA6E4}">
-                <adec:decorative xmlns:adec="http://schemas.microsoft.com/office/drawing/2017/decorative" val="1"/>
+                <adec:decorative xmlns:adec="http://schemas.microsoft.com/office/drawing/2017/decorative" xmlns="" val="1"/>
               </a:ext>
             </a:extLst>
           </p:cNvPr>
@@ -18576,7 +18849,7 @@
           <p:nvPr>
             <p:extLst>
               <p:ext uri="{386F3935-93C4-4BCD-93E2-E3B085C9AB24}">
-                <p16:designElem xmlns:p16="http://schemas.microsoft.com/office/powerpoint/2015/main" val="1"/>
+                <p16:designElem xmlns:p16="http://schemas.microsoft.com/office/powerpoint/2015/main" xmlns="" val="1"/>
               </p:ext>
             </p:extLst>
           </p:nvPr>
@@ -18616,10 +18889,10 @@
           <p:cNvPr id="33" name="Rectangle 32">
             <a:extLst>
               <a:ext uri="{FF2B5EF4-FFF2-40B4-BE49-F238E27FC236}">
-                <a16:creationId xmlns:a16="http://schemas.microsoft.com/office/drawing/2014/main" id="{C72330AA-E11E-458E-8798-12C7F77383B8}"/>
+                <a16:creationId xmlns:a16="http://schemas.microsoft.com/office/drawing/2014/main" xmlns="" id="{C72330AA-E11E-458E-8798-12C7F77383B8}"/>
               </a:ext>
               <a:ext uri="{C183D7F6-B498-43B3-948B-1728B52AA6E4}">
-                <adec:decorative xmlns:adec="http://schemas.microsoft.com/office/drawing/2017/decorative" val="1"/>
+                <adec:decorative xmlns:adec="http://schemas.microsoft.com/office/drawing/2017/decorative" xmlns="" val="1"/>
               </a:ext>
             </a:extLst>
           </p:cNvPr>
@@ -18629,7 +18902,7 @@
           <p:nvPr>
             <p:extLst>
               <p:ext uri="{386F3935-93C4-4BCD-93E2-E3B085C9AB24}">
-                <p16:designElem xmlns:p16="http://schemas.microsoft.com/office/powerpoint/2015/main" val="1"/>
+                <p16:designElem xmlns:p16="http://schemas.microsoft.com/office/powerpoint/2015/main" xmlns="" val="1"/>
               </p:ext>
             </p:extLst>
           </p:nvPr>
@@ -18676,10 +18949,10 @@
           <p:cNvPr id="35" name="Freeform 7">
             <a:extLst>
               <a:ext uri="{FF2B5EF4-FFF2-40B4-BE49-F238E27FC236}">
-                <a16:creationId xmlns:a16="http://schemas.microsoft.com/office/drawing/2014/main" id="{A6BDC1B0-0C91-4230-BFEB-9C8ED19B9A3A}"/>
+                <a16:creationId xmlns:a16="http://schemas.microsoft.com/office/drawing/2014/main" xmlns="" id="{A6BDC1B0-0C91-4230-BFEB-9C8ED19B9A3A}"/>
               </a:ext>
               <a:ext uri="{C183D7F6-B498-43B3-948B-1728B52AA6E4}">
-                <adec:decorative xmlns:adec="http://schemas.microsoft.com/office/drawing/2017/decorative" val="1"/>
+                <adec:decorative xmlns:adec="http://schemas.microsoft.com/office/drawing/2017/decorative" xmlns="" val="1"/>
               </a:ext>
             </a:extLst>
           </p:cNvPr>
@@ -18689,7 +18962,7 @@
           <p:nvPr>
             <p:extLst>
               <p:ext uri="{386F3935-93C4-4BCD-93E2-E3B085C9AB24}">
-                <p16:designElem xmlns:p16="http://schemas.microsoft.com/office/powerpoint/2015/main" val="1"/>
+                <p16:designElem xmlns:p16="http://schemas.microsoft.com/office/powerpoint/2015/main" xmlns="" val="1"/>
               </p:ext>
             </p:extLst>
           </p:nvPr>
@@ -19034,10 +19307,10 @@
           <p:cNvPr id="37" name="Freeform: Shape 36">
             <a:extLst>
               <a:ext uri="{FF2B5EF4-FFF2-40B4-BE49-F238E27FC236}">
-                <a16:creationId xmlns:a16="http://schemas.microsoft.com/office/drawing/2014/main" id="{68E0A26E-4EA8-4E6C-97A2-7B6C1C13F8CF}"/>
+                <a16:creationId xmlns:a16="http://schemas.microsoft.com/office/drawing/2014/main" xmlns="" id="{68E0A26E-4EA8-4E6C-97A2-7B6C1C13F8CF}"/>
               </a:ext>
               <a:ext uri="{C183D7F6-B498-43B3-948B-1728B52AA6E4}">
-                <adec:decorative xmlns:adec="http://schemas.microsoft.com/office/drawing/2017/decorative" val="1"/>
+                <adec:decorative xmlns:adec="http://schemas.microsoft.com/office/drawing/2017/decorative" xmlns="" val="1"/>
               </a:ext>
             </a:extLst>
           </p:cNvPr>
@@ -19047,7 +19320,7 @@
           <p:nvPr>
             <p:extLst>
               <p:ext uri="{386F3935-93C4-4BCD-93E2-E3B085C9AB24}">
-                <p16:designElem xmlns:p16="http://schemas.microsoft.com/office/powerpoint/2015/main" val="1"/>
+                <p16:designElem xmlns:p16="http://schemas.microsoft.com/office/powerpoint/2015/main" xmlns="" val="1"/>
               </p:ext>
             </p:extLst>
           </p:nvPr>
@@ -19497,10 +19770,10 @@
           <p:cNvPr id="39" name="Rectangle 38">
             <a:extLst>
               <a:ext uri="{FF2B5EF4-FFF2-40B4-BE49-F238E27FC236}">
-                <a16:creationId xmlns:a16="http://schemas.microsoft.com/office/drawing/2014/main" id="{C1841CC0-B7A9-4828-B82F-9C6B433BDCAE}"/>
+                <a16:creationId xmlns:a16="http://schemas.microsoft.com/office/drawing/2014/main" xmlns="" id="{C1841CC0-B7A9-4828-B82F-9C6B433BDCAE}"/>
               </a:ext>
               <a:ext uri="{C183D7F6-B498-43B3-948B-1728B52AA6E4}">
-                <adec:decorative xmlns:adec="http://schemas.microsoft.com/office/drawing/2017/decorative" val="1"/>
+                <adec:decorative xmlns:adec="http://schemas.microsoft.com/office/drawing/2017/decorative" xmlns="" val="1"/>
               </a:ext>
             </a:extLst>
           </p:cNvPr>
@@ -19510,7 +19783,7 @@
           <p:nvPr>
             <p:extLst>
               <p:ext uri="{386F3935-93C4-4BCD-93E2-E3B085C9AB24}">
-                <p16:designElem xmlns:p16="http://schemas.microsoft.com/office/powerpoint/2015/main" val="1"/>
+                <p16:designElem xmlns:p16="http://schemas.microsoft.com/office/powerpoint/2015/main" xmlns="" val="1"/>
               </p:ext>
             </p:extLst>
           </p:nvPr>
@@ -19550,10 +19823,10 @@
           <p:cNvPr id="41" name="Group 40">
             <a:extLst>
               <a:ext uri="{FF2B5EF4-FFF2-40B4-BE49-F238E27FC236}">
-                <a16:creationId xmlns:a16="http://schemas.microsoft.com/office/drawing/2014/main" id="{08E05919-D800-40FD-A3BD-4B9CC4078E7A}"/>
+                <a16:creationId xmlns:a16="http://schemas.microsoft.com/office/drawing/2014/main" xmlns="" id="{08E05919-D800-40FD-A3BD-4B9CC4078E7A}"/>
               </a:ext>
               <a:ext uri="{C183D7F6-B498-43B3-948B-1728B52AA6E4}">
-                <adec:decorative xmlns:adec="http://schemas.microsoft.com/office/drawing/2017/decorative" val="1"/>
+                <adec:decorative xmlns:adec="http://schemas.microsoft.com/office/drawing/2017/decorative" xmlns="" val="1"/>
               </a:ext>
             </a:extLst>
           </p:cNvPr>
@@ -19563,7 +19836,7 @@
           <p:nvPr>
             <p:extLst>
               <p:ext uri="{386F3935-93C4-4BCD-93E2-E3B085C9AB24}">
-                <p16:designElem xmlns:p16="http://schemas.microsoft.com/office/powerpoint/2015/main" val="1"/>
+                <p16:designElem xmlns:p16="http://schemas.microsoft.com/office/powerpoint/2015/main" xmlns="" val="1"/>
               </p:ext>
             </p:extLst>
           </p:nvPr>
@@ -19581,10 +19854,10 @@
             <p:cNvPr id="42" name="Picture 41">
               <a:extLst>
                 <a:ext uri="{FF2B5EF4-FFF2-40B4-BE49-F238E27FC236}">
-                  <a16:creationId xmlns:a16="http://schemas.microsoft.com/office/drawing/2014/main" id="{DE70C79C-8688-4786-8FCD-43A4B5D5B7DD}"/>
+                  <a16:creationId xmlns:a16="http://schemas.microsoft.com/office/drawing/2014/main" xmlns="" id="{DE70C79C-8688-4786-8FCD-43A4B5D5B7DD}"/>
                 </a:ext>
                 <a:ext uri="{C183D7F6-B498-43B3-948B-1728B52AA6E4}">
-                  <adec:decorative xmlns:adec="http://schemas.microsoft.com/office/drawing/2017/decorative" val="1"/>
+                  <adec:decorative xmlns:adec="http://schemas.microsoft.com/office/drawing/2017/decorative" xmlns="" val="1"/>
                 </a:ext>
               </a:extLst>
             </p:cNvPr>
@@ -19594,7 +19867,7 @@
             <p:nvPr>
               <p:extLst>
                 <p:ext uri="{386F3935-93C4-4BCD-93E2-E3B085C9AB24}">
-                  <p16:designElem xmlns:p16="http://schemas.microsoft.com/office/powerpoint/2015/main" val="1"/>
+                  <p16:designElem xmlns:p16="http://schemas.microsoft.com/office/powerpoint/2015/main" xmlns="" val="1"/>
                 </p:ext>
               </p:extLst>
             </p:nvPr>
@@ -19625,10 +19898,10 @@
             <p:cNvPr id="43" name="Picture 42">
               <a:extLst>
                 <a:ext uri="{FF2B5EF4-FFF2-40B4-BE49-F238E27FC236}">
-                  <a16:creationId xmlns:a16="http://schemas.microsoft.com/office/drawing/2014/main" id="{9A6338A0-2BDA-4E79-A762-AAD8608C0C27}"/>
+                  <a16:creationId xmlns:a16="http://schemas.microsoft.com/office/drawing/2014/main" xmlns="" id="{9A6338A0-2BDA-4E79-A762-AAD8608C0C27}"/>
                 </a:ext>
                 <a:ext uri="{C183D7F6-B498-43B3-948B-1728B52AA6E4}">
-                  <adec:decorative xmlns:adec="http://schemas.microsoft.com/office/drawing/2017/decorative" val="1"/>
+                  <adec:decorative xmlns:adec="http://schemas.microsoft.com/office/drawing/2017/decorative" xmlns="" val="1"/>
                 </a:ext>
               </a:extLst>
             </p:cNvPr>
@@ -19638,7 +19911,7 @@
             <p:nvPr>
               <p:extLst>
                 <p:ext uri="{386F3935-93C4-4BCD-93E2-E3B085C9AB24}">
-                  <p16:designElem xmlns:p16="http://schemas.microsoft.com/office/powerpoint/2015/main" val="1"/>
+                  <p16:designElem xmlns:p16="http://schemas.microsoft.com/office/powerpoint/2015/main" xmlns="" val="1"/>
                 </p:ext>
               </p:extLst>
             </p:nvPr>
@@ -19669,10 +19942,10 @@
             <p:cNvPr id="44" name="Oval 43">
               <a:extLst>
                 <a:ext uri="{FF2B5EF4-FFF2-40B4-BE49-F238E27FC236}">
-                  <a16:creationId xmlns:a16="http://schemas.microsoft.com/office/drawing/2014/main" id="{B685624D-3645-4129-9FF6-0C59DBF23BD3}"/>
+                  <a16:creationId xmlns:a16="http://schemas.microsoft.com/office/drawing/2014/main" xmlns="" id="{B685624D-3645-4129-9FF6-0C59DBF23BD3}"/>
                 </a:ext>
                 <a:ext uri="{C183D7F6-B498-43B3-948B-1728B52AA6E4}">
-                  <adec:decorative xmlns:adec="http://schemas.microsoft.com/office/drawing/2017/decorative" val="1"/>
+                  <adec:decorative xmlns:adec="http://schemas.microsoft.com/office/drawing/2017/decorative" xmlns="" val="1"/>
                 </a:ext>
               </a:extLst>
             </p:cNvPr>
@@ -19680,7 +19953,7 @@
             <p:nvPr>
               <p:extLst>
                 <p:ext uri="{386F3935-93C4-4BCD-93E2-E3B085C9AB24}">
-                  <p16:designElem xmlns:p16="http://schemas.microsoft.com/office/powerpoint/2015/main" val="1"/>
+                  <p16:designElem xmlns:p16="http://schemas.microsoft.com/office/powerpoint/2015/main" xmlns="" val="1"/>
                 </p:ext>
               </p:extLst>
             </p:nvPr>
@@ -19747,10 +20020,10 @@
             <p:cNvPr id="45" name="Picture 44">
               <a:extLst>
                 <a:ext uri="{FF2B5EF4-FFF2-40B4-BE49-F238E27FC236}">
-                  <a16:creationId xmlns:a16="http://schemas.microsoft.com/office/drawing/2014/main" id="{03F24C1B-E4C1-43E7-84B3-DD476F383667}"/>
+                  <a16:creationId xmlns:a16="http://schemas.microsoft.com/office/drawing/2014/main" xmlns="" id="{03F24C1B-E4C1-43E7-84B3-DD476F383667}"/>
                 </a:ext>
                 <a:ext uri="{C183D7F6-B498-43B3-948B-1728B52AA6E4}">
-                  <adec:decorative xmlns:adec="http://schemas.microsoft.com/office/drawing/2017/decorative" val="1"/>
+                  <adec:decorative xmlns:adec="http://schemas.microsoft.com/office/drawing/2017/decorative" xmlns="" val="1"/>
                 </a:ext>
               </a:extLst>
             </p:cNvPr>
@@ -19760,7 +20033,7 @@
             <p:nvPr>
               <p:extLst>
                 <p:ext uri="{386F3935-93C4-4BCD-93E2-E3B085C9AB24}">
-                  <p16:designElem xmlns:p16="http://schemas.microsoft.com/office/powerpoint/2015/main" val="1"/>
+                  <p16:designElem xmlns:p16="http://schemas.microsoft.com/office/powerpoint/2015/main" xmlns="" val="1"/>
                 </p:ext>
               </p:extLst>
             </p:nvPr>
@@ -19791,10 +20064,10 @@
             <p:cNvPr id="46" name="Picture 45">
               <a:extLst>
                 <a:ext uri="{FF2B5EF4-FFF2-40B4-BE49-F238E27FC236}">
-                  <a16:creationId xmlns:a16="http://schemas.microsoft.com/office/drawing/2014/main" id="{8725CE5D-088A-4522-9817-4B485D6E7F83}"/>
+                  <a16:creationId xmlns:a16="http://schemas.microsoft.com/office/drawing/2014/main" xmlns="" id="{8725CE5D-088A-4522-9817-4B485D6E7F83}"/>
                 </a:ext>
                 <a:ext uri="{C183D7F6-B498-43B3-948B-1728B52AA6E4}">
-                  <adec:decorative xmlns:adec="http://schemas.microsoft.com/office/drawing/2017/decorative" val="1"/>
+                  <adec:decorative xmlns:adec="http://schemas.microsoft.com/office/drawing/2017/decorative" xmlns="" val="1"/>
                 </a:ext>
               </a:extLst>
             </p:cNvPr>
@@ -19804,7 +20077,7 @@
             <p:nvPr>
               <p:extLst>
                 <p:ext uri="{386F3935-93C4-4BCD-93E2-E3B085C9AB24}">
-                  <p16:designElem xmlns:p16="http://schemas.microsoft.com/office/powerpoint/2015/main" val="1"/>
+                  <p16:designElem xmlns:p16="http://schemas.microsoft.com/office/powerpoint/2015/main" xmlns="" val="1"/>
                 </p:ext>
               </p:extLst>
             </p:nvPr>
@@ -19836,7 +20109,7 @@
           <p:cNvPr id="2" name="Title 1">
             <a:extLst>
               <a:ext uri="{FF2B5EF4-FFF2-40B4-BE49-F238E27FC236}">
-                <a16:creationId xmlns:a16="http://schemas.microsoft.com/office/drawing/2014/main" id="{DDE24DE7-ACFF-4227-A288-DC4B6D02398F}"/>
+                <a16:creationId xmlns:a16="http://schemas.microsoft.com/office/drawing/2014/main" xmlns="" id="{DDE24DE7-ACFF-4227-A288-DC4B6D02398F}"/>
               </a:ext>
             </a:extLst>
           </p:cNvPr>
@@ -19878,7 +20151,7 @@
           <p:cNvPr id="3" name="Content Placeholder 2">
             <a:extLst>
               <a:ext uri="{FF2B5EF4-FFF2-40B4-BE49-F238E27FC236}">
-                <a16:creationId xmlns:a16="http://schemas.microsoft.com/office/drawing/2014/main" id="{1BF44313-E19B-46ED-8A97-0C5DF06C8E80}"/>
+                <a16:creationId xmlns:a16="http://schemas.microsoft.com/office/drawing/2014/main" xmlns="" id="{1BF44313-E19B-46ED-8A97-0C5DF06C8E80}"/>
               </a:ext>
             </a:extLst>
           </p:cNvPr>
@@ -19923,7 +20196,7 @@
           <p:cNvPr id="7" name="Graphic 6" descr="Marker">
             <a:extLst>
               <a:ext uri="{FF2B5EF4-FFF2-40B4-BE49-F238E27FC236}">
-                <a16:creationId xmlns:a16="http://schemas.microsoft.com/office/drawing/2014/main" id="{B6EB6C55-2B82-431B-A05F-41F3DF765D9F}"/>
+                <a16:creationId xmlns:a16="http://schemas.microsoft.com/office/drawing/2014/main" xmlns="" id="{B6EB6C55-2B82-431B-A05F-41F3DF765D9F}"/>
               </a:ext>
             </a:extLst>
           </p:cNvPr>
@@ -19939,7 +20212,7 @@
                 <a14:useLocalDpi xmlns:a14="http://schemas.microsoft.com/office/drawing/2010/main" val="0"/>
               </a:ext>
               <a:ext uri="{96DAC541-7B7A-43D3-8B79-37D633B846F1}">
-                <asvg:svgBlip xmlns:asvg="http://schemas.microsoft.com/office/drawing/2016/SVG/main" r:embed="rId7"/>
+                <asvg:svgBlip xmlns:asvg="http://schemas.microsoft.com/office/drawing/2016/SVG/main" xmlns="" r:embed="rId7"/>
               </a:ext>
             </a:extLst>
           </a:blip>
@@ -20131,10 +20404,10 @@
           <p:cNvPr id="9" name="Rectangle 8">
             <a:extLst>
               <a:ext uri="{FF2B5EF4-FFF2-40B4-BE49-F238E27FC236}">
-                <a16:creationId xmlns:a16="http://schemas.microsoft.com/office/drawing/2014/main" id="{4E78424C-6FD0-41F8-9CAA-5DC19C42359F}"/>
+                <a16:creationId xmlns:a16="http://schemas.microsoft.com/office/drawing/2014/main" xmlns="" id="{4E78424C-6FD0-41F8-9CAA-5DC19C42359F}"/>
               </a:ext>
               <a:ext uri="{C183D7F6-B498-43B3-948B-1728B52AA6E4}">
-                <adec:decorative xmlns:adec="http://schemas.microsoft.com/office/drawing/2017/decorative" val="1"/>
+                <adec:decorative xmlns:adec="http://schemas.microsoft.com/office/drawing/2017/decorative" xmlns="" val="1"/>
               </a:ext>
             </a:extLst>
           </p:cNvPr>
@@ -20144,7 +20417,7 @@
           <p:nvPr>
             <p:extLst>
               <p:ext uri="{386F3935-93C4-4BCD-93E2-E3B085C9AB24}">
-                <p16:designElem xmlns:p16="http://schemas.microsoft.com/office/powerpoint/2015/main" val="1"/>
+                <p16:designElem xmlns:p16="http://schemas.microsoft.com/office/powerpoint/2015/main" xmlns="" val="1"/>
               </p:ext>
             </p:extLst>
           </p:nvPr>
@@ -20191,7 +20464,7 @@
           <p:cNvPr id="2" name="Title 1">
             <a:extLst>
               <a:ext uri="{FF2B5EF4-FFF2-40B4-BE49-F238E27FC236}">
-                <a16:creationId xmlns:a16="http://schemas.microsoft.com/office/drawing/2014/main" id="{1407B1FD-3B02-4946-84C7-67C9697E16F7}"/>
+                <a16:creationId xmlns:a16="http://schemas.microsoft.com/office/drawing/2014/main" xmlns="" id="{1407B1FD-3B02-4946-84C7-67C9697E16F7}"/>
               </a:ext>
             </a:extLst>
           </p:cNvPr>
@@ -20230,10 +20503,10 @@
           <p:cNvPr id="11" name="Freeform: Shape 10">
             <a:extLst>
               <a:ext uri="{FF2B5EF4-FFF2-40B4-BE49-F238E27FC236}">
-                <a16:creationId xmlns:a16="http://schemas.microsoft.com/office/drawing/2014/main" id="{DD136760-57DC-4301-8BEA-B71AD2D13905}"/>
+                <a16:creationId xmlns:a16="http://schemas.microsoft.com/office/drawing/2014/main" xmlns="" id="{DD136760-57DC-4301-8BEA-B71AD2D13905}"/>
               </a:ext>
               <a:ext uri="{C183D7F6-B498-43B3-948B-1728B52AA6E4}">
-                <adec:decorative xmlns:adec="http://schemas.microsoft.com/office/drawing/2017/decorative" val="1"/>
+                <adec:decorative xmlns:adec="http://schemas.microsoft.com/office/drawing/2017/decorative" xmlns="" val="1"/>
               </a:ext>
             </a:extLst>
           </p:cNvPr>
@@ -20243,7 +20516,7 @@
           <p:nvPr>
             <p:extLst>
               <p:ext uri="{386F3935-93C4-4BCD-93E2-E3B085C9AB24}">
-                <p16:designElem xmlns:p16="http://schemas.microsoft.com/office/powerpoint/2015/main" val="1"/>
+                <p16:designElem xmlns:p16="http://schemas.microsoft.com/office/powerpoint/2015/main" xmlns="" val="1"/>
               </p:ext>
             </p:extLst>
           </p:nvPr>
@@ -20722,10 +20995,10 @@
           <p:cNvPr id="13" name="Freeform 11">
             <a:extLst>
               <a:ext uri="{FF2B5EF4-FFF2-40B4-BE49-F238E27FC236}">
-                <a16:creationId xmlns:a16="http://schemas.microsoft.com/office/drawing/2014/main" id="{BDC58DEA-1307-4F44-AD47-E613D8B76A89}"/>
+                <a16:creationId xmlns:a16="http://schemas.microsoft.com/office/drawing/2014/main" xmlns="" id="{BDC58DEA-1307-4F44-AD47-E613D8B76A89}"/>
               </a:ext>
               <a:ext uri="{C183D7F6-B498-43B3-948B-1728B52AA6E4}">
-                <adec:decorative xmlns:adec="http://schemas.microsoft.com/office/drawing/2017/decorative" val="1"/>
+                <adec:decorative xmlns:adec="http://schemas.microsoft.com/office/drawing/2017/decorative" xmlns="" val="1"/>
               </a:ext>
             </a:extLst>
           </p:cNvPr>
@@ -20735,7 +21008,7 @@
           <p:nvPr>
             <p:extLst>
               <p:ext uri="{386F3935-93C4-4BCD-93E2-E3B085C9AB24}">
-                <p16:designElem xmlns:p16="http://schemas.microsoft.com/office/powerpoint/2015/main" val="1"/>
+                <p16:designElem xmlns:p16="http://schemas.microsoft.com/office/powerpoint/2015/main" xmlns="" val="1"/>
               </p:ext>
             </p:extLst>
           </p:nvPr>
@@ -21074,10 +21347,10 @@
           <p:cNvPr id="15" name="Rectangle 14">
             <a:extLst>
               <a:ext uri="{FF2B5EF4-FFF2-40B4-BE49-F238E27FC236}">
-                <a16:creationId xmlns:a16="http://schemas.microsoft.com/office/drawing/2014/main" id="{C99B912D-1E4B-42AF-A2BE-CFEFEC916EE7}"/>
+                <a16:creationId xmlns:a16="http://schemas.microsoft.com/office/drawing/2014/main" xmlns="" id="{C99B912D-1E4B-42AF-A2BE-CFEFEC916EE7}"/>
               </a:ext>
               <a:ext uri="{C183D7F6-B498-43B3-948B-1728B52AA6E4}">
-                <adec:decorative xmlns:adec="http://schemas.microsoft.com/office/drawing/2017/decorative" val="1"/>
+                <adec:decorative xmlns:adec="http://schemas.microsoft.com/office/drawing/2017/decorative" xmlns="" val="1"/>
               </a:ext>
             </a:extLst>
           </p:cNvPr>
@@ -21087,7 +21360,7 @@
           <p:nvPr>
             <p:extLst>
               <p:ext uri="{386F3935-93C4-4BCD-93E2-E3B085C9AB24}">
-                <p16:designElem xmlns:p16="http://schemas.microsoft.com/office/powerpoint/2015/main" val="1"/>
+                <p16:designElem xmlns:p16="http://schemas.microsoft.com/office/powerpoint/2015/main" xmlns="" val="1"/>
               </p:ext>
             </p:extLst>
           </p:nvPr>
@@ -21127,7 +21400,7 @@
           <p:cNvPr id="5" name="Content Placeholder 2">
             <a:extLst>
               <a:ext uri="{FF2B5EF4-FFF2-40B4-BE49-F238E27FC236}">
-                <a16:creationId xmlns:a16="http://schemas.microsoft.com/office/drawing/2014/main" id="{87CF6268-1C54-4040-BD87-73BE4604789A}"/>
+                <a16:creationId xmlns:a16="http://schemas.microsoft.com/office/drawing/2014/main" xmlns="" id="{87CF6268-1C54-4040-BD87-73BE4604789A}"/>
               </a:ext>
             </a:extLst>
           </p:cNvPr>
@@ -21212,10 +21485,10 @@
           <p:cNvPr id="8" name="Picture 7">
             <a:extLst>
               <a:ext uri="{FF2B5EF4-FFF2-40B4-BE49-F238E27FC236}">
-                <a16:creationId xmlns:a16="http://schemas.microsoft.com/office/drawing/2014/main" id="{91B28F63-CF00-448F-B141-FE33C33B1891}"/>
+                <a16:creationId xmlns:a16="http://schemas.microsoft.com/office/drawing/2014/main" xmlns="" id="{91B28F63-CF00-448F-B141-FE33C33B1891}"/>
               </a:ext>
               <a:ext uri="{C183D7F6-B498-43B3-948B-1728B52AA6E4}">
-                <adec:decorative xmlns:adec="http://schemas.microsoft.com/office/drawing/2017/decorative" val="1"/>
+                <adec:decorative xmlns:adec="http://schemas.microsoft.com/office/drawing/2017/decorative" xmlns="" val="1"/>
               </a:ext>
             </a:extLst>
           </p:cNvPr>
@@ -21225,7 +21498,7 @@
           <p:nvPr>
             <p:extLst>
               <p:ext uri="{386F3935-93C4-4BCD-93E2-E3B085C9AB24}">
-                <p16:designElem xmlns:p16="http://schemas.microsoft.com/office/powerpoint/2015/main" val="1"/>
+                <p16:designElem xmlns:p16="http://schemas.microsoft.com/office/powerpoint/2015/main" xmlns="" val="1"/>
               </p:ext>
             </p:extLst>
           </p:nvPr>
@@ -21256,10 +21529,10 @@
           <p:cNvPr id="10" name="Picture 9">
             <a:extLst>
               <a:ext uri="{FF2B5EF4-FFF2-40B4-BE49-F238E27FC236}">
-                <a16:creationId xmlns:a16="http://schemas.microsoft.com/office/drawing/2014/main" id="{2AE609E2-8522-44E4-9077-980E5BCF3E14}"/>
+                <a16:creationId xmlns:a16="http://schemas.microsoft.com/office/drawing/2014/main" xmlns="" id="{2AE609E2-8522-44E4-9077-980E5BCF3E14}"/>
               </a:ext>
               <a:ext uri="{C183D7F6-B498-43B3-948B-1728B52AA6E4}">
-                <adec:decorative xmlns:adec="http://schemas.microsoft.com/office/drawing/2017/decorative" val="1"/>
+                <adec:decorative xmlns:adec="http://schemas.microsoft.com/office/drawing/2017/decorative" xmlns="" val="1"/>
               </a:ext>
             </a:extLst>
           </p:cNvPr>
@@ -21269,7 +21542,7 @@
           <p:nvPr>
             <p:extLst>
               <p:ext uri="{386F3935-93C4-4BCD-93E2-E3B085C9AB24}">
-                <p16:designElem xmlns:p16="http://schemas.microsoft.com/office/powerpoint/2015/main" val="1"/>
+                <p16:designElem xmlns:p16="http://schemas.microsoft.com/office/powerpoint/2015/main" xmlns="" val="1"/>
               </p:ext>
             </p:extLst>
           </p:nvPr>
@@ -21300,10 +21573,10 @@
           <p:cNvPr id="12" name="Oval 11">
             <a:extLst>
               <a:ext uri="{FF2B5EF4-FFF2-40B4-BE49-F238E27FC236}">
-                <a16:creationId xmlns:a16="http://schemas.microsoft.com/office/drawing/2014/main" id="{4FA533C5-33E3-4611-AF9F-72811D8B26A6}"/>
+                <a16:creationId xmlns:a16="http://schemas.microsoft.com/office/drawing/2014/main" xmlns="" id="{4FA533C5-33E3-4611-AF9F-72811D8B26A6}"/>
               </a:ext>
               <a:ext uri="{C183D7F6-B498-43B3-948B-1728B52AA6E4}">
-                <adec:decorative xmlns:adec="http://schemas.microsoft.com/office/drawing/2017/decorative" val="1"/>
+                <adec:decorative xmlns:adec="http://schemas.microsoft.com/office/drawing/2017/decorative" xmlns="" val="1"/>
               </a:ext>
             </a:extLst>
           </p:cNvPr>
@@ -21313,7 +21586,7 @@
           <p:nvPr>
             <p:extLst>
               <p:ext uri="{386F3935-93C4-4BCD-93E2-E3B085C9AB24}">
-                <p16:designElem xmlns:p16="http://schemas.microsoft.com/office/powerpoint/2015/main" val="1"/>
+                <p16:designElem xmlns:p16="http://schemas.microsoft.com/office/powerpoint/2015/main" xmlns="" val="1"/>
               </p:ext>
             </p:extLst>
           </p:nvPr>
@@ -21380,10 +21653,10 @@
           <p:cNvPr id="14" name="Picture 13">
             <a:extLst>
               <a:ext uri="{FF2B5EF4-FFF2-40B4-BE49-F238E27FC236}">
-                <a16:creationId xmlns:a16="http://schemas.microsoft.com/office/drawing/2014/main" id="{8949AD42-25FD-4C3D-9EEE-B7FEC5809988}"/>
+                <a16:creationId xmlns:a16="http://schemas.microsoft.com/office/drawing/2014/main" xmlns="" id="{8949AD42-25FD-4C3D-9EEE-B7FEC5809988}"/>
               </a:ext>
               <a:ext uri="{C183D7F6-B498-43B3-948B-1728B52AA6E4}">
-                <adec:decorative xmlns:adec="http://schemas.microsoft.com/office/drawing/2017/decorative" val="1"/>
+                <adec:decorative xmlns:adec="http://schemas.microsoft.com/office/drawing/2017/decorative" xmlns="" val="1"/>
               </a:ext>
             </a:extLst>
           </p:cNvPr>
@@ -21393,7 +21666,7 @@
           <p:nvPr>
             <p:extLst>
               <p:ext uri="{386F3935-93C4-4BCD-93E2-E3B085C9AB24}">
-                <p16:designElem xmlns:p16="http://schemas.microsoft.com/office/powerpoint/2015/main" val="1"/>
+                <p16:designElem xmlns:p16="http://schemas.microsoft.com/office/powerpoint/2015/main" xmlns="" val="1"/>
               </p:ext>
             </p:extLst>
           </p:nvPr>
@@ -21424,10 +21697,10 @@
           <p:cNvPr id="16" name="Picture 15">
             <a:extLst>
               <a:ext uri="{FF2B5EF4-FFF2-40B4-BE49-F238E27FC236}">
-                <a16:creationId xmlns:a16="http://schemas.microsoft.com/office/drawing/2014/main" id="{6AC7D913-60B7-4603-881B-831DA5D3A940}"/>
+                <a16:creationId xmlns:a16="http://schemas.microsoft.com/office/drawing/2014/main" xmlns="" id="{6AC7D913-60B7-4603-881B-831DA5D3A940}"/>
               </a:ext>
               <a:ext uri="{C183D7F6-B498-43B3-948B-1728B52AA6E4}">
-                <adec:decorative xmlns:adec="http://schemas.microsoft.com/office/drawing/2017/decorative" val="1"/>
+                <adec:decorative xmlns:adec="http://schemas.microsoft.com/office/drawing/2017/decorative" xmlns="" val="1"/>
               </a:ext>
             </a:extLst>
           </p:cNvPr>
@@ -21437,7 +21710,7 @@
           <p:nvPr>
             <p:extLst>
               <p:ext uri="{386F3935-93C4-4BCD-93E2-E3B085C9AB24}">
-                <p16:designElem xmlns:p16="http://schemas.microsoft.com/office/powerpoint/2015/main" val="1"/>
+                <p16:designElem xmlns:p16="http://schemas.microsoft.com/office/powerpoint/2015/main" xmlns="" val="1"/>
               </p:ext>
             </p:extLst>
           </p:nvPr>
@@ -21468,10 +21741,10 @@
           <p:cNvPr id="18" name="Rectangle 17">
             <a:extLst>
               <a:ext uri="{FF2B5EF4-FFF2-40B4-BE49-F238E27FC236}">
-                <a16:creationId xmlns:a16="http://schemas.microsoft.com/office/drawing/2014/main" id="{87F0FDC4-AD8C-47D9-9131-623C98ADB0AE}"/>
+                <a16:creationId xmlns:a16="http://schemas.microsoft.com/office/drawing/2014/main" xmlns="" id="{87F0FDC4-AD8C-47D9-9131-623C98ADB0AE}"/>
               </a:ext>
               <a:ext uri="{C183D7F6-B498-43B3-948B-1728B52AA6E4}">
-                <adec:decorative xmlns:adec="http://schemas.microsoft.com/office/drawing/2017/decorative" val="1"/>
+                <adec:decorative xmlns:adec="http://schemas.microsoft.com/office/drawing/2017/decorative" xmlns="" val="1"/>
               </a:ext>
             </a:extLst>
           </p:cNvPr>
@@ -21481,7 +21754,7 @@
           <p:nvPr>
             <p:extLst>
               <p:ext uri="{386F3935-93C4-4BCD-93E2-E3B085C9AB24}">
-                <p16:designElem xmlns:p16="http://schemas.microsoft.com/office/powerpoint/2015/main" val="1"/>
+                <p16:designElem xmlns:p16="http://schemas.microsoft.com/office/powerpoint/2015/main" xmlns="" val="1"/>
               </p:ext>
             </p:extLst>
           </p:nvPr>
@@ -21521,10 +21794,10 @@
           <p:cNvPr id="20" name="Rectangle 19">
             <a:extLst>
               <a:ext uri="{FF2B5EF4-FFF2-40B4-BE49-F238E27FC236}">
-                <a16:creationId xmlns:a16="http://schemas.microsoft.com/office/drawing/2014/main" id="{E6A222EB-A81E-4238-B08D-AAB1828C8E0B}"/>
+                <a16:creationId xmlns:a16="http://schemas.microsoft.com/office/drawing/2014/main" xmlns="" id="{E6A222EB-A81E-4238-B08D-AAB1828C8E0B}"/>
               </a:ext>
               <a:ext uri="{C183D7F6-B498-43B3-948B-1728B52AA6E4}">
-                <adec:decorative xmlns:adec="http://schemas.microsoft.com/office/drawing/2017/decorative" val="1"/>
+                <adec:decorative xmlns:adec="http://schemas.microsoft.com/office/drawing/2017/decorative" xmlns="" val="1"/>
               </a:ext>
             </a:extLst>
           </p:cNvPr>
@@ -21534,7 +21807,7 @@
           <p:nvPr>
             <p:extLst>
               <p:ext uri="{386F3935-93C4-4BCD-93E2-E3B085C9AB24}">
-                <p16:designElem xmlns:p16="http://schemas.microsoft.com/office/powerpoint/2015/main" val="1"/>
+                <p16:designElem xmlns:p16="http://schemas.microsoft.com/office/powerpoint/2015/main" xmlns="" val="1"/>
               </p:ext>
             </p:extLst>
           </p:nvPr>
@@ -21581,10 +21854,10 @@
           <p:cNvPr id="22" name="Rectangle 21">
             <a:extLst>
               <a:ext uri="{FF2B5EF4-FFF2-40B4-BE49-F238E27FC236}">
-                <a16:creationId xmlns:a16="http://schemas.microsoft.com/office/drawing/2014/main" id="{E014676C-074B-475A-8346-9C901C86CB97}"/>
+                <a16:creationId xmlns:a16="http://schemas.microsoft.com/office/drawing/2014/main" xmlns="" id="{E014676C-074B-475A-8346-9C901C86CB97}"/>
               </a:ext>
               <a:ext uri="{C183D7F6-B498-43B3-948B-1728B52AA6E4}">
-                <adec:decorative xmlns:adec="http://schemas.microsoft.com/office/drawing/2017/decorative" val="1"/>
+                <adec:decorative xmlns:adec="http://schemas.microsoft.com/office/drawing/2017/decorative" xmlns="" val="1"/>
               </a:ext>
             </a:extLst>
           </p:cNvPr>
@@ -21594,7 +21867,7 @@
           <p:nvPr>
             <p:extLst>
               <p:ext uri="{386F3935-93C4-4BCD-93E2-E3B085C9AB24}">
-                <p16:designElem xmlns:p16="http://schemas.microsoft.com/office/powerpoint/2015/main" val="1"/>
+                <p16:designElem xmlns:p16="http://schemas.microsoft.com/office/powerpoint/2015/main" xmlns="" val="1"/>
               </p:ext>
             </p:extLst>
           </p:nvPr>
@@ -21634,10 +21907,10 @@
           <p:cNvPr id="24" name="Straight Connector 23">
             <a:extLst>
               <a:ext uri="{FF2B5EF4-FFF2-40B4-BE49-F238E27FC236}">
-                <a16:creationId xmlns:a16="http://schemas.microsoft.com/office/drawing/2014/main" id="{179C4C8E-197B-4679-AE96-B5147F971C90}"/>
+                <a16:creationId xmlns:a16="http://schemas.microsoft.com/office/drawing/2014/main" xmlns="" id="{179C4C8E-197B-4679-AE96-B5147F971C90}"/>
               </a:ext>
               <a:ext uri="{C183D7F6-B498-43B3-948B-1728B52AA6E4}">
-                <adec:decorative xmlns:adec="http://schemas.microsoft.com/office/drawing/2017/decorative" val="1"/>
+                <adec:decorative xmlns:adec="http://schemas.microsoft.com/office/drawing/2017/decorative" xmlns="" val="1"/>
               </a:ext>
             </a:extLst>
           </p:cNvPr>
@@ -21647,7 +21920,7 @@
           <p:nvPr>
             <p:extLst>
               <p:ext uri="{386F3935-93C4-4BCD-93E2-E3B085C9AB24}">
-                <p16:designElem xmlns:p16="http://schemas.microsoft.com/office/powerpoint/2015/main" val="1"/>
+                <p16:designElem xmlns:p16="http://schemas.microsoft.com/office/powerpoint/2015/main" xmlns="" val="1"/>
               </p:ext>
             </p:extLst>
           </p:nvPr>
@@ -21689,7 +21962,7 @@
           <p:cNvPr id="2" name="Title 1">
             <a:extLst>
               <a:ext uri="{FF2B5EF4-FFF2-40B4-BE49-F238E27FC236}">
-                <a16:creationId xmlns:a16="http://schemas.microsoft.com/office/drawing/2014/main" id="{1F3E3984-C1B8-4094-8C35-AD30981A79DB}"/>
+                <a16:creationId xmlns:a16="http://schemas.microsoft.com/office/drawing/2014/main" xmlns="" id="{1F3E3984-C1B8-4094-8C35-AD30981A79DB}"/>
               </a:ext>
             </a:extLst>
           </p:cNvPr>
@@ -21761,7 +22034,7 @@
           <p:cNvPr id="2" name="Title 1">
             <a:extLst>
               <a:ext uri="{FF2B5EF4-FFF2-40B4-BE49-F238E27FC236}">
-                <a16:creationId xmlns:a16="http://schemas.microsoft.com/office/drawing/2014/main" id="{1F3E3984-C1B8-4094-8C35-AD30981A79DB}"/>
+                <a16:creationId xmlns:a16="http://schemas.microsoft.com/office/drawing/2014/main" xmlns="" id="{1F3E3984-C1B8-4094-8C35-AD30981A79DB}"/>
               </a:ext>
             </a:extLst>
           </p:cNvPr>
@@ -21786,7 +22059,7 @@
           <p:cNvPr id="5" name="Content Placeholder 4" descr="Chart, line chart&#10;&#10;Description automatically generated">
             <a:extLst>
               <a:ext uri="{FF2B5EF4-FFF2-40B4-BE49-F238E27FC236}">
-                <a16:creationId xmlns:a16="http://schemas.microsoft.com/office/drawing/2014/main" id="{0450D618-7C56-4ADA-8656-4C4C6FF7B187}"/>
+                <a16:creationId xmlns:a16="http://schemas.microsoft.com/office/drawing/2014/main" xmlns="" id="{0450D618-7C56-4ADA-8656-4C4C6FF7B187}"/>
               </a:ext>
             </a:extLst>
           </p:cNvPr>
@@ -21798,7 +22071,7 @@
           </p:nvPr>
         </p:nvPicPr>
         <p:blipFill>
-          <a:blip r:embed="rId2">
+          <a:blip r:embed="rId2" cstate="print">
             <a:extLst>
               <a:ext uri="{28A0092B-C50C-407E-A947-70E740481C1C}">
                 <a14:useLocalDpi xmlns:a14="http://schemas.microsoft.com/office/drawing/2010/main" val="0"/>
@@ -21851,7 +22124,7 @@
           <p:cNvPr id="2" name="Title 1">
             <a:extLst>
               <a:ext uri="{FF2B5EF4-FFF2-40B4-BE49-F238E27FC236}">
-                <a16:creationId xmlns:a16="http://schemas.microsoft.com/office/drawing/2014/main" id="{1F3E3984-C1B8-4094-8C35-AD30981A79DB}"/>
+                <a16:creationId xmlns:a16="http://schemas.microsoft.com/office/drawing/2014/main" xmlns="" id="{1F3E3984-C1B8-4094-8C35-AD30981A79DB}"/>
               </a:ext>
             </a:extLst>
           </p:cNvPr>
@@ -21876,7 +22149,7 @@
           <p:cNvPr id="5" name="Content Placeholder 4" descr="Chart, line chart, histogram&#10;&#10;Description automatically generated">
             <a:extLst>
               <a:ext uri="{FF2B5EF4-FFF2-40B4-BE49-F238E27FC236}">
-                <a16:creationId xmlns:a16="http://schemas.microsoft.com/office/drawing/2014/main" id="{C4DF1C25-CE9D-4A60-936A-AD41F0D1197B}"/>
+                <a16:creationId xmlns:a16="http://schemas.microsoft.com/office/drawing/2014/main" xmlns="" id="{C4DF1C25-CE9D-4A60-936A-AD41F0D1197B}"/>
               </a:ext>
             </a:extLst>
           </p:cNvPr>
@@ -21888,7 +22161,7 @@
           </p:nvPr>
         </p:nvPicPr>
         <p:blipFill>
-          <a:blip r:embed="rId2">
+          <a:blip r:embed="rId2" cstate="print">
             <a:extLst>
               <a:ext uri="{28A0092B-C50C-407E-A947-70E740481C1C}">
                 <a14:useLocalDpi xmlns:a14="http://schemas.microsoft.com/office/drawing/2010/main" val="0"/>
@@ -21965,10 +22238,10 @@
           <p:cNvPr id="31" name="Picture 30">
             <a:extLst>
               <a:ext uri="{FF2B5EF4-FFF2-40B4-BE49-F238E27FC236}">
-                <a16:creationId xmlns:a16="http://schemas.microsoft.com/office/drawing/2014/main" id="{91B28F63-CF00-448F-B141-FE33C33B1891}"/>
+                <a16:creationId xmlns:a16="http://schemas.microsoft.com/office/drawing/2014/main" xmlns="" id="{91B28F63-CF00-448F-B141-FE33C33B1891}"/>
               </a:ext>
               <a:ext uri="{C183D7F6-B498-43B3-948B-1728B52AA6E4}">
-                <adec:decorative xmlns:adec="http://schemas.microsoft.com/office/drawing/2017/decorative" val="1"/>
+                <adec:decorative xmlns:adec="http://schemas.microsoft.com/office/drawing/2017/decorative" xmlns="" val="1"/>
               </a:ext>
             </a:extLst>
           </p:cNvPr>
@@ -21978,7 +22251,7 @@
           <p:nvPr>
             <p:extLst>
               <p:ext uri="{386F3935-93C4-4BCD-93E2-E3B085C9AB24}">
-                <p16:designElem xmlns:p16="http://schemas.microsoft.com/office/powerpoint/2015/main" val="1"/>
+                <p16:designElem xmlns:p16="http://schemas.microsoft.com/office/powerpoint/2015/main" xmlns="" val="1"/>
               </p:ext>
             </p:extLst>
           </p:nvPr>
@@ -22009,10 +22282,10 @@
           <p:cNvPr id="33" name="Picture 32">
             <a:extLst>
               <a:ext uri="{FF2B5EF4-FFF2-40B4-BE49-F238E27FC236}">
-                <a16:creationId xmlns:a16="http://schemas.microsoft.com/office/drawing/2014/main" id="{2AE609E2-8522-44E4-9077-980E5BCF3E14}"/>
+                <a16:creationId xmlns:a16="http://schemas.microsoft.com/office/drawing/2014/main" xmlns="" id="{2AE609E2-8522-44E4-9077-980E5BCF3E14}"/>
               </a:ext>
               <a:ext uri="{C183D7F6-B498-43B3-948B-1728B52AA6E4}">
-                <adec:decorative xmlns:adec="http://schemas.microsoft.com/office/drawing/2017/decorative" val="1"/>
+                <adec:decorative xmlns:adec="http://schemas.microsoft.com/office/drawing/2017/decorative" xmlns="" val="1"/>
               </a:ext>
             </a:extLst>
           </p:cNvPr>
@@ -22022,7 +22295,7 @@
           <p:nvPr>
             <p:extLst>
               <p:ext uri="{386F3935-93C4-4BCD-93E2-E3B085C9AB24}">
-                <p16:designElem xmlns:p16="http://schemas.microsoft.com/office/powerpoint/2015/main" val="1"/>
+                <p16:designElem xmlns:p16="http://schemas.microsoft.com/office/powerpoint/2015/main" xmlns="" val="1"/>
               </p:ext>
             </p:extLst>
           </p:nvPr>
@@ -22053,10 +22326,10 @@
           <p:cNvPr id="35" name="Oval 34">
             <a:extLst>
               <a:ext uri="{FF2B5EF4-FFF2-40B4-BE49-F238E27FC236}">
-                <a16:creationId xmlns:a16="http://schemas.microsoft.com/office/drawing/2014/main" id="{4FA533C5-33E3-4611-AF9F-72811D8B26A6}"/>
+                <a16:creationId xmlns:a16="http://schemas.microsoft.com/office/drawing/2014/main" xmlns="" id="{4FA533C5-33E3-4611-AF9F-72811D8B26A6}"/>
               </a:ext>
               <a:ext uri="{C183D7F6-B498-43B3-948B-1728B52AA6E4}">
-                <adec:decorative xmlns:adec="http://schemas.microsoft.com/office/drawing/2017/decorative" val="1"/>
+                <adec:decorative xmlns:adec="http://schemas.microsoft.com/office/drawing/2017/decorative" xmlns="" val="1"/>
               </a:ext>
             </a:extLst>
           </p:cNvPr>
@@ -22066,7 +22339,7 @@
           <p:nvPr>
             <p:extLst>
               <p:ext uri="{386F3935-93C4-4BCD-93E2-E3B085C9AB24}">
-                <p16:designElem xmlns:p16="http://schemas.microsoft.com/office/powerpoint/2015/main" val="1"/>
+                <p16:designElem xmlns:p16="http://schemas.microsoft.com/office/powerpoint/2015/main" xmlns="" val="1"/>
               </p:ext>
             </p:extLst>
           </p:nvPr>
@@ -22133,10 +22406,10 @@
           <p:cNvPr id="37" name="Picture 36">
             <a:extLst>
               <a:ext uri="{FF2B5EF4-FFF2-40B4-BE49-F238E27FC236}">
-                <a16:creationId xmlns:a16="http://schemas.microsoft.com/office/drawing/2014/main" id="{8949AD42-25FD-4C3D-9EEE-B7FEC5809988}"/>
+                <a16:creationId xmlns:a16="http://schemas.microsoft.com/office/drawing/2014/main" xmlns="" id="{8949AD42-25FD-4C3D-9EEE-B7FEC5809988}"/>
               </a:ext>
               <a:ext uri="{C183D7F6-B498-43B3-948B-1728B52AA6E4}">
-                <adec:decorative xmlns:adec="http://schemas.microsoft.com/office/drawing/2017/decorative" val="1"/>
+                <adec:decorative xmlns:adec="http://schemas.microsoft.com/office/drawing/2017/decorative" xmlns="" val="1"/>
               </a:ext>
             </a:extLst>
           </p:cNvPr>
@@ -22146,7 +22419,7 @@
           <p:nvPr>
             <p:extLst>
               <p:ext uri="{386F3935-93C4-4BCD-93E2-E3B085C9AB24}">
-                <p16:designElem xmlns:p16="http://schemas.microsoft.com/office/powerpoint/2015/main" val="1"/>
+                <p16:designElem xmlns:p16="http://schemas.microsoft.com/office/powerpoint/2015/main" xmlns="" val="1"/>
               </p:ext>
             </p:extLst>
           </p:nvPr>
@@ -22177,10 +22450,10 @@
           <p:cNvPr id="39" name="Picture 38">
             <a:extLst>
               <a:ext uri="{FF2B5EF4-FFF2-40B4-BE49-F238E27FC236}">
-                <a16:creationId xmlns:a16="http://schemas.microsoft.com/office/drawing/2014/main" id="{6AC7D913-60B7-4603-881B-831DA5D3A940}"/>
+                <a16:creationId xmlns:a16="http://schemas.microsoft.com/office/drawing/2014/main" xmlns="" id="{6AC7D913-60B7-4603-881B-831DA5D3A940}"/>
               </a:ext>
               <a:ext uri="{C183D7F6-B498-43B3-948B-1728B52AA6E4}">
-                <adec:decorative xmlns:adec="http://schemas.microsoft.com/office/drawing/2017/decorative" val="1"/>
+                <adec:decorative xmlns:adec="http://schemas.microsoft.com/office/drawing/2017/decorative" xmlns="" val="1"/>
               </a:ext>
             </a:extLst>
           </p:cNvPr>
@@ -22190,7 +22463,7 @@
           <p:nvPr>
             <p:extLst>
               <p:ext uri="{386F3935-93C4-4BCD-93E2-E3B085C9AB24}">
-                <p16:designElem xmlns:p16="http://schemas.microsoft.com/office/powerpoint/2015/main" val="1"/>
+                <p16:designElem xmlns:p16="http://schemas.microsoft.com/office/powerpoint/2015/main" xmlns="" val="1"/>
               </p:ext>
             </p:extLst>
           </p:nvPr>
@@ -22221,10 +22494,10 @@
           <p:cNvPr id="41" name="Rectangle 40">
             <a:extLst>
               <a:ext uri="{FF2B5EF4-FFF2-40B4-BE49-F238E27FC236}">
-                <a16:creationId xmlns:a16="http://schemas.microsoft.com/office/drawing/2014/main" id="{87F0FDC4-AD8C-47D9-9131-623C98ADB0AE}"/>
+                <a16:creationId xmlns:a16="http://schemas.microsoft.com/office/drawing/2014/main" xmlns="" id="{87F0FDC4-AD8C-47D9-9131-623C98ADB0AE}"/>
               </a:ext>
               <a:ext uri="{C183D7F6-B498-43B3-948B-1728B52AA6E4}">
-                <adec:decorative xmlns:adec="http://schemas.microsoft.com/office/drawing/2017/decorative" val="1"/>
+                <adec:decorative xmlns:adec="http://schemas.microsoft.com/office/drawing/2017/decorative" xmlns="" val="1"/>
               </a:ext>
             </a:extLst>
           </p:cNvPr>
@@ -22234,7 +22507,7 @@
           <p:nvPr>
             <p:extLst>
               <p:ext uri="{386F3935-93C4-4BCD-93E2-E3B085C9AB24}">
-                <p16:designElem xmlns:p16="http://schemas.microsoft.com/office/powerpoint/2015/main" val="1"/>
+                <p16:designElem xmlns:p16="http://schemas.microsoft.com/office/powerpoint/2015/main" xmlns="" val="1"/>
               </p:ext>
             </p:extLst>
           </p:nvPr>
@@ -22274,10 +22547,10 @@
           <p:cNvPr id="43" name="Rectangle 42">
             <a:extLst>
               <a:ext uri="{FF2B5EF4-FFF2-40B4-BE49-F238E27FC236}">
-                <a16:creationId xmlns:a16="http://schemas.microsoft.com/office/drawing/2014/main" id="{E6A222EB-A81E-4238-B08D-AAB1828C8E0B}"/>
+                <a16:creationId xmlns:a16="http://schemas.microsoft.com/office/drawing/2014/main" xmlns="" id="{E6A222EB-A81E-4238-B08D-AAB1828C8E0B}"/>
               </a:ext>
               <a:ext uri="{C183D7F6-B498-43B3-948B-1728B52AA6E4}">
-                <adec:decorative xmlns:adec="http://schemas.microsoft.com/office/drawing/2017/decorative" val="1"/>
+                <adec:decorative xmlns:adec="http://schemas.microsoft.com/office/drawing/2017/decorative" xmlns="" val="1"/>
               </a:ext>
             </a:extLst>
           </p:cNvPr>
@@ -22287,7 +22560,7 @@
           <p:nvPr>
             <p:extLst>
               <p:ext uri="{386F3935-93C4-4BCD-93E2-E3B085C9AB24}">
-                <p16:designElem xmlns:p16="http://schemas.microsoft.com/office/powerpoint/2015/main" val="1"/>
+                <p16:designElem xmlns:p16="http://schemas.microsoft.com/office/powerpoint/2015/main" xmlns="" val="1"/>
               </p:ext>
             </p:extLst>
           </p:nvPr>
@@ -22334,10 +22607,10 @@
           <p:cNvPr id="45" name="Rectangle 44">
             <a:extLst>
               <a:ext uri="{FF2B5EF4-FFF2-40B4-BE49-F238E27FC236}">
-                <a16:creationId xmlns:a16="http://schemas.microsoft.com/office/drawing/2014/main" id="{E014676C-074B-475A-8346-9C901C86CB97}"/>
+                <a16:creationId xmlns:a16="http://schemas.microsoft.com/office/drawing/2014/main" xmlns="" id="{E014676C-074B-475A-8346-9C901C86CB97}"/>
               </a:ext>
               <a:ext uri="{C183D7F6-B498-43B3-948B-1728B52AA6E4}">
-                <adec:decorative xmlns:adec="http://schemas.microsoft.com/office/drawing/2017/decorative" val="1"/>
+                <adec:decorative xmlns:adec="http://schemas.microsoft.com/office/drawing/2017/decorative" xmlns="" val="1"/>
               </a:ext>
             </a:extLst>
           </p:cNvPr>
@@ -22347,7 +22620,7 @@
           <p:nvPr>
             <p:extLst>
               <p:ext uri="{386F3935-93C4-4BCD-93E2-E3B085C9AB24}">
-                <p16:designElem xmlns:p16="http://schemas.microsoft.com/office/powerpoint/2015/main" val="1"/>
+                <p16:designElem xmlns:p16="http://schemas.microsoft.com/office/powerpoint/2015/main" xmlns="" val="1"/>
               </p:ext>
             </p:extLst>
           </p:nvPr>
@@ -22387,10 +22660,10 @@
           <p:cNvPr id="47" name="Straight Connector 46">
             <a:extLst>
               <a:ext uri="{FF2B5EF4-FFF2-40B4-BE49-F238E27FC236}">
-                <a16:creationId xmlns:a16="http://schemas.microsoft.com/office/drawing/2014/main" id="{179C4C8E-197B-4679-AE96-B5147F971C90}"/>
+                <a16:creationId xmlns:a16="http://schemas.microsoft.com/office/drawing/2014/main" xmlns="" id="{179C4C8E-197B-4679-AE96-B5147F971C90}"/>
               </a:ext>
               <a:ext uri="{C183D7F6-B498-43B3-948B-1728B52AA6E4}">
-                <adec:decorative xmlns:adec="http://schemas.microsoft.com/office/drawing/2017/decorative" val="1"/>
+                <adec:decorative xmlns:adec="http://schemas.microsoft.com/office/drawing/2017/decorative" xmlns="" val="1"/>
               </a:ext>
             </a:extLst>
           </p:cNvPr>
@@ -22400,7 +22673,7 @@
           <p:nvPr>
             <p:extLst>
               <p:ext uri="{386F3935-93C4-4BCD-93E2-E3B085C9AB24}">
-                <p16:designElem xmlns:p16="http://schemas.microsoft.com/office/powerpoint/2015/main" val="1"/>
+                <p16:designElem xmlns:p16="http://schemas.microsoft.com/office/powerpoint/2015/main" xmlns="" val="1"/>
               </p:ext>
             </p:extLst>
           </p:nvPr>
@@ -22442,7 +22715,7 @@
           <p:cNvPr id="2" name="Title 1">
             <a:extLst>
               <a:ext uri="{FF2B5EF4-FFF2-40B4-BE49-F238E27FC236}">
-                <a16:creationId xmlns:a16="http://schemas.microsoft.com/office/drawing/2014/main" id="{950A93D4-9BA4-4FD6-919F-F1EAB2636F2F}"/>
+                <a16:creationId xmlns:a16="http://schemas.microsoft.com/office/drawing/2014/main" xmlns="" id="{950A93D4-9BA4-4FD6-919F-F1EAB2636F2F}"/>
               </a:ext>
             </a:extLst>
           </p:cNvPr>
@@ -22627,7 +22900,7 @@
     </a:clrScheme>
     <a:fontScheme name="Ion">
       <a:majorFont>
-        <a:latin typeface="Century Gothic" panose="020B0502020202020204"/>
+        <a:latin typeface="Century Gothic"/>
         <a:ea typeface=""/>
         <a:cs typeface=""/>
         <a:font script="Jpan" typeface="メイリオ"/>
@@ -22662,7 +22935,7 @@
         <a:font script="Geor" typeface="Sylfaen"/>
       </a:majorFont>
       <a:minorFont>
-        <a:latin typeface="Century Gothic" panose="020B0502020202020204"/>
+        <a:latin typeface="Century Gothic"/>
         <a:ea typeface=""/>
         <a:cs typeface=""/>
         <a:font script="Jpan" typeface="メイリオ"/>
@@ -22844,7 +23117,7 @@
   <a:extraClrSchemeLst/>
   <a:extLst>
     <a:ext uri="{05A4C25C-085E-4340-85A3-A5531E510DB2}">
-      <thm15:themeFamily xmlns:thm15="http://schemas.microsoft.com/office/thememl/2012/main" name="Ion" id="{B8441ADB-2E43-4AF7-B97A-BD870242C6A8}" vid="{292E63A9-BB86-4E3D-B92A-7223C6510D2E}"/>
+      <thm15:themeFamily xmlns:thm15="http://schemas.microsoft.com/office/thememl/2012/main" xmlns="" name="Ion" id="{B8441ADB-2E43-4AF7-B97A-BD870242C6A8}" vid="{292E63A9-BB86-4E3D-B92A-7223C6510D2E}"/>
     </a:ext>
   </a:extLst>
 </a:theme>

</xml_diff>

<commit_message>
Added a bit to the findings on ppt
</commit_message>
<xml_diff>
--- a/P2 – Group 1.pptx
+++ b/P2 – Group 1.pptx
@@ -120,6 +120,22 @@
       </a:defRPr>
     </a:lvl9pPr>
   </p:defaultTextStyle>
+  <p:extLst>
+    <p:ext uri="{EFAFB233-063F-42B5-8137-9DF3F51BA10A}">
+      <p15:sldGuideLst xmlns:p15="http://schemas.microsoft.com/office/powerpoint/2012/main">
+        <p15:guide id="1" orient="horz" pos="2160">
+          <p15:clr>
+            <a:srgbClr val="A4A3A4"/>
+          </p15:clr>
+        </p15:guide>
+        <p15:guide id="2" pos="3840">
+          <p15:clr>
+            <a:srgbClr val="A4A3A4"/>
+          </p15:clr>
+        </p15:guide>
+      </p15:sldGuideLst>
+    </p:ext>
+  </p:extLst>
 </p:presentation>
 </file>
 
@@ -2669,13 +2685,6 @@
         </dgm:presLayoutVars>
       </dgm:prSet>
       <dgm:spPr/>
-      <dgm:t>
-        <a:bodyPr/>
-        <a:lstStyle/>
-        <a:p>
-          <a:endParaRPr lang="en-US"/>
-        </a:p>
-      </dgm:t>
     </dgm:pt>
     <dgm:pt modelId="{27946E24-3D78-4E16-8A3F-0E588799684C}" type="pres">
       <dgm:prSet presAssocID="{F85B9CD4-BAD3-4FE9-B63F-B79D3E877CFA}" presName="compNode" presStyleCnt="0"/>
@@ -2691,7 +2700,7 @@
                 <a14:useLocalDpi xmlns:a14="http://schemas.microsoft.com/office/drawing/2010/main" val="0"/>
               </a:ext>
               <a:ext uri="{96DAC541-7B7A-43D3-8B79-37D633B846F1}">
-                <asvg:svgBlip xmlns:asvg="http://schemas.microsoft.com/office/drawing/2016/SVG/main" xmlns="" r:embed="rId2"/>
+                <asvg:svgBlip xmlns:asvg="http://schemas.microsoft.com/office/drawing/2016/SVG/main" r:embed="rId2"/>
               </a:ext>
             </a:extLst>
           </a:blip>
@@ -2721,13 +2730,6 @@
         </dgm:presLayoutVars>
       </dgm:prSet>
       <dgm:spPr/>
-      <dgm:t>
-        <a:bodyPr/>
-        <a:lstStyle/>
-        <a:p>
-          <a:endParaRPr lang="en-US"/>
-        </a:p>
-      </dgm:t>
     </dgm:pt>
     <dgm:pt modelId="{86961A20-E4DD-4DB4-A65B-97E54510296B}" type="pres">
       <dgm:prSet presAssocID="{D86A2033-0D40-47F7-928B-D8D23396BCEA}" presName="sibTrans" presStyleCnt="0"/>
@@ -2747,7 +2749,7 @@
                 <a14:useLocalDpi xmlns:a14="http://schemas.microsoft.com/office/drawing/2010/main" val="0"/>
               </a:ext>
               <a:ext uri="{96DAC541-7B7A-43D3-8B79-37D633B846F1}">
-                <asvg:svgBlip xmlns:asvg="http://schemas.microsoft.com/office/drawing/2016/SVG/main" xmlns="" r:embed="rId4"/>
+                <asvg:svgBlip xmlns:asvg="http://schemas.microsoft.com/office/drawing/2016/SVG/main" r:embed="rId4"/>
               </a:ext>
             </a:extLst>
           </a:blip>
@@ -2777,21 +2779,14 @@
         </dgm:presLayoutVars>
       </dgm:prSet>
       <dgm:spPr/>
-      <dgm:t>
-        <a:bodyPr/>
-        <a:lstStyle/>
-        <a:p>
-          <a:endParaRPr lang="en-US"/>
-        </a:p>
-      </dgm:t>
     </dgm:pt>
   </dgm:ptLst>
   <dgm:cxnLst>
+    <dgm:cxn modelId="{EADE463F-067A-4C5E-A4B8-CDD2B7F9D0EC}" srcId="{0AA7EE45-48AE-46E3-A6D8-7BCC5D267D74}" destId="{F85B9CD4-BAD3-4FE9-B63F-B79D3E877CFA}" srcOrd="0" destOrd="0" parTransId="{47C639D7-B316-4CA0-99E4-62F741AD95BA}" sibTransId="{D86A2033-0D40-47F7-928B-D8D23396BCEA}"/>
+    <dgm:cxn modelId="{BBC11040-14C2-473E-A45C-22B74E6A5AF6}" type="presOf" srcId="{F85B9CD4-BAD3-4FE9-B63F-B79D3E877CFA}" destId="{AD2AAF4D-F665-4F5B-860B-F9AA097AA5D3}" srcOrd="0" destOrd="0" presId="urn:microsoft.com/office/officeart/2018/2/layout/IconLabelList"/>
+    <dgm:cxn modelId="{28708452-1EC8-4962-AFA3-6B37DF8B21EB}" srcId="{0AA7EE45-48AE-46E3-A6D8-7BCC5D267D74}" destId="{BF902134-CFF8-4D53-BCC6-C5A754F0CC7B}" srcOrd="1" destOrd="0" parTransId="{FCEDF328-B1F1-4CB6-8EEF-16424BE0A08B}" sibTransId="{9CD61A03-D8BD-4DF6-817E-159190E7CC0B}"/>
     <dgm:cxn modelId="{D1DD8EAA-5A48-49FC-9DB2-8D3CF0DF0080}" type="presOf" srcId="{0AA7EE45-48AE-46E3-A6D8-7BCC5D267D74}" destId="{997B5C68-4019-432A-B572-60735DF2DD16}" srcOrd="0" destOrd="0" presId="urn:microsoft.com/office/officeart/2018/2/layout/IconLabelList"/>
     <dgm:cxn modelId="{D40274EE-3933-4240-B607-541A8FA64657}" type="presOf" srcId="{BF902134-CFF8-4D53-BCC6-C5A754F0CC7B}" destId="{F50B3B7B-6947-433E-8622-18F49B3CE7A1}" srcOrd="0" destOrd="0" presId="urn:microsoft.com/office/officeart/2018/2/layout/IconLabelList"/>
-    <dgm:cxn modelId="{28708452-1EC8-4962-AFA3-6B37DF8B21EB}" srcId="{0AA7EE45-48AE-46E3-A6D8-7BCC5D267D74}" destId="{BF902134-CFF8-4D53-BCC6-C5A754F0CC7B}" srcOrd="1" destOrd="0" parTransId="{FCEDF328-B1F1-4CB6-8EEF-16424BE0A08B}" sibTransId="{9CD61A03-D8BD-4DF6-817E-159190E7CC0B}"/>
-    <dgm:cxn modelId="{BBC11040-14C2-473E-A45C-22B74E6A5AF6}" type="presOf" srcId="{F85B9CD4-BAD3-4FE9-B63F-B79D3E877CFA}" destId="{AD2AAF4D-F665-4F5B-860B-F9AA097AA5D3}" srcOrd="0" destOrd="0" presId="urn:microsoft.com/office/officeart/2018/2/layout/IconLabelList"/>
-    <dgm:cxn modelId="{EADE463F-067A-4C5E-A4B8-CDD2B7F9D0EC}" srcId="{0AA7EE45-48AE-46E3-A6D8-7BCC5D267D74}" destId="{F85B9CD4-BAD3-4FE9-B63F-B79D3E877CFA}" srcOrd="0" destOrd="0" parTransId="{47C639D7-B316-4CA0-99E4-62F741AD95BA}" sibTransId="{D86A2033-0D40-47F7-928B-D8D23396BCEA}"/>
     <dgm:cxn modelId="{FE297B6D-536D-41E0-B2A5-A1B6A30BE79E}" type="presParOf" srcId="{997B5C68-4019-432A-B572-60735DF2DD16}" destId="{27946E24-3D78-4E16-8A3F-0E588799684C}" srcOrd="0" destOrd="0" presId="urn:microsoft.com/office/officeart/2018/2/layout/IconLabelList"/>
     <dgm:cxn modelId="{C56004CE-B883-4B8E-9091-2DDED11D571A}" type="presParOf" srcId="{27946E24-3D78-4E16-8A3F-0E588799684C}" destId="{12D9E96E-8FE0-4AFE-89A1-B4DC1ED4FBF6}" srcOrd="0" destOrd="0" presId="urn:microsoft.com/office/officeart/2018/2/layout/IconLabelList"/>
     <dgm:cxn modelId="{45DADE0C-9406-4EC2-B926-8FE226332C83}" type="presParOf" srcId="{27946E24-3D78-4E16-8A3F-0E588799684C}" destId="{30C40FB2-E13D-4C6F-8CAB-093296155D6D}" srcOrd="1" destOrd="0" presId="urn:microsoft.com/office/officeart/2018/2/layout/IconLabelList"/>
@@ -3084,13 +3079,6 @@
         </dgm:presLayoutVars>
       </dgm:prSet>
       <dgm:spPr/>
-      <dgm:t>
-        <a:bodyPr/>
-        <a:lstStyle/>
-        <a:p>
-          <a:endParaRPr lang="en-US"/>
-        </a:p>
-      </dgm:t>
     </dgm:pt>
     <dgm:pt modelId="{C3F9C80B-9405-4FA7-AC3C-0C945666B357}" type="pres">
       <dgm:prSet presAssocID="{5BE8912E-F7E6-4741-AD28-CD50A0F3FE44}" presName="hierRoot1" presStyleCnt="0"/>
@@ -3111,13 +3099,6 @@
         </dgm:presLayoutVars>
       </dgm:prSet>
       <dgm:spPr/>
-      <dgm:t>
-        <a:bodyPr/>
-        <a:lstStyle/>
-        <a:p>
-          <a:endParaRPr lang="en-US"/>
-        </a:p>
-      </dgm:t>
     </dgm:pt>
     <dgm:pt modelId="{DDA209B8-4B8D-48DB-B0DB-4A3002B616EF}" type="pres">
       <dgm:prSet presAssocID="{5BE8912E-F7E6-4741-AD28-CD50A0F3FE44}" presName="hierChild2" presStyleCnt="0"/>
@@ -3142,13 +3123,6 @@
         </dgm:presLayoutVars>
       </dgm:prSet>
       <dgm:spPr/>
-      <dgm:t>
-        <a:bodyPr/>
-        <a:lstStyle/>
-        <a:p>
-          <a:endParaRPr lang="en-US"/>
-        </a:p>
-      </dgm:t>
     </dgm:pt>
     <dgm:pt modelId="{115000C5-73F8-40E9-BCE9-DB29957E48E2}" type="pres">
       <dgm:prSet presAssocID="{9643240F-2EA4-4743-B38B-E754AFDD0BD3}" presName="hierChild2" presStyleCnt="0"/>
@@ -3173,13 +3147,6 @@
         </dgm:presLayoutVars>
       </dgm:prSet>
       <dgm:spPr/>
-      <dgm:t>
-        <a:bodyPr/>
-        <a:lstStyle/>
-        <a:p>
-          <a:endParaRPr lang="en-US"/>
-        </a:p>
-      </dgm:t>
     </dgm:pt>
     <dgm:pt modelId="{4C8F14A5-660B-4735-9DDB-2DECCC98835A}" type="pres">
       <dgm:prSet presAssocID="{C1F74533-A485-40FE-A076-533BE33557CB}" presName="hierChild2" presStyleCnt="0"/>
@@ -3204,13 +3171,6 @@
         </dgm:presLayoutVars>
       </dgm:prSet>
       <dgm:spPr/>
-      <dgm:t>
-        <a:bodyPr/>
-        <a:lstStyle/>
-        <a:p>
-          <a:endParaRPr lang="en-US"/>
-        </a:p>
-      </dgm:t>
     </dgm:pt>
     <dgm:pt modelId="{1D9C4608-5EEF-4FBC-8A95-FF3C699F86C2}" type="pres">
       <dgm:prSet presAssocID="{41BC46B4-BDE9-423F-8906-3CE849E62A0F}" presName="hierChild2" presStyleCnt="0"/>
@@ -3235,13 +3195,6 @@
         </dgm:presLayoutVars>
       </dgm:prSet>
       <dgm:spPr/>
-      <dgm:t>
-        <a:bodyPr/>
-        <a:lstStyle/>
-        <a:p>
-          <a:endParaRPr lang="en-US"/>
-        </a:p>
-      </dgm:t>
     </dgm:pt>
     <dgm:pt modelId="{5BA95E23-781A-4E36-ADB8-C1F9BA13958C}" type="pres">
       <dgm:prSet presAssocID="{4ED107CA-8285-4DE2-BA66-9D4A615CAE4F}" presName="hierChild2" presStyleCnt="0"/>
@@ -3266,13 +3219,6 @@
         </dgm:presLayoutVars>
       </dgm:prSet>
       <dgm:spPr/>
-      <dgm:t>
-        <a:bodyPr/>
-        <a:lstStyle/>
-        <a:p>
-          <a:endParaRPr lang="en-US"/>
-        </a:p>
-      </dgm:t>
     </dgm:pt>
     <dgm:pt modelId="{806A4E8B-D656-4798-8DD4-4888423AE2F3}" type="pres">
       <dgm:prSet presAssocID="{CE1D68A5-D2DC-4199-8043-ECF5EEB262FC}" presName="hierChild2" presStyleCnt="0"/>
@@ -3297,13 +3243,6 @@
         </dgm:presLayoutVars>
       </dgm:prSet>
       <dgm:spPr/>
-      <dgm:t>
-        <a:bodyPr/>
-        <a:lstStyle/>
-        <a:p>
-          <a:endParaRPr lang="en-US"/>
-        </a:p>
-      </dgm:t>
     </dgm:pt>
     <dgm:pt modelId="{22FC7D11-3F2A-4705-A1A1-E6EF365B9572}" type="pres">
       <dgm:prSet presAssocID="{FBFBE81D-1280-43A7-B0EE-8A75D5885A47}" presName="hierChild2" presStyleCnt="0"/>
@@ -3311,21 +3250,21 @@
     </dgm:pt>
   </dgm:ptLst>
   <dgm:cxnLst>
+    <dgm:cxn modelId="{6A908209-7FE8-4A30-BC52-E18F9CF5C69D}" srcId="{30B61FC0-6916-4B93-8E53-5797D7790B59}" destId="{4ED107CA-8285-4DE2-BA66-9D4A615CAE4F}" srcOrd="4" destOrd="0" parTransId="{29C70813-4109-40A4-B8E5-DFE6BAD972B1}" sibTransId="{8D06C245-CC47-497B-A521-361C950D2E29}"/>
+    <dgm:cxn modelId="{8C0D4711-41B6-4BC9-BB47-093CD28C31C3}" type="presOf" srcId="{41BC46B4-BDE9-423F-8906-3CE849E62A0F}" destId="{71EA9CD4-3EDF-4CF5-8F59-27BEC082950C}" srcOrd="0" destOrd="0" presId="urn:microsoft.com/office/officeart/2005/8/layout/hierarchy1"/>
+    <dgm:cxn modelId="{E277FA2B-0CED-46B1-9A2D-65359A4CF684}" type="presOf" srcId="{9643240F-2EA4-4743-B38B-E754AFDD0BD3}" destId="{8275085D-A526-4531-A609-26C3A8D97E3D}" srcOrd="0" destOrd="0" presId="urn:microsoft.com/office/officeart/2005/8/layout/hierarchy1"/>
+    <dgm:cxn modelId="{53B8304B-C520-4C50-BC51-D954F126CCF7}" srcId="{30B61FC0-6916-4B93-8E53-5797D7790B59}" destId="{C1F74533-A485-40FE-A076-533BE33557CB}" srcOrd="2" destOrd="0" parTransId="{6A54022B-2CDF-4FDD-B3BF-884E4F64FEF6}" sibTransId="{9D8044DC-19E6-4BD8-A466-4E120D6CFD8A}"/>
+    <dgm:cxn modelId="{0F94086D-4038-4353-AF3B-889F2D91DBF5}" type="presOf" srcId="{30B61FC0-6916-4B93-8E53-5797D7790B59}" destId="{D382EBAF-A88C-4ED6-B155-125AA0C1898C}" srcOrd="0" destOrd="0" presId="urn:microsoft.com/office/officeart/2005/8/layout/hierarchy1"/>
+    <dgm:cxn modelId="{00D20F50-7921-45E2-9DE9-6A4258565866}" srcId="{30B61FC0-6916-4B93-8E53-5797D7790B59}" destId="{FBFBE81D-1280-43A7-B0EE-8A75D5885A47}" srcOrd="6" destOrd="0" parTransId="{A8F460DF-102C-4A4D-92E8-31EEBB42F5C4}" sibTransId="{69E80C92-3388-4BA2-B497-94BD00BA6F66}"/>
+    <dgm:cxn modelId="{5AAE7D56-44FA-4356-8E0F-3BDBCEF71831}" srcId="{30B61FC0-6916-4B93-8E53-5797D7790B59}" destId="{CE1D68A5-D2DC-4199-8043-ECF5EEB262FC}" srcOrd="5" destOrd="0" parTransId="{2054F4C8-8273-4378-9A3F-F9A86F4C8C7B}" sibTransId="{24D379E1-CA8F-460F-B153-FE6939270DC3}"/>
+    <dgm:cxn modelId="{93FCFB8A-D450-46EB-BD80-A7A04FCBEE13}" type="presOf" srcId="{4ED107CA-8285-4DE2-BA66-9D4A615CAE4F}" destId="{B88B3516-6B79-470F-B106-1B0BC6A30CC1}" srcOrd="0" destOrd="0" presId="urn:microsoft.com/office/officeart/2005/8/layout/hierarchy1"/>
+    <dgm:cxn modelId="{BBE23D94-9B13-4F60-91AE-5DE796C02FB3}" type="presOf" srcId="{CE1D68A5-D2DC-4199-8043-ECF5EEB262FC}" destId="{1C8B9953-92A0-46D4-BAC8-CA7F10B55BD1}" srcOrd="0" destOrd="0" presId="urn:microsoft.com/office/officeart/2005/8/layout/hierarchy1"/>
+    <dgm:cxn modelId="{089E2499-DB10-405D-9227-4F77C30DBA24}" type="presOf" srcId="{5BE8912E-F7E6-4741-AD28-CD50A0F3FE44}" destId="{AD6B6B89-1ECF-453F-912B-B1A6F8AE1265}" srcOrd="0" destOrd="0" presId="urn:microsoft.com/office/officeart/2005/8/layout/hierarchy1"/>
+    <dgm:cxn modelId="{57D2CFB6-F80C-4683-B571-DD42C3903BD3}" type="presOf" srcId="{C1F74533-A485-40FE-A076-533BE33557CB}" destId="{1D0B4E1E-33A1-40A1-8A3E-0DB1E21DCA3A}" srcOrd="0" destOrd="0" presId="urn:microsoft.com/office/officeart/2005/8/layout/hierarchy1"/>
+    <dgm:cxn modelId="{A2A3F5D4-33E5-49FD-91E9-B0DDFF19CE73}" type="presOf" srcId="{FBFBE81D-1280-43A7-B0EE-8A75D5885A47}" destId="{FB858AB2-ECF6-4E44-B50D-C334C8F0A141}" srcOrd="0" destOrd="0" presId="urn:microsoft.com/office/officeart/2005/8/layout/hierarchy1"/>
+    <dgm:cxn modelId="{7A05F9DB-AA3D-4501-B484-569E80199AFF}" srcId="{30B61FC0-6916-4B93-8E53-5797D7790B59}" destId="{41BC46B4-BDE9-423F-8906-3CE849E62A0F}" srcOrd="3" destOrd="0" parTransId="{3DB32D63-50B1-4A40-BC8F-16FD88AAAEB9}" sibTransId="{E5159E96-7206-4C6F-8266-5323CDFC54F7}"/>
     <dgm:cxn modelId="{483147DE-DF2D-4383-8A0D-B5AB9931B73A}" srcId="{30B61FC0-6916-4B93-8E53-5797D7790B59}" destId="{5BE8912E-F7E6-4741-AD28-CD50A0F3FE44}" srcOrd="0" destOrd="0" parTransId="{C8FEA318-3924-4899-A2E8-A1364F402575}" sibTransId="{FD83C4B1-223B-442A-83EB-DDC69F7A4E5B}"/>
-    <dgm:cxn modelId="{00D20F50-7921-45E2-9DE9-6A4258565866}" srcId="{30B61FC0-6916-4B93-8E53-5797D7790B59}" destId="{FBFBE81D-1280-43A7-B0EE-8A75D5885A47}" srcOrd="6" destOrd="0" parTransId="{A8F460DF-102C-4A4D-92E8-31EEBB42F5C4}" sibTransId="{69E80C92-3388-4BA2-B497-94BD00BA6F66}"/>
-    <dgm:cxn modelId="{8C0D4711-41B6-4BC9-BB47-093CD28C31C3}" type="presOf" srcId="{41BC46B4-BDE9-423F-8906-3CE849E62A0F}" destId="{71EA9CD4-3EDF-4CF5-8F59-27BEC082950C}" srcOrd="0" destOrd="0" presId="urn:microsoft.com/office/officeart/2005/8/layout/hierarchy1"/>
-    <dgm:cxn modelId="{089E2499-DB10-405D-9227-4F77C30DBA24}" type="presOf" srcId="{5BE8912E-F7E6-4741-AD28-CD50A0F3FE44}" destId="{AD6B6B89-1ECF-453F-912B-B1A6F8AE1265}" srcOrd="0" destOrd="0" presId="urn:microsoft.com/office/officeart/2005/8/layout/hierarchy1"/>
-    <dgm:cxn modelId="{BBE23D94-9B13-4F60-91AE-5DE796C02FB3}" type="presOf" srcId="{CE1D68A5-D2DC-4199-8043-ECF5EEB262FC}" destId="{1C8B9953-92A0-46D4-BAC8-CA7F10B55BD1}" srcOrd="0" destOrd="0" presId="urn:microsoft.com/office/officeart/2005/8/layout/hierarchy1"/>
-    <dgm:cxn modelId="{6A908209-7FE8-4A30-BC52-E18F9CF5C69D}" srcId="{30B61FC0-6916-4B93-8E53-5797D7790B59}" destId="{4ED107CA-8285-4DE2-BA66-9D4A615CAE4F}" srcOrd="4" destOrd="0" parTransId="{29C70813-4109-40A4-B8E5-DFE6BAD972B1}" sibTransId="{8D06C245-CC47-497B-A521-361C950D2E29}"/>
-    <dgm:cxn modelId="{A2A3F5D4-33E5-49FD-91E9-B0DDFF19CE73}" type="presOf" srcId="{FBFBE81D-1280-43A7-B0EE-8A75D5885A47}" destId="{FB858AB2-ECF6-4E44-B50D-C334C8F0A141}" srcOrd="0" destOrd="0" presId="urn:microsoft.com/office/officeart/2005/8/layout/hierarchy1"/>
-    <dgm:cxn modelId="{E277FA2B-0CED-46B1-9A2D-65359A4CF684}" type="presOf" srcId="{9643240F-2EA4-4743-B38B-E754AFDD0BD3}" destId="{8275085D-A526-4531-A609-26C3A8D97E3D}" srcOrd="0" destOrd="0" presId="urn:microsoft.com/office/officeart/2005/8/layout/hierarchy1"/>
-    <dgm:cxn modelId="{93FCFB8A-D450-46EB-BD80-A7A04FCBEE13}" type="presOf" srcId="{4ED107CA-8285-4DE2-BA66-9D4A615CAE4F}" destId="{B88B3516-6B79-470F-B106-1B0BC6A30CC1}" srcOrd="0" destOrd="0" presId="urn:microsoft.com/office/officeart/2005/8/layout/hierarchy1"/>
     <dgm:cxn modelId="{2BBC37EB-894B-421D-BF1D-7B6EB2EB8CC1}" srcId="{30B61FC0-6916-4B93-8E53-5797D7790B59}" destId="{9643240F-2EA4-4743-B38B-E754AFDD0BD3}" srcOrd="1" destOrd="0" parTransId="{060E55F1-7310-48FE-B31E-3480C6222EF8}" sibTransId="{9AD560D0-78DA-4521-AEB5-47F0E29F5FBC}"/>
-    <dgm:cxn modelId="{53B8304B-C520-4C50-BC51-D954F126CCF7}" srcId="{30B61FC0-6916-4B93-8E53-5797D7790B59}" destId="{C1F74533-A485-40FE-A076-533BE33557CB}" srcOrd="2" destOrd="0" parTransId="{6A54022B-2CDF-4FDD-B3BF-884E4F64FEF6}" sibTransId="{9D8044DC-19E6-4BD8-A466-4E120D6CFD8A}"/>
-    <dgm:cxn modelId="{7A05F9DB-AA3D-4501-B484-569E80199AFF}" srcId="{30B61FC0-6916-4B93-8E53-5797D7790B59}" destId="{41BC46B4-BDE9-423F-8906-3CE849E62A0F}" srcOrd="3" destOrd="0" parTransId="{3DB32D63-50B1-4A40-BC8F-16FD88AAAEB9}" sibTransId="{E5159E96-7206-4C6F-8266-5323CDFC54F7}"/>
-    <dgm:cxn modelId="{5AAE7D56-44FA-4356-8E0F-3BDBCEF71831}" srcId="{30B61FC0-6916-4B93-8E53-5797D7790B59}" destId="{CE1D68A5-D2DC-4199-8043-ECF5EEB262FC}" srcOrd="5" destOrd="0" parTransId="{2054F4C8-8273-4378-9A3F-F9A86F4C8C7B}" sibTransId="{24D379E1-CA8F-460F-B153-FE6939270DC3}"/>
-    <dgm:cxn modelId="{57D2CFB6-F80C-4683-B571-DD42C3903BD3}" type="presOf" srcId="{C1F74533-A485-40FE-A076-533BE33557CB}" destId="{1D0B4E1E-33A1-40A1-8A3E-0DB1E21DCA3A}" srcOrd="0" destOrd="0" presId="urn:microsoft.com/office/officeart/2005/8/layout/hierarchy1"/>
-    <dgm:cxn modelId="{0F94086D-4038-4353-AF3B-889F2D91DBF5}" type="presOf" srcId="{30B61FC0-6916-4B93-8E53-5797D7790B59}" destId="{D382EBAF-A88C-4ED6-B155-125AA0C1898C}" srcOrd="0" destOrd="0" presId="urn:microsoft.com/office/officeart/2005/8/layout/hierarchy1"/>
     <dgm:cxn modelId="{62BDB2ED-483B-4422-948C-2260A7F19ACB}" type="presParOf" srcId="{D382EBAF-A88C-4ED6-B155-125AA0C1898C}" destId="{C3F9C80B-9405-4FA7-AC3C-0C945666B357}" srcOrd="0" destOrd="0" presId="urn:microsoft.com/office/officeart/2005/8/layout/hierarchy1"/>
     <dgm:cxn modelId="{315CB453-7BC8-4F9C-84C1-F6D1E30ED56C}" type="presParOf" srcId="{C3F9C80B-9405-4FA7-AC3C-0C945666B357}" destId="{A110C856-4886-4CD0-84C0-92933E4F0C5F}" srcOrd="0" destOrd="0" presId="urn:microsoft.com/office/officeart/2005/8/layout/hierarchy1"/>
     <dgm:cxn modelId="{7102147C-CD2B-498E-83A0-21DCD5FF1DAE}" type="presParOf" srcId="{A110C856-4886-4CD0-84C0-92933E4F0C5F}" destId="{5ADC3D4B-B3A5-4B78-8223-E12DEBC8DDED}" srcOrd="0" destOrd="0" presId="urn:microsoft.com/office/officeart/2005/8/layout/hierarchy1"/>
@@ -3505,13 +3444,6 @@
         </dgm:presLayoutVars>
       </dgm:prSet>
       <dgm:spPr/>
-      <dgm:t>
-        <a:bodyPr/>
-        <a:lstStyle/>
-        <a:p>
-          <a:endParaRPr lang="en-US"/>
-        </a:p>
-      </dgm:t>
     </dgm:pt>
     <dgm:pt modelId="{4AA4CE58-D451-4ACB-86D1-52C5317FFC6F}" type="pres">
       <dgm:prSet presAssocID="{6E91D42A-B735-411E-B998-D907F8BB622B}" presName="parentText" presStyleLbl="node1" presStyleIdx="0" presStyleCnt="3">
@@ -3521,13 +3453,6 @@
         </dgm:presLayoutVars>
       </dgm:prSet>
       <dgm:spPr/>
-      <dgm:t>
-        <a:bodyPr/>
-        <a:lstStyle/>
-        <a:p>
-          <a:endParaRPr lang="en-US"/>
-        </a:p>
-      </dgm:t>
     </dgm:pt>
     <dgm:pt modelId="{76F7D7C5-14B1-49F7-AA2E-D3CBEC097DBE}" type="pres">
       <dgm:prSet presAssocID="{EACCB02A-769F-4057-B50D-BDE5805B1B14}" presName="spacer" presStyleCnt="0"/>
@@ -3541,13 +3466,6 @@
         </dgm:presLayoutVars>
       </dgm:prSet>
       <dgm:spPr/>
-      <dgm:t>
-        <a:bodyPr/>
-        <a:lstStyle/>
-        <a:p>
-          <a:endParaRPr lang="en-US"/>
-        </a:p>
-      </dgm:t>
     </dgm:pt>
     <dgm:pt modelId="{397D2CB8-FB79-4BC2-A937-1D79CEE4EC3C}" type="pres">
       <dgm:prSet presAssocID="{FBFEED40-EB4C-4599-8814-184A141EEEC5}" presName="spacer" presStyleCnt="0"/>
@@ -3561,23 +3479,16 @@
         </dgm:presLayoutVars>
       </dgm:prSet>
       <dgm:spPr/>
-      <dgm:t>
-        <a:bodyPr/>
-        <a:lstStyle/>
-        <a:p>
-          <a:endParaRPr lang="en-US"/>
-        </a:p>
-      </dgm:t>
     </dgm:pt>
   </dgm:ptLst>
   <dgm:cxnLst>
+    <dgm:cxn modelId="{EBA13F0B-1D8F-4255-8B4C-B155A795DAA0}" srcId="{771DB913-69A1-458A-8801-CE6C9A84DC4A}" destId="{0DD6AA72-7546-4D31-AA9A-CE4FB76822FC}" srcOrd="1" destOrd="0" parTransId="{04037E6B-FA05-4CEE-A7CF-F10E0797FD1A}" sibTransId="{FBFEED40-EB4C-4599-8814-184A141EEEC5}"/>
     <dgm:cxn modelId="{F2FC140E-7B73-459A-9C2C-4FAA0E74E50D}" type="presOf" srcId="{C3D8D874-FE24-421D-94FA-F836C33F0278}" destId="{D120A8E9-9295-4604-A66A-4A5478433D3B}" srcOrd="0" destOrd="0" presId="urn:microsoft.com/office/officeart/2005/8/layout/vList2"/>
+    <dgm:cxn modelId="{7268894C-2BFB-4014-AA51-7D80C502A015}" type="presOf" srcId="{6E91D42A-B735-411E-B998-D907F8BB622B}" destId="{4AA4CE58-D451-4ACB-86D1-52C5317FFC6F}" srcOrd="0" destOrd="0" presId="urn:microsoft.com/office/officeart/2005/8/layout/vList2"/>
+    <dgm:cxn modelId="{ABEE71B1-CD8E-4F3D-B606-57181A1C1B3C}" srcId="{771DB913-69A1-458A-8801-CE6C9A84DC4A}" destId="{6E91D42A-B735-411E-B998-D907F8BB622B}" srcOrd="0" destOrd="0" parTransId="{E37BCB76-5458-4C0C-8AF0-36D61A5E814A}" sibTransId="{EACCB02A-769F-4057-B50D-BDE5805B1B14}"/>
+    <dgm:cxn modelId="{4427BDB6-02B8-4361-933D-117AD7D711D4}" type="presOf" srcId="{771DB913-69A1-458A-8801-CE6C9A84DC4A}" destId="{0C0D151C-5042-4199-9BF9-EA7851D46770}" srcOrd="0" destOrd="0" presId="urn:microsoft.com/office/officeart/2005/8/layout/vList2"/>
+    <dgm:cxn modelId="{51AB14BE-C0F7-44C8-A003-E1859B86770A}" type="presOf" srcId="{0DD6AA72-7546-4D31-AA9A-CE4FB76822FC}" destId="{EAC848E8-85E1-4AFA-8307-BC4296BBBFA1}" srcOrd="0" destOrd="0" presId="urn:microsoft.com/office/officeart/2005/8/layout/vList2"/>
     <dgm:cxn modelId="{3282E7F6-160D-4DC7-9627-6958C703A287}" srcId="{771DB913-69A1-458A-8801-CE6C9A84DC4A}" destId="{C3D8D874-FE24-421D-94FA-F836C33F0278}" srcOrd="2" destOrd="0" parTransId="{0CA8D8D8-BB5B-49C8-8E5C-12A8D1BD0C49}" sibTransId="{9A9E2545-A51E-4DBA-B599-F299AA3030D4}"/>
-    <dgm:cxn modelId="{4427BDB6-02B8-4361-933D-117AD7D711D4}" type="presOf" srcId="{771DB913-69A1-458A-8801-CE6C9A84DC4A}" destId="{0C0D151C-5042-4199-9BF9-EA7851D46770}" srcOrd="0" destOrd="0" presId="urn:microsoft.com/office/officeart/2005/8/layout/vList2"/>
-    <dgm:cxn modelId="{7268894C-2BFB-4014-AA51-7D80C502A015}" type="presOf" srcId="{6E91D42A-B735-411E-B998-D907F8BB622B}" destId="{4AA4CE58-D451-4ACB-86D1-52C5317FFC6F}" srcOrd="0" destOrd="0" presId="urn:microsoft.com/office/officeart/2005/8/layout/vList2"/>
-    <dgm:cxn modelId="{51AB14BE-C0F7-44C8-A003-E1859B86770A}" type="presOf" srcId="{0DD6AA72-7546-4D31-AA9A-CE4FB76822FC}" destId="{EAC848E8-85E1-4AFA-8307-BC4296BBBFA1}" srcOrd="0" destOrd="0" presId="urn:microsoft.com/office/officeart/2005/8/layout/vList2"/>
-    <dgm:cxn modelId="{EBA13F0B-1D8F-4255-8B4C-B155A795DAA0}" srcId="{771DB913-69A1-458A-8801-CE6C9A84DC4A}" destId="{0DD6AA72-7546-4D31-AA9A-CE4FB76822FC}" srcOrd="1" destOrd="0" parTransId="{04037E6B-FA05-4CEE-A7CF-F10E0797FD1A}" sibTransId="{FBFEED40-EB4C-4599-8814-184A141EEEC5}"/>
-    <dgm:cxn modelId="{ABEE71B1-CD8E-4F3D-B606-57181A1C1B3C}" srcId="{771DB913-69A1-458A-8801-CE6C9A84DC4A}" destId="{6E91D42A-B735-411E-B998-D907F8BB622B}" srcOrd="0" destOrd="0" parTransId="{E37BCB76-5458-4C0C-8AF0-36D61A5E814A}" sibTransId="{EACCB02A-769F-4057-B50D-BDE5805B1B14}"/>
     <dgm:cxn modelId="{39E6BD0F-6CFB-4F3A-B2E7-30A3B554B2C4}" type="presParOf" srcId="{0C0D151C-5042-4199-9BF9-EA7851D46770}" destId="{4AA4CE58-D451-4ACB-86D1-52C5317FFC6F}" srcOrd="0" destOrd="0" presId="urn:microsoft.com/office/officeart/2005/8/layout/vList2"/>
     <dgm:cxn modelId="{D1CA4DC4-FDAF-42DE-B738-31313B19E814}" type="presParOf" srcId="{0C0D151C-5042-4199-9BF9-EA7851D46770}" destId="{76F7D7C5-14B1-49F7-AA2E-D3CBEC097DBE}" srcOrd="1" destOrd="0" presId="urn:microsoft.com/office/officeart/2005/8/layout/vList2"/>
     <dgm:cxn modelId="{9F186DEB-8628-441D-95CE-8CC7D982E0F6}" type="presParOf" srcId="{0C0D151C-5042-4199-9BF9-EA7851D46770}" destId="{EAC848E8-85E1-4AFA-8307-BC4296BBBFA1}" srcOrd="2" destOrd="0" presId="urn:microsoft.com/office/officeart/2005/8/layout/vList2"/>
@@ -3622,7 +3533,7 @@
                 <a14:useLocalDpi xmlns:a14="http://schemas.microsoft.com/office/drawing/2010/main" val="0"/>
               </a:ext>
               <a:ext uri="{96DAC541-7B7A-43D3-8B79-37D633B846F1}">
-                <asvg:svgBlip xmlns:asvg="http://schemas.microsoft.com/office/drawing/2016/SVG/main" xmlns="" r:embed="rId2"/>
+                <asvg:svgBlip xmlns:asvg="http://schemas.microsoft.com/office/drawing/2016/SVG/main" r:embed="rId2"/>
               </a:ext>
             </a:extLst>
           </a:blip>
@@ -3688,7 +3599,7 @@
         </a:bodyPr>
         <a:lstStyle/>
         <a:p>
-          <a:pPr lvl="0" algn="ctr" defTabSz="755650">
+          <a:pPr marL="0" lvl="0" indent="0" algn="ctr" defTabSz="755650">
             <a:lnSpc>
               <a:spcPct val="90000"/>
             </a:lnSpc>
@@ -3698,6 +3609,7 @@
             <a:spcAft>
               <a:spcPct val="35000"/>
             </a:spcAft>
+            <a:buNone/>
           </a:pPr>
           <a:r>
             <a:rPr lang="en-US" sz="1700" b="0" i="0" kern="1200"/>
@@ -3731,7 +3643,7 @@
                 <a14:useLocalDpi xmlns:a14="http://schemas.microsoft.com/office/drawing/2010/main" val="0"/>
               </a:ext>
               <a:ext uri="{96DAC541-7B7A-43D3-8B79-37D633B846F1}">
-                <asvg:svgBlip xmlns:asvg="http://schemas.microsoft.com/office/drawing/2016/SVG/main" xmlns="" r:embed="rId4"/>
+                <asvg:svgBlip xmlns:asvg="http://schemas.microsoft.com/office/drawing/2016/SVG/main" r:embed="rId4"/>
               </a:ext>
             </a:extLst>
           </a:blip>
@@ -3797,7 +3709,7 @@
         </a:bodyPr>
         <a:lstStyle/>
         <a:p>
-          <a:pPr lvl="0" algn="ctr" defTabSz="755650">
+          <a:pPr marL="0" lvl="0" indent="0" algn="ctr" defTabSz="755650">
             <a:lnSpc>
               <a:spcPct val="90000"/>
             </a:lnSpc>
@@ -3807,6 +3719,7 @@
             <a:spcAft>
               <a:spcPct val="35000"/>
             </a:spcAft>
+            <a:buNone/>
           </a:pPr>
           <a:r>
             <a:rPr lang="en-US" sz="1700" b="0" i="0" kern="1200"/>
@@ -3938,7 +3851,7 @@
         </a:bodyPr>
         <a:lstStyle/>
         <a:p>
-          <a:pPr lvl="0" algn="ctr" defTabSz="933450">
+          <a:pPr marL="0" lvl="0" indent="0" algn="ctr" defTabSz="933450">
             <a:lnSpc>
               <a:spcPct val="90000"/>
             </a:lnSpc>
@@ -3948,6 +3861,7 @@
             <a:spcAft>
               <a:spcPct val="35000"/>
             </a:spcAft>
+            <a:buNone/>
           </a:pPr>
           <a:r>
             <a:rPr lang="en-US" sz="2100" b="0" i="0" kern="1200" dirty="0"/>
@@ -4067,7 +3981,7 @@
         </a:bodyPr>
         <a:lstStyle/>
         <a:p>
-          <a:pPr lvl="0" algn="ctr" defTabSz="933450">
+          <a:pPr marL="0" lvl="0" indent="0" algn="ctr" defTabSz="933450">
             <a:lnSpc>
               <a:spcPct val="90000"/>
             </a:lnSpc>
@@ -4077,6 +3991,7 @@
             <a:spcAft>
               <a:spcPct val="35000"/>
             </a:spcAft>
+            <a:buNone/>
           </a:pPr>
           <a:r>
             <a:rPr lang="en-US" sz="2100" b="0" i="0" kern="1200" dirty="0"/>
@@ -4196,7 +4111,7 @@
         </a:bodyPr>
         <a:lstStyle/>
         <a:p>
-          <a:pPr lvl="0" algn="ctr" defTabSz="933450">
+          <a:pPr marL="0" lvl="0" indent="0" algn="ctr" defTabSz="933450">
             <a:lnSpc>
               <a:spcPct val="90000"/>
             </a:lnSpc>
@@ -4206,6 +4121,7 @@
             <a:spcAft>
               <a:spcPct val="35000"/>
             </a:spcAft>
+            <a:buNone/>
           </a:pPr>
           <a:r>
             <a:rPr lang="en-US" sz="2100" b="0" i="0" kern="1200"/>
@@ -4325,7 +4241,7 @@
         </a:bodyPr>
         <a:lstStyle/>
         <a:p>
-          <a:pPr lvl="0" algn="ctr" defTabSz="933450">
+          <a:pPr marL="0" lvl="0" indent="0" algn="ctr" defTabSz="933450">
             <a:lnSpc>
               <a:spcPct val="90000"/>
             </a:lnSpc>
@@ -4335,6 +4251,7 @@
             <a:spcAft>
               <a:spcPct val="35000"/>
             </a:spcAft>
+            <a:buNone/>
           </a:pPr>
           <a:r>
             <a:rPr lang="en-US" sz="2100" kern="1200" dirty="0" err="1"/>
@@ -4457,7 +4374,7 @@
         </a:bodyPr>
         <a:lstStyle/>
         <a:p>
-          <a:pPr lvl="0" algn="ctr" defTabSz="933450">
+          <a:pPr marL="0" lvl="0" indent="0" algn="ctr" defTabSz="933450">
             <a:lnSpc>
               <a:spcPct val="90000"/>
             </a:lnSpc>
@@ -4467,6 +4384,7 @@
             <a:spcAft>
               <a:spcPct val="35000"/>
             </a:spcAft>
+            <a:buNone/>
           </a:pPr>
           <a:r>
             <a:rPr lang="en-US" sz="2100" b="0" i="0" kern="1200" dirty="0"/>
@@ -4586,7 +4504,7 @@
         </a:bodyPr>
         <a:lstStyle/>
         <a:p>
-          <a:pPr lvl="0" algn="ctr" defTabSz="933450">
+          <a:pPr marL="0" lvl="0" indent="0" algn="ctr" defTabSz="933450">
             <a:lnSpc>
               <a:spcPct val="90000"/>
             </a:lnSpc>
@@ -4596,6 +4514,7 @@
             <a:spcAft>
               <a:spcPct val="35000"/>
             </a:spcAft>
+            <a:buNone/>
           </a:pPr>
           <a:r>
             <a:rPr lang="en-US" sz="2100" b="0" i="0" kern="1200" dirty="0"/>
@@ -4715,7 +4634,7 @@
         </a:bodyPr>
         <a:lstStyle/>
         <a:p>
-          <a:pPr lvl="0" algn="ctr" defTabSz="933450">
+          <a:pPr marL="0" lvl="0" indent="0" algn="ctr" defTabSz="933450">
             <a:lnSpc>
               <a:spcPct val="90000"/>
             </a:lnSpc>
@@ -4725,6 +4644,7 @@
             <a:spcAft>
               <a:spcPct val="35000"/>
             </a:spcAft>
+            <a:buNone/>
           </a:pPr>
           <a:r>
             <a:rPr lang="en-US" sz="2100" kern="1200" dirty="0"/>
@@ -4818,7 +4738,7 @@
         </a:bodyPr>
         <a:lstStyle/>
         <a:p>
-          <a:pPr lvl="0" algn="l" defTabSz="1600200">
+          <a:pPr marL="0" lvl="0" indent="0" algn="l" defTabSz="1600200">
             <a:lnSpc>
               <a:spcPct val="90000"/>
             </a:lnSpc>
@@ -4828,6 +4748,7 @@
             <a:spcAft>
               <a:spcPct val="35000"/>
             </a:spcAft>
+            <a:buNone/>
           </a:pPr>
           <a:r>
             <a:rPr lang="en-US" sz="3600" b="0" i="0" kern="1200"/>
@@ -4910,7 +4831,7 @@
         </a:bodyPr>
         <a:lstStyle/>
         <a:p>
-          <a:pPr lvl="0" algn="l" defTabSz="1600200">
+          <a:pPr marL="0" lvl="0" indent="0" algn="l" defTabSz="1600200">
             <a:lnSpc>
               <a:spcPct val="90000"/>
             </a:lnSpc>
@@ -4920,6 +4841,7 @@
             <a:spcAft>
               <a:spcPct val="35000"/>
             </a:spcAft>
+            <a:buNone/>
           </a:pPr>
           <a:r>
             <a:rPr lang="en-US" sz="3600" b="0" i="0" kern="1200"/>
@@ -5002,7 +4924,7 @@
         </a:bodyPr>
         <a:lstStyle/>
         <a:p>
-          <a:pPr lvl="0" algn="l" defTabSz="1600200">
+          <a:pPr marL="0" lvl="0" indent="0" algn="l" defTabSz="1600200">
             <a:lnSpc>
               <a:spcPct val="90000"/>
             </a:lnSpc>
@@ -5012,6 +4934,7 @@
             <a:spcAft>
               <a:spcPct val="35000"/>
             </a:spcAft>
+            <a:buNone/>
           </a:pPr>
           <a:r>
             <a:rPr lang="en-US" sz="3600" b="0" i="0" kern="1200"/>
@@ -5207,7 +5130,7 @@
   </dgm:layoutNode>
   <dgm:extLst>
     <a:ext uri="{68A01E43-0DF5-4B5B-8FA6-DAF915123BFB}">
-      <dgm1612:lstStyle xmlns:dgm1612="http://schemas.microsoft.com/office/drawing/2016/12/diagram" xmlns="">
+      <dgm1612:lstStyle xmlns:dgm1612="http://schemas.microsoft.com/office/drawing/2016/12/diagram">
         <a:lvl1pPr>
           <a:lnSpc>
             <a:spcPct val="100000"/>
@@ -9237,7 +9160,7 @@
           <a:p>
             <a:fld id="{B6A61E56-E98B-43EA-864C-C4930E1DF12A}" type="datetimeFigureOut">
               <a:rPr lang="en-US" smtClean="0"/>
-              <a:t>8/19/2021</a:t>
+              <a:t>8/20/2021</a:t>
             </a:fld>
             <a:endParaRPr lang="en-US"/>
           </a:p>
@@ -9512,7 +9435,7 @@
           <a:p>
             <a:fld id="{B6A61E56-E98B-43EA-864C-C4930E1DF12A}" type="datetimeFigureOut">
               <a:rPr lang="en-US" smtClean="0"/>
-              <a:t>8/19/2021</a:t>
+              <a:t>8/20/2021</a:t>
             </a:fld>
             <a:endParaRPr lang="en-US"/>
           </a:p>
@@ -9706,7 +9629,7 @@
           <a:p>
             <a:fld id="{B6A61E56-E98B-43EA-864C-C4930E1DF12A}" type="datetimeFigureOut">
               <a:rPr lang="en-US" smtClean="0"/>
-              <a:t>8/19/2021</a:t>
+              <a:t>8/20/2021</a:t>
             </a:fld>
             <a:endParaRPr lang="en-US"/>
           </a:p>
@@ -9979,7 +9902,7 @@
           <a:p>
             <a:fld id="{B6A61E56-E98B-43EA-864C-C4930E1DF12A}" type="datetimeFigureOut">
               <a:rPr lang="en-US" smtClean="0"/>
-              <a:t>8/19/2021</a:t>
+              <a:t>8/20/2021</a:t>
             </a:fld>
             <a:endParaRPr lang="en-US"/>
           </a:p>
@@ -10320,7 +10243,7 @@
           <a:p>
             <a:fld id="{B6A61E56-E98B-43EA-864C-C4930E1DF12A}" type="datetimeFigureOut">
               <a:rPr lang="en-US" smtClean="0"/>
-              <a:t>8/19/2021</a:t>
+              <a:t>8/20/2021</a:t>
             </a:fld>
             <a:endParaRPr lang="en-US"/>
           </a:p>
@@ -10943,7 +10866,7 @@
           <a:p>
             <a:fld id="{B6A61E56-E98B-43EA-864C-C4930E1DF12A}" type="datetimeFigureOut">
               <a:rPr lang="en-US" smtClean="0"/>
-              <a:t>8/19/2021</a:t>
+              <a:t>8/20/2021</a:t>
             </a:fld>
             <a:endParaRPr lang="en-US"/>
           </a:p>
@@ -11803,7 +11726,7 @@
           <a:p>
             <a:fld id="{B6A61E56-E98B-43EA-864C-C4930E1DF12A}" type="datetimeFigureOut">
               <a:rPr lang="en-US" smtClean="0"/>
-              <a:t>8/19/2021</a:t>
+              <a:t>8/20/2021</a:t>
             </a:fld>
             <a:endParaRPr lang="en-US"/>
           </a:p>
@@ -11973,7 +11896,7 @@
           <a:p>
             <a:fld id="{B6A61E56-E98B-43EA-864C-C4930E1DF12A}" type="datetimeFigureOut">
               <a:rPr lang="en-US" smtClean="0"/>
-              <a:t>8/19/2021</a:t>
+              <a:t>8/20/2021</a:t>
             </a:fld>
             <a:endParaRPr lang="en-US"/>
           </a:p>
@@ -12153,7 +12076,7 @@
           <a:p>
             <a:fld id="{B6A61E56-E98B-43EA-864C-C4930E1DF12A}" type="datetimeFigureOut">
               <a:rPr lang="en-US" smtClean="0"/>
-              <a:t>8/19/2021</a:t>
+              <a:t>8/20/2021</a:t>
             </a:fld>
             <a:endParaRPr lang="en-US"/>
           </a:p>
@@ -12323,7 +12246,7 @@
           <a:p>
             <a:fld id="{B6A61E56-E98B-43EA-864C-C4930E1DF12A}" type="datetimeFigureOut">
               <a:rPr lang="en-US" smtClean="0"/>
-              <a:t>8/19/2021</a:t>
+              <a:t>8/20/2021</a:t>
             </a:fld>
             <a:endParaRPr lang="en-US"/>
           </a:p>
@@ -12570,7 +12493,7 @@
           <a:p>
             <a:fld id="{B6A61E56-E98B-43EA-864C-C4930E1DF12A}" type="datetimeFigureOut">
               <a:rPr lang="en-US" smtClean="0"/>
-              <a:t>8/19/2021</a:t>
+              <a:t>8/20/2021</a:t>
             </a:fld>
             <a:endParaRPr lang="en-US"/>
           </a:p>
@@ -12862,7 +12785,7 @@
           <a:p>
             <a:fld id="{B6A61E56-E98B-43EA-864C-C4930E1DF12A}" type="datetimeFigureOut">
               <a:rPr lang="en-US" smtClean="0"/>
-              <a:t>8/19/2021</a:t>
+              <a:t>8/20/2021</a:t>
             </a:fld>
             <a:endParaRPr lang="en-US"/>
           </a:p>
@@ -13306,7 +13229,7 @@
           <a:p>
             <a:fld id="{B6A61E56-E98B-43EA-864C-C4930E1DF12A}" type="datetimeFigureOut">
               <a:rPr lang="en-US" smtClean="0"/>
-              <a:t>8/19/2021</a:t>
+              <a:t>8/20/2021</a:t>
             </a:fld>
             <a:endParaRPr lang="en-US"/>
           </a:p>
@@ -13424,7 +13347,7 @@
           <a:p>
             <a:fld id="{B6A61E56-E98B-43EA-864C-C4930E1DF12A}" type="datetimeFigureOut">
               <a:rPr lang="en-US" smtClean="0"/>
-              <a:t>8/19/2021</a:t>
+              <a:t>8/20/2021</a:t>
             </a:fld>
             <a:endParaRPr lang="en-US"/>
           </a:p>
@@ -13519,7 +13442,7 @@
           <a:p>
             <a:fld id="{B6A61E56-E98B-43EA-864C-C4930E1DF12A}" type="datetimeFigureOut">
               <a:rPr lang="en-US" smtClean="0"/>
-              <a:t>8/19/2021</a:t>
+              <a:t>8/20/2021</a:t>
             </a:fld>
             <a:endParaRPr lang="en-US"/>
           </a:p>
@@ -13798,7 +13721,7 @@
           <a:p>
             <a:fld id="{B6A61E56-E98B-43EA-864C-C4930E1DF12A}" type="datetimeFigureOut">
               <a:rPr lang="en-US" smtClean="0"/>
-              <a:t>8/19/2021</a:t>
+              <a:t>8/20/2021</a:t>
             </a:fld>
             <a:endParaRPr lang="en-US"/>
           </a:p>
@@ -14073,7 +13996,7 @@
           <a:p>
             <a:fld id="{B6A61E56-E98B-43EA-864C-C4930E1DF12A}" type="datetimeFigureOut">
               <a:rPr lang="en-US" smtClean="0"/>
-              <a:t>8/19/2021</a:t>
+              <a:t>8/20/2021</a:t>
             </a:fld>
             <a:endParaRPr lang="en-US"/>
           </a:p>
@@ -14502,7 +14425,7 @@
           <a:p>
             <a:fld id="{B6A61E56-E98B-43EA-864C-C4930E1DF12A}" type="datetimeFigureOut">
               <a:rPr lang="en-US" smtClean="0"/>
-              <a:t>8/19/2021</a:t>
+              <a:t>8/20/2021</a:t>
             </a:fld>
             <a:endParaRPr lang="en-US"/>
           </a:p>
@@ -15035,7 +14958,7 @@
           <p:cNvPr id="2" name="Title 1">
             <a:extLst>
               <a:ext uri="{FF2B5EF4-FFF2-40B4-BE49-F238E27FC236}">
-                <a16:creationId xmlns:a16="http://schemas.microsoft.com/office/drawing/2014/main" xmlns="" id="{F9640BFD-99C0-4CAE-979D-FF1D0DDEAC29}"/>
+                <a16:creationId xmlns:a16="http://schemas.microsoft.com/office/drawing/2014/main" id="{F9640BFD-99C0-4CAE-979D-FF1D0DDEAC29}"/>
               </a:ext>
             </a:extLst>
           </p:cNvPr>
@@ -15063,7 +14986,7 @@
           <p:cNvPr id="3" name="Subtitle 2">
             <a:extLst>
               <a:ext uri="{FF2B5EF4-FFF2-40B4-BE49-F238E27FC236}">
-                <a16:creationId xmlns:a16="http://schemas.microsoft.com/office/drawing/2014/main" xmlns="" id="{330003F5-5600-47CA-B0D9-5E3666912921}"/>
+                <a16:creationId xmlns:a16="http://schemas.microsoft.com/office/drawing/2014/main" id="{330003F5-5600-47CA-B0D9-5E3666912921}"/>
               </a:ext>
             </a:extLst>
           </p:cNvPr>
@@ -15121,7 +15044,7 @@
           <p:cNvPr id="2" name="Title 1">
             <a:extLst>
               <a:ext uri="{FF2B5EF4-FFF2-40B4-BE49-F238E27FC236}">
-                <a16:creationId xmlns:a16="http://schemas.microsoft.com/office/drawing/2014/main" xmlns="" id="{950A93D4-9BA4-4FD6-919F-F1EAB2636F2F}"/>
+                <a16:creationId xmlns:a16="http://schemas.microsoft.com/office/drawing/2014/main" id="{950A93D4-9BA4-4FD6-919F-F1EAB2636F2F}"/>
               </a:ext>
             </a:extLst>
           </p:cNvPr>
@@ -15146,7 +15069,7 @@
           <p:cNvPr id="5" name="Content Placeholder 4" descr="Chart, line chart&#10;&#10;Description automatically generated">
             <a:extLst>
               <a:ext uri="{FF2B5EF4-FFF2-40B4-BE49-F238E27FC236}">
-                <a16:creationId xmlns:a16="http://schemas.microsoft.com/office/drawing/2014/main" xmlns="" id="{CDFA51B5-FC45-4362-BE5C-C93177B34ABB}"/>
+                <a16:creationId xmlns:a16="http://schemas.microsoft.com/office/drawing/2014/main" id="{CDFA51B5-FC45-4362-BE5C-C93177B34ABB}"/>
               </a:ext>
             </a:extLst>
           </p:cNvPr>
@@ -15211,7 +15134,7 @@
           <p:cNvPr id="2" name="Title 1">
             <a:extLst>
               <a:ext uri="{FF2B5EF4-FFF2-40B4-BE49-F238E27FC236}">
-                <a16:creationId xmlns:a16="http://schemas.microsoft.com/office/drawing/2014/main" xmlns="" id="{9810C2F3-4C8B-4498-8EC1-47E1408B031C}"/>
+                <a16:creationId xmlns:a16="http://schemas.microsoft.com/office/drawing/2014/main" id="{9810C2F3-4C8B-4498-8EC1-47E1408B031C}"/>
               </a:ext>
             </a:extLst>
           </p:cNvPr>
@@ -15236,7 +15159,7 @@
           <p:cNvPr id="5" name="Content Placeholder 4" descr="Chart, line chart&#10;&#10;Description automatically generated">
             <a:extLst>
               <a:ext uri="{FF2B5EF4-FFF2-40B4-BE49-F238E27FC236}">
-                <a16:creationId xmlns:a16="http://schemas.microsoft.com/office/drawing/2014/main" xmlns="" id="{977C57F1-1ADD-4CB0-A9C4-D858A4C4F253}"/>
+                <a16:creationId xmlns:a16="http://schemas.microsoft.com/office/drawing/2014/main" id="{977C57F1-1ADD-4CB0-A9C4-D858A4C4F253}"/>
               </a:ext>
             </a:extLst>
           </p:cNvPr>
@@ -15301,7 +15224,7 @@
           <p:cNvPr id="2" name="Title 1">
             <a:extLst>
               <a:ext uri="{FF2B5EF4-FFF2-40B4-BE49-F238E27FC236}">
-                <a16:creationId xmlns:a16="http://schemas.microsoft.com/office/drawing/2014/main" xmlns="" id="{2A7C19B6-3EC8-411A-B740-5F62ACDC0A8D}"/>
+                <a16:creationId xmlns:a16="http://schemas.microsoft.com/office/drawing/2014/main" id="{2A7C19B6-3EC8-411A-B740-5F62ACDC0A8D}"/>
               </a:ext>
             </a:extLst>
           </p:cNvPr>
@@ -15326,7 +15249,7 @@
           <p:cNvPr id="5" name="Content Placeholder 4" descr="Chart&#10;&#10;Description automatically generated">
             <a:extLst>
               <a:ext uri="{FF2B5EF4-FFF2-40B4-BE49-F238E27FC236}">
-                <a16:creationId xmlns:a16="http://schemas.microsoft.com/office/drawing/2014/main" xmlns="" id="{E0637F0F-3CF8-4D9C-8FE3-B293DBA476DA}"/>
+                <a16:creationId xmlns:a16="http://schemas.microsoft.com/office/drawing/2014/main" id="{E0637F0F-3CF8-4D9C-8FE3-B293DBA476DA}"/>
               </a:ext>
             </a:extLst>
           </p:cNvPr>
@@ -15391,7 +15314,7 @@
           <p:cNvPr id="2" name="Title 1">
             <a:extLst>
               <a:ext uri="{FF2B5EF4-FFF2-40B4-BE49-F238E27FC236}">
-                <a16:creationId xmlns:a16="http://schemas.microsoft.com/office/drawing/2014/main" xmlns="" id="{858C5976-5E4A-4FF5-8062-3391AD44CE50}"/>
+                <a16:creationId xmlns:a16="http://schemas.microsoft.com/office/drawing/2014/main" id="{858C5976-5E4A-4FF5-8062-3391AD44CE50}"/>
               </a:ext>
             </a:extLst>
           </p:cNvPr>
@@ -15416,7 +15339,7 @@
           <p:cNvPr id="5" name="Content Placeholder 4" descr="Chart, bar chart&#10;&#10;Description automatically generated">
             <a:extLst>
               <a:ext uri="{FF2B5EF4-FFF2-40B4-BE49-F238E27FC236}">
-                <a16:creationId xmlns:a16="http://schemas.microsoft.com/office/drawing/2014/main" xmlns="" id="{9AB88672-C06F-4E84-BD1D-90263C2D80FB}"/>
+                <a16:creationId xmlns:a16="http://schemas.microsoft.com/office/drawing/2014/main" id="{9AB88672-C06F-4E84-BD1D-90263C2D80FB}"/>
               </a:ext>
             </a:extLst>
           </p:cNvPr>
@@ -15505,10 +15428,10 @@
           <p:cNvPr id="8" name="Picture 7">
             <a:extLst>
               <a:ext uri="{FF2B5EF4-FFF2-40B4-BE49-F238E27FC236}">
-                <a16:creationId xmlns:a16="http://schemas.microsoft.com/office/drawing/2014/main" xmlns="" id="{91B28F63-CF00-448F-B141-FE33C33B1891}"/>
+                <a16:creationId xmlns:a16="http://schemas.microsoft.com/office/drawing/2014/main" id="{91B28F63-CF00-448F-B141-FE33C33B1891}"/>
               </a:ext>
               <a:ext uri="{C183D7F6-B498-43B3-948B-1728B52AA6E4}">
-                <adec:decorative xmlns:adec="http://schemas.microsoft.com/office/drawing/2017/decorative" xmlns="" val="1"/>
+                <adec:decorative xmlns:adec="http://schemas.microsoft.com/office/drawing/2017/decorative" val="1"/>
               </a:ext>
             </a:extLst>
           </p:cNvPr>
@@ -15518,7 +15441,7 @@
           <p:nvPr>
             <p:extLst>
               <p:ext uri="{386F3935-93C4-4BCD-93E2-E3B085C9AB24}">
-                <p16:designElem xmlns:p16="http://schemas.microsoft.com/office/powerpoint/2015/main" xmlns="" val="1"/>
+                <p16:designElem xmlns:p16="http://schemas.microsoft.com/office/powerpoint/2015/main" val="1"/>
               </p:ext>
             </p:extLst>
           </p:nvPr>
@@ -15549,10 +15472,10 @@
           <p:cNvPr id="10" name="Picture 9">
             <a:extLst>
               <a:ext uri="{FF2B5EF4-FFF2-40B4-BE49-F238E27FC236}">
-                <a16:creationId xmlns:a16="http://schemas.microsoft.com/office/drawing/2014/main" xmlns="" id="{2AE609E2-8522-44E4-9077-980E5BCF3E14}"/>
+                <a16:creationId xmlns:a16="http://schemas.microsoft.com/office/drawing/2014/main" id="{2AE609E2-8522-44E4-9077-980E5BCF3E14}"/>
               </a:ext>
               <a:ext uri="{C183D7F6-B498-43B3-948B-1728B52AA6E4}">
-                <adec:decorative xmlns:adec="http://schemas.microsoft.com/office/drawing/2017/decorative" xmlns="" val="1"/>
+                <adec:decorative xmlns:adec="http://schemas.microsoft.com/office/drawing/2017/decorative" val="1"/>
               </a:ext>
             </a:extLst>
           </p:cNvPr>
@@ -15562,7 +15485,7 @@
           <p:nvPr>
             <p:extLst>
               <p:ext uri="{386F3935-93C4-4BCD-93E2-E3B085C9AB24}">
-                <p16:designElem xmlns:p16="http://schemas.microsoft.com/office/powerpoint/2015/main" xmlns="" val="1"/>
+                <p16:designElem xmlns:p16="http://schemas.microsoft.com/office/powerpoint/2015/main" val="1"/>
               </p:ext>
             </p:extLst>
           </p:nvPr>
@@ -15593,10 +15516,10 @@
           <p:cNvPr id="12" name="Oval 11">
             <a:extLst>
               <a:ext uri="{FF2B5EF4-FFF2-40B4-BE49-F238E27FC236}">
-                <a16:creationId xmlns:a16="http://schemas.microsoft.com/office/drawing/2014/main" xmlns="" id="{4FA533C5-33E3-4611-AF9F-72811D8B26A6}"/>
+                <a16:creationId xmlns:a16="http://schemas.microsoft.com/office/drawing/2014/main" id="{4FA533C5-33E3-4611-AF9F-72811D8B26A6}"/>
               </a:ext>
               <a:ext uri="{C183D7F6-B498-43B3-948B-1728B52AA6E4}">
-                <adec:decorative xmlns:adec="http://schemas.microsoft.com/office/drawing/2017/decorative" xmlns="" val="1"/>
+                <adec:decorative xmlns:adec="http://schemas.microsoft.com/office/drawing/2017/decorative" val="1"/>
               </a:ext>
             </a:extLst>
           </p:cNvPr>
@@ -15606,7 +15529,7 @@
           <p:nvPr>
             <p:extLst>
               <p:ext uri="{386F3935-93C4-4BCD-93E2-E3B085C9AB24}">
-                <p16:designElem xmlns:p16="http://schemas.microsoft.com/office/powerpoint/2015/main" xmlns="" val="1"/>
+                <p16:designElem xmlns:p16="http://schemas.microsoft.com/office/powerpoint/2015/main" val="1"/>
               </p:ext>
             </p:extLst>
           </p:nvPr>
@@ -15673,10 +15596,10 @@
           <p:cNvPr id="14" name="Picture 13">
             <a:extLst>
               <a:ext uri="{FF2B5EF4-FFF2-40B4-BE49-F238E27FC236}">
-                <a16:creationId xmlns:a16="http://schemas.microsoft.com/office/drawing/2014/main" xmlns="" id="{8949AD42-25FD-4C3D-9EEE-B7FEC5809988}"/>
+                <a16:creationId xmlns:a16="http://schemas.microsoft.com/office/drawing/2014/main" id="{8949AD42-25FD-4C3D-9EEE-B7FEC5809988}"/>
               </a:ext>
               <a:ext uri="{C183D7F6-B498-43B3-948B-1728B52AA6E4}">
-                <adec:decorative xmlns:adec="http://schemas.microsoft.com/office/drawing/2017/decorative" xmlns="" val="1"/>
+                <adec:decorative xmlns:adec="http://schemas.microsoft.com/office/drawing/2017/decorative" val="1"/>
               </a:ext>
             </a:extLst>
           </p:cNvPr>
@@ -15686,7 +15609,7 @@
           <p:nvPr>
             <p:extLst>
               <p:ext uri="{386F3935-93C4-4BCD-93E2-E3B085C9AB24}">
-                <p16:designElem xmlns:p16="http://schemas.microsoft.com/office/powerpoint/2015/main" xmlns="" val="1"/>
+                <p16:designElem xmlns:p16="http://schemas.microsoft.com/office/powerpoint/2015/main" val="1"/>
               </p:ext>
             </p:extLst>
           </p:nvPr>
@@ -15717,10 +15640,10 @@
           <p:cNvPr id="16" name="Picture 15">
             <a:extLst>
               <a:ext uri="{FF2B5EF4-FFF2-40B4-BE49-F238E27FC236}">
-                <a16:creationId xmlns:a16="http://schemas.microsoft.com/office/drawing/2014/main" xmlns="" id="{6AC7D913-60B7-4603-881B-831DA5D3A940}"/>
+                <a16:creationId xmlns:a16="http://schemas.microsoft.com/office/drawing/2014/main" id="{6AC7D913-60B7-4603-881B-831DA5D3A940}"/>
               </a:ext>
               <a:ext uri="{C183D7F6-B498-43B3-948B-1728B52AA6E4}">
-                <adec:decorative xmlns:adec="http://schemas.microsoft.com/office/drawing/2017/decorative" xmlns="" val="1"/>
+                <adec:decorative xmlns:adec="http://schemas.microsoft.com/office/drawing/2017/decorative" val="1"/>
               </a:ext>
             </a:extLst>
           </p:cNvPr>
@@ -15730,7 +15653,7 @@
           <p:nvPr>
             <p:extLst>
               <p:ext uri="{386F3935-93C4-4BCD-93E2-E3B085C9AB24}">
-                <p16:designElem xmlns:p16="http://schemas.microsoft.com/office/powerpoint/2015/main" xmlns="" val="1"/>
+                <p16:designElem xmlns:p16="http://schemas.microsoft.com/office/powerpoint/2015/main" val="1"/>
               </p:ext>
             </p:extLst>
           </p:nvPr>
@@ -15761,10 +15684,10 @@
           <p:cNvPr id="18" name="Rectangle 17">
             <a:extLst>
               <a:ext uri="{FF2B5EF4-FFF2-40B4-BE49-F238E27FC236}">
-                <a16:creationId xmlns:a16="http://schemas.microsoft.com/office/drawing/2014/main" xmlns="" id="{87F0FDC4-AD8C-47D9-9131-623C98ADB0AE}"/>
+                <a16:creationId xmlns:a16="http://schemas.microsoft.com/office/drawing/2014/main" id="{87F0FDC4-AD8C-47D9-9131-623C98ADB0AE}"/>
               </a:ext>
               <a:ext uri="{C183D7F6-B498-43B3-948B-1728B52AA6E4}">
-                <adec:decorative xmlns:adec="http://schemas.microsoft.com/office/drawing/2017/decorative" xmlns="" val="1"/>
+                <adec:decorative xmlns:adec="http://schemas.microsoft.com/office/drawing/2017/decorative" val="1"/>
               </a:ext>
             </a:extLst>
           </p:cNvPr>
@@ -15774,7 +15697,7 @@
           <p:nvPr>
             <p:extLst>
               <p:ext uri="{386F3935-93C4-4BCD-93E2-E3B085C9AB24}">
-                <p16:designElem xmlns:p16="http://schemas.microsoft.com/office/powerpoint/2015/main" xmlns="" val="1"/>
+                <p16:designElem xmlns:p16="http://schemas.microsoft.com/office/powerpoint/2015/main" val="1"/>
               </p:ext>
             </p:extLst>
           </p:nvPr>
@@ -15814,10 +15737,10 @@
           <p:cNvPr id="20" name="Rectangle 19">
             <a:extLst>
               <a:ext uri="{FF2B5EF4-FFF2-40B4-BE49-F238E27FC236}">
-                <a16:creationId xmlns:a16="http://schemas.microsoft.com/office/drawing/2014/main" xmlns="" id="{E6A222EB-A81E-4238-B08D-AAB1828C8E0B}"/>
+                <a16:creationId xmlns:a16="http://schemas.microsoft.com/office/drawing/2014/main" id="{E6A222EB-A81E-4238-B08D-AAB1828C8E0B}"/>
               </a:ext>
               <a:ext uri="{C183D7F6-B498-43B3-948B-1728B52AA6E4}">
-                <adec:decorative xmlns:adec="http://schemas.microsoft.com/office/drawing/2017/decorative" xmlns="" val="1"/>
+                <adec:decorative xmlns:adec="http://schemas.microsoft.com/office/drawing/2017/decorative" val="1"/>
               </a:ext>
             </a:extLst>
           </p:cNvPr>
@@ -15827,7 +15750,7 @@
           <p:nvPr>
             <p:extLst>
               <p:ext uri="{386F3935-93C4-4BCD-93E2-E3B085C9AB24}">
-                <p16:designElem xmlns:p16="http://schemas.microsoft.com/office/powerpoint/2015/main" xmlns="" val="1"/>
+                <p16:designElem xmlns:p16="http://schemas.microsoft.com/office/powerpoint/2015/main" val="1"/>
               </p:ext>
             </p:extLst>
           </p:nvPr>
@@ -15874,10 +15797,10 @@
           <p:cNvPr id="22" name="Rectangle 21">
             <a:extLst>
               <a:ext uri="{FF2B5EF4-FFF2-40B4-BE49-F238E27FC236}">
-                <a16:creationId xmlns:a16="http://schemas.microsoft.com/office/drawing/2014/main" xmlns="" id="{E014676C-074B-475A-8346-9C901C86CB97}"/>
+                <a16:creationId xmlns:a16="http://schemas.microsoft.com/office/drawing/2014/main" id="{E014676C-074B-475A-8346-9C901C86CB97}"/>
               </a:ext>
               <a:ext uri="{C183D7F6-B498-43B3-948B-1728B52AA6E4}">
-                <adec:decorative xmlns:adec="http://schemas.microsoft.com/office/drawing/2017/decorative" xmlns="" val="1"/>
+                <adec:decorative xmlns:adec="http://schemas.microsoft.com/office/drawing/2017/decorative" val="1"/>
               </a:ext>
             </a:extLst>
           </p:cNvPr>
@@ -15887,7 +15810,7 @@
           <p:nvPr>
             <p:extLst>
               <p:ext uri="{386F3935-93C4-4BCD-93E2-E3B085C9AB24}">
-                <p16:designElem xmlns:p16="http://schemas.microsoft.com/office/powerpoint/2015/main" xmlns="" val="1"/>
+                <p16:designElem xmlns:p16="http://schemas.microsoft.com/office/powerpoint/2015/main" val="1"/>
               </p:ext>
             </p:extLst>
           </p:nvPr>
@@ -15927,10 +15850,10 @@
           <p:cNvPr id="24" name="Straight Connector 23">
             <a:extLst>
               <a:ext uri="{FF2B5EF4-FFF2-40B4-BE49-F238E27FC236}">
-                <a16:creationId xmlns:a16="http://schemas.microsoft.com/office/drawing/2014/main" xmlns="" id="{179C4C8E-197B-4679-AE96-B5147F971C90}"/>
+                <a16:creationId xmlns:a16="http://schemas.microsoft.com/office/drawing/2014/main" id="{179C4C8E-197B-4679-AE96-B5147F971C90}"/>
               </a:ext>
               <a:ext uri="{C183D7F6-B498-43B3-948B-1728B52AA6E4}">
-                <adec:decorative xmlns:adec="http://schemas.microsoft.com/office/drawing/2017/decorative" xmlns="" val="1"/>
+                <adec:decorative xmlns:adec="http://schemas.microsoft.com/office/drawing/2017/decorative" val="1"/>
               </a:ext>
             </a:extLst>
           </p:cNvPr>
@@ -15940,7 +15863,7 @@
           <p:nvPr>
             <p:extLst>
               <p:ext uri="{386F3935-93C4-4BCD-93E2-E3B085C9AB24}">
-                <p16:designElem xmlns:p16="http://schemas.microsoft.com/office/powerpoint/2015/main" xmlns="" val="1"/>
+                <p16:designElem xmlns:p16="http://schemas.microsoft.com/office/powerpoint/2015/main" val="1"/>
               </p:ext>
             </p:extLst>
           </p:nvPr>
@@ -15982,7 +15905,7 @@
           <p:cNvPr id="2" name="Title 1">
             <a:extLst>
               <a:ext uri="{FF2B5EF4-FFF2-40B4-BE49-F238E27FC236}">
-                <a16:creationId xmlns:a16="http://schemas.microsoft.com/office/drawing/2014/main" xmlns="" id="{B97EC12C-9B56-4DFC-9EFA-9DC39815E5C6}"/>
+                <a16:creationId xmlns:a16="http://schemas.microsoft.com/office/drawing/2014/main" id="{B97EC12C-9B56-4DFC-9EFA-9DC39815E5C6}"/>
               </a:ext>
             </a:extLst>
           </p:cNvPr>
@@ -16054,7 +15977,7 @@
           <p:cNvPr id="2" name="Title 1">
             <a:extLst>
               <a:ext uri="{FF2B5EF4-FFF2-40B4-BE49-F238E27FC236}">
-                <a16:creationId xmlns:a16="http://schemas.microsoft.com/office/drawing/2014/main" xmlns="" id="{C306E98B-F805-4C1B-86EB-047530EA7F03}"/>
+                <a16:creationId xmlns:a16="http://schemas.microsoft.com/office/drawing/2014/main" id="{C306E98B-F805-4C1B-86EB-047530EA7F03}"/>
               </a:ext>
             </a:extLst>
           </p:cNvPr>
@@ -16079,7 +16002,7 @@
           <p:cNvPr id="5" name="Content Placeholder 4" descr="Chart, bar chart&#10;&#10;Description automatically generated">
             <a:extLst>
               <a:ext uri="{FF2B5EF4-FFF2-40B4-BE49-F238E27FC236}">
-                <a16:creationId xmlns:a16="http://schemas.microsoft.com/office/drawing/2014/main" xmlns="" id="{B4665059-3309-410A-9105-66954663C62C}"/>
+                <a16:creationId xmlns:a16="http://schemas.microsoft.com/office/drawing/2014/main" id="{B4665059-3309-410A-9105-66954663C62C}"/>
               </a:ext>
             </a:extLst>
           </p:cNvPr>
@@ -16144,7 +16067,7 @@
           <p:cNvPr id="2" name="Title 1">
             <a:extLst>
               <a:ext uri="{FF2B5EF4-FFF2-40B4-BE49-F238E27FC236}">
-                <a16:creationId xmlns:a16="http://schemas.microsoft.com/office/drawing/2014/main" xmlns="" id="{B173BA98-212F-4621-B7F5-B71C2DCBA31A}"/>
+                <a16:creationId xmlns:a16="http://schemas.microsoft.com/office/drawing/2014/main" id="{B173BA98-212F-4621-B7F5-B71C2DCBA31A}"/>
               </a:ext>
             </a:extLst>
           </p:cNvPr>
@@ -16162,7 +16085,7 @@
           <a:p>
             <a:r>
               <a:rPr lang="en-US" dirty="0"/>
-              <a:t>Things We Found</a:t>
+              <a:t>US Findings</a:t>
             </a:r>
           </a:p>
         </p:txBody>
@@ -16172,7 +16095,7 @@
           <p:cNvPr id="3" name="Content Placeholder 2">
             <a:extLst>
               <a:ext uri="{FF2B5EF4-FFF2-40B4-BE49-F238E27FC236}">
-                <a16:creationId xmlns:a16="http://schemas.microsoft.com/office/drawing/2014/main" xmlns="" id="{DFCEA270-C611-4CFE-9C00-D1C7A43458D5}"/>
+                <a16:creationId xmlns:a16="http://schemas.microsoft.com/office/drawing/2014/main" id="{DFCEA270-C611-4CFE-9C00-D1C7A43458D5}"/>
               </a:ext>
             </a:extLst>
           </p:cNvPr>
@@ -16188,7 +16111,30 @@
           <a:bodyPr/>
           <a:lstStyle/>
           <a:p>
-            <a:endParaRPr lang="en-US" dirty="0"/>
+            <a:r>
+              <a:rPr lang="en-US" dirty="0"/>
+              <a:t>High exposure events leads to an increase in infections and deaths</a:t>
+            </a:r>
+          </a:p>
+          <a:p>
+            <a:pPr lvl="1"/>
+            <a:r>
+              <a:rPr lang="en-US" dirty="0"/>
+              <a:t>Holiday Season 2020</a:t>
+            </a:r>
+          </a:p>
+          <a:p>
+            <a:r>
+              <a:rPr lang="en-US" dirty="0"/>
+              <a:t>Suggested action</a:t>
+            </a:r>
+          </a:p>
+          <a:p>
+            <a:pPr lvl="1"/>
+            <a:r>
+              <a:rPr lang="en-US" dirty="0"/>
+              <a:t>Limit high exposure events and travel</a:t>
+            </a:r>
           </a:p>
         </p:txBody>
       </p:sp>
@@ -16227,7 +16173,7 @@
           <p:cNvPr id="2" name="Title 1">
             <a:extLst>
               <a:ext uri="{FF2B5EF4-FFF2-40B4-BE49-F238E27FC236}">
-                <a16:creationId xmlns:a16="http://schemas.microsoft.com/office/drawing/2014/main" xmlns="" id="{B173BA98-212F-4621-B7F5-B71C2DCBA31A}"/>
+                <a16:creationId xmlns:a16="http://schemas.microsoft.com/office/drawing/2014/main" id="{B173BA98-212F-4621-B7F5-B71C2DCBA31A}"/>
               </a:ext>
             </a:extLst>
           </p:cNvPr>
@@ -16244,10 +16190,9 @@
           <a:lstStyle/>
           <a:p>
             <a:r>
-              <a:rPr lang="en-US" dirty="0" smtClean="0"/>
+              <a:rPr lang="en-US" dirty="0"/>
               <a:t>Global Findings</a:t>
             </a:r>
-            <a:endParaRPr lang="en-US" dirty="0"/>
           </a:p>
         </p:txBody>
       </p:sp>
@@ -16256,7 +16201,7 @@
           <p:cNvPr id="3" name="Content Placeholder 2">
             <a:extLst>
               <a:ext uri="{FF2B5EF4-FFF2-40B4-BE49-F238E27FC236}">
-                <a16:creationId xmlns:a16="http://schemas.microsoft.com/office/drawing/2014/main" xmlns="" id="{DFCEA270-C611-4CFE-9C00-D1C7A43458D5}"/>
+                <a16:creationId xmlns:a16="http://schemas.microsoft.com/office/drawing/2014/main" id="{DFCEA270-C611-4CFE-9C00-D1C7A43458D5}"/>
               </a:ext>
             </a:extLst>
           </p:cNvPr>
@@ -16280,88 +16225,82 @@
           <a:lstStyle/>
           <a:p>
             <a:r>
-              <a:rPr lang="en-US" dirty="0" smtClean="0"/>
-              <a:t>Underr</a:t>
+              <a:rPr lang="en-US" dirty="0"/>
+              <a:t>Underreporting skews the numbers</a:t>
             </a:r>
-            <a:r>
-              <a:rPr lang="en-US" dirty="0" smtClean="0"/>
-              <a:t>eporting skews the numbers</a:t>
-            </a:r>
-            <a:endParaRPr lang="en-US" dirty="0" smtClean="0"/>
           </a:p>
           <a:p>
             <a:r>
-              <a:rPr lang="en-US" dirty="0" smtClean="0"/>
+              <a:rPr lang="en-US" dirty="0"/>
               <a:t>Lack of access to medical treatment may boost death rates</a:t>
             </a:r>
           </a:p>
           <a:p>
             <a:r>
-              <a:rPr lang="en-US" dirty="0" smtClean="0"/>
+              <a:rPr lang="en-US" dirty="0"/>
               <a:t>United States (1.78%) death per case ratio lower than global ratio (2.01%)</a:t>
             </a:r>
           </a:p>
           <a:p>
             <a:pPr lvl="1"/>
             <a:r>
-              <a:rPr lang="en-US" dirty="0" smtClean="0"/>
+              <a:rPr lang="en-US" dirty="0"/>
               <a:t>Global ratio is driven up slightly by outliers</a:t>
             </a:r>
           </a:p>
           <a:p>
             <a:r>
-              <a:rPr lang="en-US" dirty="0" smtClean="0"/>
+              <a:rPr lang="en-US" dirty="0"/>
               <a:t>Suggested action: </a:t>
             </a:r>
           </a:p>
           <a:p>
             <a:pPr lvl="1"/>
             <a:r>
-              <a:rPr lang="en-US" dirty="0" smtClean="0"/>
+              <a:rPr lang="en-US" dirty="0"/>
               <a:t>Countries with 3.5% &lt; ratio &gt; 2% </a:t>
             </a:r>
           </a:p>
           <a:p>
             <a:pPr lvl="2"/>
             <a:r>
-              <a:rPr lang="en-US" dirty="0" smtClean="0"/>
+              <a:rPr lang="en-US" dirty="0"/>
               <a:t>Hard push for vaccination</a:t>
             </a:r>
           </a:p>
           <a:p>
             <a:pPr lvl="2"/>
             <a:r>
-              <a:rPr lang="en-US" dirty="0" smtClean="0"/>
+              <a:rPr lang="en-US" dirty="0"/>
               <a:t>Continued masking and social distancing </a:t>
             </a:r>
           </a:p>
           <a:p>
             <a:pPr lvl="1"/>
             <a:r>
-              <a:rPr lang="en-US" dirty="0" smtClean="0"/>
+              <a:rPr lang="en-US" dirty="0"/>
               <a:t>Countries with ratio &gt; 3.5%</a:t>
             </a:r>
           </a:p>
           <a:p>
             <a:pPr lvl="2"/>
             <a:r>
-              <a:rPr lang="en-US" dirty="0" smtClean="0"/>
+              <a:rPr lang="en-US" dirty="0"/>
               <a:t>Hard push for vaccination</a:t>
             </a:r>
           </a:p>
           <a:p>
             <a:pPr lvl="2"/>
             <a:r>
-              <a:rPr lang="en-US" dirty="0" smtClean="0"/>
+              <a:rPr lang="en-US" dirty="0"/>
               <a:t>Lockdown, if possible</a:t>
             </a:r>
-            <a:endParaRPr lang="en-US" dirty="0" smtClean="0"/>
           </a:p>
           <a:p>
             <a:pPr marL="0" indent="0">
               <a:buNone/>
             </a:pPr>
-            <a:endParaRPr lang="en-US" dirty="0" smtClean="0"/>
+            <a:endParaRPr lang="en-US" dirty="0"/>
           </a:p>
           <a:p>
             <a:pPr marL="0" indent="0">
@@ -16414,10 +16353,10 @@
           <p:cNvPr id="9" name="Rectangle 8">
             <a:extLst>
               <a:ext uri="{FF2B5EF4-FFF2-40B4-BE49-F238E27FC236}">
-                <a16:creationId xmlns:a16="http://schemas.microsoft.com/office/drawing/2014/main" xmlns="" id="{F747F1B4-B831-4277-8AB0-32767F7EB7BF}"/>
+                <a16:creationId xmlns:a16="http://schemas.microsoft.com/office/drawing/2014/main" id="{F747F1B4-B831-4277-8AB0-32767F7EB7BF}"/>
               </a:ext>
               <a:ext uri="{C183D7F6-B498-43B3-948B-1728B52AA6E4}">
-                <adec:decorative xmlns:adec="http://schemas.microsoft.com/office/drawing/2017/decorative" xmlns="" val="1"/>
+                <adec:decorative xmlns:adec="http://schemas.microsoft.com/office/drawing/2017/decorative" val="1"/>
               </a:ext>
             </a:extLst>
           </p:cNvPr>
@@ -16427,7 +16366,7 @@
           <p:nvPr>
             <p:extLst>
               <p:ext uri="{386F3935-93C4-4BCD-93E2-E3B085C9AB24}">
-                <p16:designElem xmlns:p16="http://schemas.microsoft.com/office/powerpoint/2015/main" xmlns="" val="1"/>
+                <p16:designElem xmlns:p16="http://schemas.microsoft.com/office/powerpoint/2015/main" val="1"/>
               </p:ext>
             </p:extLst>
           </p:nvPr>
@@ -16474,10 +16413,10 @@
           <p:cNvPr id="11" name="Freeform 7">
             <a:extLst>
               <a:ext uri="{FF2B5EF4-FFF2-40B4-BE49-F238E27FC236}">
-                <a16:creationId xmlns:a16="http://schemas.microsoft.com/office/drawing/2014/main" xmlns="" id="{D80CFA21-AB7C-4BEB-9BFF-05764FBBF3C6}"/>
+                <a16:creationId xmlns:a16="http://schemas.microsoft.com/office/drawing/2014/main" id="{D80CFA21-AB7C-4BEB-9BFF-05764FBBF3C6}"/>
               </a:ext>
               <a:ext uri="{C183D7F6-B498-43B3-948B-1728B52AA6E4}">
-                <adec:decorative xmlns:adec="http://schemas.microsoft.com/office/drawing/2017/decorative" xmlns="" val="1"/>
+                <adec:decorative xmlns:adec="http://schemas.microsoft.com/office/drawing/2017/decorative" val="1"/>
               </a:ext>
             </a:extLst>
           </p:cNvPr>
@@ -16487,7 +16426,7 @@
           <p:nvPr>
             <p:extLst>
               <p:ext uri="{386F3935-93C4-4BCD-93E2-E3B085C9AB24}">
-                <p16:designElem xmlns:p16="http://schemas.microsoft.com/office/powerpoint/2015/main" xmlns="" val="1"/>
+                <p16:designElem xmlns:p16="http://schemas.microsoft.com/office/powerpoint/2015/main" val="1"/>
               </p:ext>
             </p:extLst>
           </p:nvPr>
@@ -16838,7 +16777,7 @@
           <p:cNvPr id="2" name="Title 1">
             <a:extLst>
               <a:ext uri="{FF2B5EF4-FFF2-40B4-BE49-F238E27FC236}">
-                <a16:creationId xmlns:a16="http://schemas.microsoft.com/office/drawing/2014/main" xmlns="" id="{3C8BFDA4-479D-4A5F-9ED8-82EE43FF73C8}"/>
+                <a16:creationId xmlns:a16="http://schemas.microsoft.com/office/drawing/2014/main" id="{3C8BFDA4-479D-4A5F-9ED8-82EE43FF73C8}"/>
               </a:ext>
             </a:extLst>
           </p:cNvPr>
@@ -16877,10 +16816,10 @@
           <p:cNvPr id="13" name="Rectangle 12">
             <a:extLst>
               <a:ext uri="{FF2B5EF4-FFF2-40B4-BE49-F238E27FC236}">
-                <a16:creationId xmlns:a16="http://schemas.microsoft.com/office/drawing/2014/main" xmlns="" id="{12F7E335-851A-4CAE-B09F-E657819D4600}"/>
+                <a16:creationId xmlns:a16="http://schemas.microsoft.com/office/drawing/2014/main" id="{12F7E335-851A-4CAE-B09F-E657819D4600}"/>
               </a:ext>
               <a:ext uri="{C183D7F6-B498-43B3-948B-1728B52AA6E4}">
-                <adec:decorative xmlns:adec="http://schemas.microsoft.com/office/drawing/2017/decorative" xmlns="" val="1"/>
+                <adec:decorative xmlns:adec="http://schemas.microsoft.com/office/drawing/2017/decorative" val="1"/>
               </a:ext>
             </a:extLst>
           </p:cNvPr>
@@ -16890,7 +16829,7 @@
           <p:nvPr>
             <p:extLst>
               <p:ext uri="{386F3935-93C4-4BCD-93E2-E3B085C9AB24}">
-                <p16:designElem xmlns:p16="http://schemas.microsoft.com/office/powerpoint/2015/main" xmlns="" val="1"/>
+                <p16:designElem xmlns:p16="http://schemas.microsoft.com/office/powerpoint/2015/main" val="1"/>
               </p:ext>
             </p:extLst>
           </p:nvPr>
@@ -16930,10 +16869,10 @@
           <p:cNvPr id="15" name="Freeform: Shape 14">
             <a:extLst>
               <a:ext uri="{FF2B5EF4-FFF2-40B4-BE49-F238E27FC236}">
-                <a16:creationId xmlns:a16="http://schemas.microsoft.com/office/drawing/2014/main" xmlns="" id="{10B541F0-7F6E-402E-84D8-CF96EACA5FBC}"/>
+                <a16:creationId xmlns:a16="http://schemas.microsoft.com/office/drawing/2014/main" id="{10B541F0-7F6E-402E-84D8-CF96EACA5FBC}"/>
               </a:ext>
               <a:ext uri="{C183D7F6-B498-43B3-948B-1728B52AA6E4}">
-                <adec:decorative xmlns:adec="http://schemas.microsoft.com/office/drawing/2017/decorative" xmlns="" val="1"/>
+                <adec:decorative xmlns:adec="http://schemas.microsoft.com/office/drawing/2017/decorative" val="1"/>
               </a:ext>
             </a:extLst>
           </p:cNvPr>
@@ -16943,7 +16882,7 @@
           <p:nvPr>
             <p:extLst>
               <p:ext uri="{386F3935-93C4-4BCD-93E2-E3B085C9AB24}">
-                <p16:designElem xmlns:p16="http://schemas.microsoft.com/office/powerpoint/2015/main" xmlns="" val="1"/>
+                <p16:designElem xmlns:p16="http://schemas.microsoft.com/office/powerpoint/2015/main" val="1"/>
               </p:ext>
             </p:extLst>
           </p:nvPr>
@@ -17428,7 +17367,7 @@
           <p:cNvPr id="5" name="Content Placeholder 2">
             <a:extLst>
               <a:ext uri="{FF2B5EF4-FFF2-40B4-BE49-F238E27FC236}">
-                <a16:creationId xmlns:a16="http://schemas.microsoft.com/office/drawing/2014/main" xmlns="" id="{A2D08B7C-073D-441B-BE52-43F2DDDCF7A9}"/>
+                <a16:creationId xmlns:a16="http://schemas.microsoft.com/office/drawing/2014/main" id="{A2D08B7C-073D-441B-BE52-43F2DDDCF7A9}"/>
               </a:ext>
             </a:extLst>
           </p:cNvPr>
@@ -17497,10 +17436,10 @@
           <p:cNvPr id="9" name="Rectangle 8">
             <a:extLst>
               <a:ext uri="{FF2B5EF4-FFF2-40B4-BE49-F238E27FC236}">
-                <a16:creationId xmlns:a16="http://schemas.microsoft.com/office/drawing/2014/main" xmlns="" id="{F747F1B4-B831-4277-8AB0-32767F7EB7BF}"/>
+                <a16:creationId xmlns:a16="http://schemas.microsoft.com/office/drawing/2014/main" id="{F747F1B4-B831-4277-8AB0-32767F7EB7BF}"/>
               </a:ext>
               <a:ext uri="{C183D7F6-B498-43B3-948B-1728B52AA6E4}">
-                <adec:decorative xmlns:adec="http://schemas.microsoft.com/office/drawing/2017/decorative" xmlns="" val="1"/>
+                <adec:decorative xmlns:adec="http://schemas.microsoft.com/office/drawing/2017/decorative" val="1"/>
               </a:ext>
             </a:extLst>
           </p:cNvPr>
@@ -17510,7 +17449,7 @@
           <p:nvPr>
             <p:extLst>
               <p:ext uri="{386F3935-93C4-4BCD-93E2-E3B085C9AB24}">
-                <p16:designElem xmlns:p16="http://schemas.microsoft.com/office/powerpoint/2015/main" xmlns="" val="1"/>
+                <p16:designElem xmlns:p16="http://schemas.microsoft.com/office/powerpoint/2015/main" val="1"/>
               </p:ext>
             </p:extLst>
           </p:nvPr>
@@ -17557,10 +17496,10 @@
           <p:cNvPr id="11" name="Freeform 7">
             <a:extLst>
               <a:ext uri="{FF2B5EF4-FFF2-40B4-BE49-F238E27FC236}">
-                <a16:creationId xmlns:a16="http://schemas.microsoft.com/office/drawing/2014/main" xmlns="" id="{D80CFA21-AB7C-4BEB-9BFF-05764FBBF3C6}"/>
+                <a16:creationId xmlns:a16="http://schemas.microsoft.com/office/drawing/2014/main" id="{D80CFA21-AB7C-4BEB-9BFF-05764FBBF3C6}"/>
               </a:ext>
               <a:ext uri="{C183D7F6-B498-43B3-948B-1728B52AA6E4}">
-                <adec:decorative xmlns:adec="http://schemas.microsoft.com/office/drawing/2017/decorative" xmlns="" val="1"/>
+                <adec:decorative xmlns:adec="http://schemas.microsoft.com/office/drawing/2017/decorative" val="1"/>
               </a:ext>
             </a:extLst>
           </p:cNvPr>
@@ -17570,7 +17509,7 @@
           <p:nvPr>
             <p:extLst>
               <p:ext uri="{386F3935-93C4-4BCD-93E2-E3B085C9AB24}">
-                <p16:designElem xmlns:p16="http://schemas.microsoft.com/office/powerpoint/2015/main" xmlns="" val="1"/>
+                <p16:designElem xmlns:p16="http://schemas.microsoft.com/office/powerpoint/2015/main" val="1"/>
               </p:ext>
             </p:extLst>
           </p:nvPr>
@@ -17921,7 +17860,7 @@
           <p:cNvPr id="2" name="Title 1">
             <a:extLst>
               <a:ext uri="{FF2B5EF4-FFF2-40B4-BE49-F238E27FC236}">
-                <a16:creationId xmlns:a16="http://schemas.microsoft.com/office/drawing/2014/main" xmlns="" id="{3D58399E-D226-453C-9790-F8944ABAC268}"/>
+                <a16:creationId xmlns:a16="http://schemas.microsoft.com/office/drawing/2014/main" id="{3D58399E-D226-453C-9790-F8944ABAC268}"/>
               </a:ext>
             </a:extLst>
           </p:cNvPr>
@@ -17960,10 +17899,10 @@
           <p:cNvPr id="13" name="Rectangle 12">
             <a:extLst>
               <a:ext uri="{FF2B5EF4-FFF2-40B4-BE49-F238E27FC236}">
-                <a16:creationId xmlns:a16="http://schemas.microsoft.com/office/drawing/2014/main" xmlns="" id="{12F7E335-851A-4CAE-B09F-E657819D4600}"/>
+                <a16:creationId xmlns:a16="http://schemas.microsoft.com/office/drawing/2014/main" id="{12F7E335-851A-4CAE-B09F-E657819D4600}"/>
               </a:ext>
               <a:ext uri="{C183D7F6-B498-43B3-948B-1728B52AA6E4}">
-                <adec:decorative xmlns:adec="http://schemas.microsoft.com/office/drawing/2017/decorative" xmlns="" val="1"/>
+                <adec:decorative xmlns:adec="http://schemas.microsoft.com/office/drawing/2017/decorative" val="1"/>
               </a:ext>
             </a:extLst>
           </p:cNvPr>
@@ -17973,7 +17912,7 @@
           <p:nvPr>
             <p:extLst>
               <p:ext uri="{386F3935-93C4-4BCD-93E2-E3B085C9AB24}">
-                <p16:designElem xmlns:p16="http://schemas.microsoft.com/office/powerpoint/2015/main" xmlns="" val="1"/>
+                <p16:designElem xmlns:p16="http://schemas.microsoft.com/office/powerpoint/2015/main" val="1"/>
               </p:ext>
             </p:extLst>
           </p:nvPr>
@@ -18013,10 +17952,10 @@
           <p:cNvPr id="15" name="Freeform: Shape 14">
             <a:extLst>
               <a:ext uri="{FF2B5EF4-FFF2-40B4-BE49-F238E27FC236}">
-                <a16:creationId xmlns:a16="http://schemas.microsoft.com/office/drawing/2014/main" xmlns="" id="{10B541F0-7F6E-402E-84D8-CF96EACA5FBC}"/>
+                <a16:creationId xmlns:a16="http://schemas.microsoft.com/office/drawing/2014/main" id="{10B541F0-7F6E-402E-84D8-CF96EACA5FBC}"/>
               </a:ext>
               <a:ext uri="{C183D7F6-B498-43B3-948B-1728B52AA6E4}">
-                <adec:decorative xmlns:adec="http://schemas.microsoft.com/office/drawing/2017/decorative" xmlns="" val="1"/>
+                <adec:decorative xmlns:adec="http://schemas.microsoft.com/office/drawing/2017/decorative" val="1"/>
               </a:ext>
             </a:extLst>
           </p:cNvPr>
@@ -18026,7 +17965,7 @@
           <p:nvPr>
             <p:extLst>
               <p:ext uri="{386F3935-93C4-4BCD-93E2-E3B085C9AB24}">
-                <p16:designElem xmlns:p16="http://schemas.microsoft.com/office/powerpoint/2015/main" xmlns="" val="1"/>
+                <p16:designElem xmlns:p16="http://schemas.microsoft.com/office/powerpoint/2015/main" val="1"/>
               </p:ext>
             </p:extLst>
           </p:nvPr>
@@ -18511,7 +18450,7 @@
           <p:cNvPr id="5" name="Content Placeholder 2">
             <a:extLst>
               <a:ext uri="{FF2B5EF4-FFF2-40B4-BE49-F238E27FC236}">
-                <a16:creationId xmlns:a16="http://schemas.microsoft.com/office/drawing/2014/main" xmlns="" id="{06D07957-5808-4F93-8BFA-7B88B9E9F6AC}"/>
+                <a16:creationId xmlns:a16="http://schemas.microsoft.com/office/drawing/2014/main" id="{06D07957-5808-4F93-8BFA-7B88B9E9F6AC}"/>
               </a:ext>
             </a:extLst>
           </p:cNvPr>
@@ -18580,10 +18519,10 @@
           <p:cNvPr id="21" name="Picture 20">
             <a:extLst>
               <a:ext uri="{FF2B5EF4-FFF2-40B4-BE49-F238E27FC236}">
-                <a16:creationId xmlns:a16="http://schemas.microsoft.com/office/drawing/2014/main" xmlns="" id="{41B68C77-138E-4BF7-A276-BD0C78A4219F}"/>
+                <a16:creationId xmlns:a16="http://schemas.microsoft.com/office/drawing/2014/main" id="{41B68C77-138E-4BF7-A276-BD0C78A4219F}"/>
               </a:ext>
               <a:ext uri="{C183D7F6-B498-43B3-948B-1728B52AA6E4}">
-                <adec:decorative xmlns:adec="http://schemas.microsoft.com/office/drawing/2017/decorative" xmlns="" val="1"/>
+                <adec:decorative xmlns:adec="http://schemas.microsoft.com/office/drawing/2017/decorative" val="1"/>
               </a:ext>
             </a:extLst>
           </p:cNvPr>
@@ -18593,7 +18532,7 @@
           <p:nvPr>
             <p:extLst>
               <p:ext uri="{386F3935-93C4-4BCD-93E2-E3B085C9AB24}">
-                <p16:designElem xmlns:p16="http://schemas.microsoft.com/office/powerpoint/2015/main" xmlns="" val="1"/>
+                <p16:designElem xmlns:p16="http://schemas.microsoft.com/office/powerpoint/2015/main" val="1"/>
               </p:ext>
             </p:extLst>
           </p:nvPr>
@@ -18624,10 +18563,10 @@
           <p:cNvPr id="23" name="Picture 22">
             <a:extLst>
               <a:ext uri="{FF2B5EF4-FFF2-40B4-BE49-F238E27FC236}">
-                <a16:creationId xmlns:a16="http://schemas.microsoft.com/office/drawing/2014/main" xmlns="" id="{7C268552-D473-46ED-B1B8-422042C4DEF1}"/>
+                <a16:creationId xmlns:a16="http://schemas.microsoft.com/office/drawing/2014/main" id="{7C268552-D473-46ED-B1B8-422042C4DEF1}"/>
               </a:ext>
               <a:ext uri="{C183D7F6-B498-43B3-948B-1728B52AA6E4}">
-                <adec:decorative xmlns:adec="http://schemas.microsoft.com/office/drawing/2017/decorative" xmlns="" val="1"/>
+                <adec:decorative xmlns:adec="http://schemas.microsoft.com/office/drawing/2017/decorative" val="1"/>
               </a:ext>
             </a:extLst>
           </p:cNvPr>
@@ -18637,7 +18576,7 @@
           <p:nvPr>
             <p:extLst>
               <p:ext uri="{386F3935-93C4-4BCD-93E2-E3B085C9AB24}">
-                <p16:designElem xmlns:p16="http://schemas.microsoft.com/office/powerpoint/2015/main" xmlns="" val="1"/>
+                <p16:designElem xmlns:p16="http://schemas.microsoft.com/office/powerpoint/2015/main" val="1"/>
               </p:ext>
             </p:extLst>
           </p:nvPr>
@@ -18668,10 +18607,10 @@
           <p:cNvPr id="25" name="Oval 24">
             <a:extLst>
               <a:ext uri="{FF2B5EF4-FFF2-40B4-BE49-F238E27FC236}">
-                <a16:creationId xmlns:a16="http://schemas.microsoft.com/office/drawing/2014/main" xmlns="" id="{4AC0CD9D-7610-4620-93B4-798CCD9AB581}"/>
+                <a16:creationId xmlns:a16="http://schemas.microsoft.com/office/drawing/2014/main" id="{4AC0CD9D-7610-4620-93B4-798CCD9AB581}"/>
               </a:ext>
               <a:ext uri="{C183D7F6-B498-43B3-948B-1728B52AA6E4}">
-                <adec:decorative xmlns:adec="http://schemas.microsoft.com/office/drawing/2017/decorative" xmlns="" val="1"/>
+                <adec:decorative xmlns:adec="http://schemas.microsoft.com/office/drawing/2017/decorative" val="1"/>
               </a:ext>
             </a:extLst>
           </p:cNvPr>
@@ -18681,7 +18620,7 @@
           <p:nvPr>
             <p:extLst>
               <p:ext uri="{386F3935-93C4-4BCD-93E2-E3B085C9AB24}">
-                <p16:designElem xmlns:p16="http://schemas.microsoft.com/office/powerpoint/2015/main" xmlns="" val="1"/>
+                <p16:designElem xmlns:p16="http://schemas.microsoft.com/office/powerpoint/2015/main" val="1"/>
               </p:ext>
             </p:extLst>
           </p:nvPr>
@@ -18748,10 +18687,10 @@
           <p:cNvPr id="27" name="Picture 26">
             <a:extLst>
               <a:ext uri="{FF2B5EF4-FFF2-40B4-BE49-F238E27FC236}">
-                <a16:creationId xmlns:a16="http://schemas.microsoft.com/office/drawing/2014/main" xmlns="" id="{B9238B3E-24AA-439A-B527-6C5DF6D72145}"/>
+                <a16:creationId xmlns:a16="http://schemas.microsoft.com/office/drawing/2014/main" id="{B9238B3E-24AA-439A-B527-6C5DF6D72145}"/>
               </a:ext>
               <a:ext uri="{C183D7F6-B498-43B3-948B-1728B52AA6E4}">
-                <adec:decorative xmlns:adec="http://schemas.microsoft.com/office/drawing/2017/decorative" xmlns="" val="1"/>
+                <adec:decorative xmlns:adec="http://schemas.microsoft.com/office/drawing/2017/decorative" val="1"/>
               </a:ext>
             </a:extLst>
           </p:cNvPr>
@@ -18761,7 +18700,7 @@
           <p:nvPr>
             <p:extLst>
               <p:ext uri="{386F3935-93C4-4BCD-93E2-E3B085C9AB24}">
-                <p16:designElem xmlns:p16="http://schemas.microsoft.com/office/powerpoint/2015/main" xmlns="" val="1"/>
+                <p16:designElem xmlns:p16="http://schemas.microsoft.com/office/powerpoint/2015/main" val="1"/>
               </p:ext>
             </p:extLst>
           </p:nvPr>
@@ -18792,10 +18731,10 @@
           <p:cNvPr id="29" name="Picture 28">
             <a:extLst>
               <a:ext uri="{FF2B5EF4-FFF2-40B4-BE49-F238E27FC236}">
-                <a16:creationId xmlns:a16="http://schemas.microsoft.com/office/drawing/2014/main" xmlns="" id="{69F01145-BEA3-4CBF-AA21-10077B948CA8}"/>
+                <a16:creationId xmlns:a16="http://schemas.microsoft.com/office/drawing/2014/main" id="{69F01145-BEA3-4CBF-AA21-10077B948CA8}"/>
               </a:ext>
               <a:ext uri="{C183D7F6-B498-43B3-948B-1728B52AA6E4}">
-                <adec:decorative xmlns:adec="http://schemas.microsoft.com/office/drawing/2017/decorative" xmlns="" val="1"/>
+                <adec:decorative xmlns:adec="http://schemas.microsoft.com/office/drawing/2017/decorative" val="1"/>
               </a:ext>
             </a:extLst>
           </p:cNvPr>
@@ -18805,7 +18744,7 @@
           <p:nvPr>
             <p:extLst>
               <p:ext uri="{386F3935-93C4-4BCD-93E2-E3B085C9AB24}">
-                <p16:designElem xmlns:p16="http://schemas.microsoft.com/office/powerpoint/2015/main" xmlns="" val="1"/>
+                <p16:designElem xmlns:p16="http://schemas.microsoft.com/office/powerpoint/2015/main" val="1"/>
               </p:ext>
             </p:extLst>
           </p:nvPr>
@@ -18836,10 +18775,10 @@
           <p:cNvPr id="31" name="Rectangle 30">
             <a:extLst>
               <a:ext uri="{FF2B5EF4-FFF2-40B4-BE49-F238E27FC236}">
-                <a16:creationId xmlns:a16="http://schemas.microsoft.com/office/drawing/2014/main" xmlns="" id="{DE4D62F9-188E-4530-84C2-24BDEE4BEB82}"/>
+                <a16:creationId xmlns:a16="http://schemas.microsoft.com/office/drawing/2014/main" id="{DE4D62F9-188E-4530-84C2-24BDEE4BEB82}"/>
               </a:ext>
               <a:ext uri="{C183D7F6-B498-43B3-948B-1728B52AA6E4}">
-                <adec:decorative xmlns:adec="http://schemas.microsoft.com/office/drawing/2017/decorative" xmlns="" val="1"/>
+                <adec:decorative xmlns:adec="http://schemas.microsoft.com/office/drawing/2017/decorative" val="1"/>
               </a:ext>
             </a:extLst>
           </p:cNvPr>
@@ -18849,7 +18788,7 @@
           <p:nvPr>
             <p:extLst>
               <p:ext uri="{386F3935-93C4-4BCD-93E2-E3B085C9AB24}">
-                <p16:designElem xmlns:p16="http://schemas.microsoft.com/office/powerpoint/2015/main" xmlns="" val="1"/>
+                <p16:designElem xmlns:p16="http://schemas.microsoft.com/office/powerpoint/2015/main" val="1"/>
               </p:ext>
             </p:extLst>
           </p:nvPr>
@@ -18889,10 +18828,10 @@
           <p:cNvPr id="33" name="Rectangle 32">
             <a:extLst>
               <a:ext uri="{FF2B5EF4-FFF2-40B4-BE49-F238E27FC236}">
-                <a16:creationId xmlns:a16="http://schemas.microsoft.com/office/drawing/2014/main" xmlns="" id="{C72330AA-E11E-458E-8798-12C7F77383B8}"/>
+                <a16:creationId xmlns:a16="http://schemas.microsoft.com/office/drawing/2014/main" id="{C72330AA-E11E-458E-8798-12C7F77383B8}"/>
               </a:ext>
               <a:ext uri="{C183D7F6-B498-43B3-948B-1728B52AA6E4}">
-                <adec:decorative xmlns:adec="http://schemas.microsoft.com/office/drawing/2017/decorative" xmlns="" val="1"/>
+                <adec:decorative xmlns:adec="http://schemas.microsoft.com/office/drawing/2017/decorative" val="1"/>
               </a:ext>
             </a:extLst>
           </p:cNvPr>
@@ -18902,7 +18841,7 @@
           <p:nvPr>
             <p:extLst>
               <p:ext uri="{386F3935-93C4-4BCD-93E2-E3B085C9AB24}">
-                <p16:designElem xmlns:p16="http://schemas.microsoft.com/office/powerpoint/2015/main" xmlns="" val="1"/>
+                <p16:designElem xmlns:p16="http://schemas.microsoft.com/office/powerpoint/2015/main" val="1"/>
               </p:ext>
             </p:extLst>
           </p:nvPr>
@@ -18949,10 +18888,10 @@
           <p:cNvPr id="35" name="Freeform 7">
             <a:extLst>
               <a:ext uri="{FF2B5EF4-FFF2-40B4-BE49-F238E27FC236}">
-                <a16:creationId xmlns:a16="http://schemas.microsoft.com/office/drawing/2014/main" xmlns="" id="{A6BDC1B0-0C91-4230-BFEB-9C8ED19B9A3A}"/>
+                <a16:creationId xmlns:a16="http://schemas.microsoft.com/office/drawing/2014/main" id="{A6BDC1B0-0C91-4230-BFEB-9C8ED19B9A3A}"/>
               </a:ext>
               <a:ext uri="{C183D7F6-B498-43B3-948B-1728B52AA6E4}">
-                <adec:decorative xmlns:adec="http://schemas.microsoft.com/office/drawing/2017/decorative" xmlns="" val="1"/>
+                <adec:decorative xmlns:adec="http://schemas.microsoft.com/office/drawing/2017/decorative" val="1"/>
               </a:ext>
             </a:extLst>
           </p:cNvPr>
@@ -18962,7 +18901,7 @@
           <p:nvPr>
             <p:extLst>
               <p:ext uri="{386F3935-93C4-4BCD-93E2-E3B085C9AB24}">
-                <p16:designElem xmlns:p16="http://schemas.microsoft.com/office/powerpoint/2015/main" xmlns="" val="1"/>
+                <p16:designElem xmlns:p16="http://schemas.microsoft.com/office/powerpoint/2015/main" val="1"/>
               </p:ext>
             </p:extLst>
           </p:nvPr>
@@ -19307,10 +19246,10 @@
           <p:cNvPr id="37" name="Freeform: Shape 36">
             <a:extLst>
               <a:ext uri="{FF2B5EF4-FFF2-40B4-BE49-F238E27FC236}">
-                <a16:creationId xmlns:a16="http://schemas.microsoft.com/office/drawing/2014/main" xmlns="" id="{68E0A26E-4EA8-4E6C-97A2-7B6C1C13F8CF}"/>
+                <a16:creationId xmlns:a16="http://schemas.microsoft.com/office/drawing/2014/main" id="{68E0A26E-4EA8-4E6C-97A2-7B6C1C13F8CF}"/>
               </a:ext>
               <a:ext uri="{C183D7F6-B498-43B3-948B-1728B52AA6E4}">
-                <adec:decorative xmlns:adec="http://schemas.microsoft.com/office/drawing/2017/decorative" xmlns="" val="1"/>
+                <adec:decorative xmlns:adec="http://schemas.microsoft.com/office/drawing/2017/decorative" val="1"/>
               </a:ext>
             </a:extLst>
           </p:cNvPr>
@@ -19320,7 +19259,7 @@
           <p:nvPr>
             <p:extLst>
               <p:ext uri="{386F3935-93C4-4BCD-93E2-E3B085C9AB24}">
-                <p16:designElem xmlns:p16="http://schemas.microsoft.com/office/powerpoint/2015/main" xmlns="" val="1"/>
+                <p16:designElem xmlns:p16="http://schemas.microsoft.com/office/powerpoint/2015/main" val="1"/>
               </p:ext>
             </p:extLst>
           </p:nvPr>
@@ -19770,10 +19709,10 @@
           <p:cNvPr id="39" name="Rectangle 38">
             <a:extLst>
               <a:ext uri="{FF2B5EF4-FFF2-40B4-BE49-F238E27FC236}">
-                <a16:creationId xmlns:a16="http://schemas.microsoft.com/office/drawing/2014/main" xmlns="" id="{C1841CC0-B7A9-4828-B82F-9C6B433BDCAE}"/>
+                <a16:creationId xmlns:a16="http://schemas.microsoft.com/office/drawing/2014/main" id="{C1841CC0-B7A9-4828-B82F-9C6B433BDCAE}"/>
               </a:ext>
               <a:ext uri="{C183D7F6-B498-43B3-948B-1728B52AA6E4}">
-                <adec:decorative xmlns:adec="http://schemas.microsoft.com/office/drawing/2017/decorative" xmlns="" val="1"/>
+                <adec:decorative xmlns:adec="http://schemas.microsoft.com/office/drawing/2017/decorative" val="1"/>
               </a:ext>
             </a:extLst>
           </p:cNvPr>
@@ -19783,7 +19722,7 @@
           <p:nvPr>
             <p:extLst>
               <p:ext uri="{386F3935-93C4-4BCD-93E2-E3B085C9AB24}">
-                <p16:designElem xmlns:p16="http://schemas.microsoft.com/office/powerpoint/2015/main" xmlns="" val="1"/>
+                <p16:designElem xmlns:p16="http://schemas.microsoft.com/office/powerpoint/2015/main" val="1"/>
               </p:ext>
             </p:extLst>
           </p:nvPr>
@@ -19823,10 +19762,10 @@
           <p:cNvPr id="41" name="Group 40">
             <a:extLst>
               <a:ext uri="{FF2B5EF4-FFF2-40B4-BE49-F238E27FC236}">
-                <a16:creationId xmlns:a16="http://schemas.microsoft.com/office/drawing/2014/main" xmlns="" id="{08E05919-D800-40FD-A3BD-4B9CC4078E7A}"/>
+                <a16:creationId xmlns:a16="http://schemas.microsoft.com/office/drawing/2014/main" id="{08E05919-D800-40FD-A3BD-4B9CC4078E7A}"/>
               </a:ext>
               <a:ext uri="{C183D7F6-B498-43B3-948B-1728B52AA6E4}">
-                <adec:decorative xmlns:adec="http://schemas.microsoft.com/office/drawing/2017/decorative" xmlns="" val="1"/>
+                <adec:decorative xmlns:adec="http://schemas.microsoft.com/office/drawing/2017/decorative" val="1"/>
               </a:ext>
             </a:extLst>
           </p:cNvPr>
@@ -19836,7 +19775,7 @@
           <p:nvPr>
             <p:extLst>
               <p:ext uri="{386F3935-93C4-4BCD-93E2-E3B085C9AB24}">
-                <p16:designElem xmlns:p16="http://schemas.microsoft.com/office/powerpoint/2015/main" xmlns="" val="1"/>
+                <p16:designElem xmlns:p16="http://schemas.microsoft.com/office/powerpoint/2015/main" val="1"/>
               </p:ext>
             </p:extLst>
           </p:nvPr>
@@ -19854,10 +19793,10 @@
             <p:cNvPr id="42" name="Picture 41">
               <a:extLst>
                 <a:ext uri="{FF2B5EF4-FFF2-40B4-BE49-F238E27FC236}">
-                  <a16:creationId xmlns:a16="http://schemas.microsoft.com/office/drawing/2014/main" xmlns="" id="{DE70C79C-8688-4786-8FCD-43A4B5D5B7DD}"/>
+                  <a16:creationId xmlns:a16="http://schemas.microsoft.com/office/drawing/2014/main" id="{DE70C79C-8688-4786-8FCD-43A4B5D5B7DD}"/>
                 </a:ext>
                 <a:ext uri="{C183D7F6-B498-43B3-948B-1728B52AA6E4}">
-                  <adec:decorative xmlns:adec="http://schemas.microsoft.com/office/drawing/2017/decorative" xmlns="" val="1"/>
+                  <adec:decorative xmlns:adec="http://schemas.microsoft.com/office/drawing/2017/decorative" val="1"/>
                 </a:ext>
               </a:extLst>
             </p:cNvPr>
@@ -19867,7 +19806,7 @@
             <p:nvPr>
               <p:extLst>
                 <p:ext uri="{386F3935-93C4-4BCD-93E2-E3B085C9AB24}">
-                  <p16:designElem xmlns:p16="http://schemas.microsoft.com/office/powerpoint/2015/main" xmlns="" val="1"/>
+                  <p16:designElem xmlns:p16="http://schemas.microsoft.com/office/powerpoint/2015/main" val="1"/>
                 </p:ext>
               </p:extLst>
             </p:nvPr>
@@ -19898,10 +19837,10 @@
             <p:cNvPr id="43" name="Picture 42">
               <a:extLst>
                 <a:ext uri="{FF2B5EF4-FFF2-40B4-BE49-F238E27FC236}">
-                  <a16:creationId xmlns:a16="http://schemas.microsoft.com/office/drawing/2014/main" xmlns="" id="{9A6338A0-2BDA-4E79-A762-AAD8608C0C27}"/>
+                  <a16:creationId xmlns:a16="http://schemas.microsoft.com/office/drawing/2014/main" id="{9A6338A0-2BDA-4E79-A762-AAD8608C0C27}"/>
                 </a:ext>
                 <a:ext uri="{C183D7F6-B498-43B3-948B-1728B52AA6E4}">
-                  <adec:decorative xmlns:adec="http://schemas.microsoft.com/office/drawing/2017/decorative" xmlns="" val="1"/>
+                  <adec:decorative xmlns:adec="http://schemas.microsoft.com/office/drawing/2017/decorative" val="1"/>
                 </a:ext>
               </a:extLst>
             </p:cNvPr>
@@ -19911,7 +19850,7 @@
             <p:nvPr>
               <p:extLst>
                 <p:ext uri="{386F3935-93C4-4BCD-93E2-E3B085C9AB24}">
-                  <p16:designElem xmlns:p16="http://schemas.microsoft.com/office/powerpoint/2015/main" xmlns="" val="1"/>
+                  <p16:designElem xmlns:p16="http://schemas.microsoft.com/office/powerpoint/2015/main" val="1"/>
                 </p:ext>
               </p:extLst>
             </p:nvPr>
@@ -19942,10 +19881,10 @@
             <p:cNvPr id="44" name="Oval 43">
               <a:extLst>
                 <a:ext uri="{FF2B5EF4-FFF2-40B4-BE49-F238E27FC236}">
-                  <a16:creationId xmlns:a16="http://schemas.microsoft.com/office/drawing/2014/main" xmlns="" id="{B685624D-3645-4129-9FF6-0C59DBF23BD3}"/>
+                  <a16:creationId xmlns:a16="http://schemas.microsoft.com/office/drawing/2014/main" id="{B685624D-3645-4129-9FF6-0C59DBF23BD3}"/>
                 </a:ext>
                 <a:ext uri="{C183D7F6-B498-43B3-948B-1728B52AA6E4}">
-                  <adec:decorative xmlns:adec="http://schemas.microsoft.com/office/drawing/2017/decorative" xmlns="" val="1"/>
+                  <adec:decorative xmlns:adec="http://schemas.microsoft.com/office/drawing/2017/decorative" val="1"/>
                 </a:ext>
               </a:extLst>
             </p:cNvPr>
@@ -19953,7 +19892,7 @@
             <p:nvPr>
               <p:extLst>
                 <p:ext uri="{386F3935-93C4-4BCD-93E2-E3B085C9AB24}">
-                  <p16:designElem xmlns:p16="http://schemas.microsoft.com/office/powerpoint/2015/main" xmlns="" val="1"/>
+                  <p16:designElem xmlns:p16="http://schemas.microsoft.com/office/powerpoint/2015/main" val="1"/>
                 </p:ext>
               </p:extLst>
             </p:nvPr>
@@ -20020,10 +19959,10 @@
             <p:cNvPr id="45" name="Picture 44">
               <a:extLst>
                 <a:ext uri="{FF2B5EF4-FFF2-40B4-BE49-F238E27FC236}">
-                  <a16:creationId xmlns:a16="http://schemas.microsoft.com/office/drawing/2014/main" xmlns="" id="{03F24C1B-E4C1-43E7-84B3-DD476F383667}"/>
+                  <a16:creationId xmlns:a16="http://schemas.microsoft.com/office/drawing/2014/main" id="{03F24C1B-E4C1-43E7-84B3-DD476F383667}"/>
                 </a:ext>
                 <a:ext uri="{C183D7F6-B498-43B3-948B-1728B52AA6E4}">
-                  <adec:decorative xmlns:adec="http://schemas.microsoft.com/office/drawing/2017/decorative" xmlns="" val="1"/>
+                  <adec:decorative xmlns:adec="http://schemas.microsoft.com/office/drawing/2017/decorative" val="1"/>
                 </a:ext>
               </a:extLst>
             </p:cNvPr>
@@ -20033,7 +19972,7 @@
             <p:nvPr>
               <p:extLst>
                 <p:ext uri="{386F3935-93C4-4BCD-93E2-E3B085C9AB24}">
-                  <p16:designElem xmlns:p16="http://schemas.microsoft.com/office/powerpoint/2015/main" xmlns="" val="1"/>
+                  <p16:designElem xmlns:p16="http://schemas.microsoft.com/office/powerpoint/2015/main" val="1"/>
                 </p:ext>
               </p:extLst>
             </p:nvPr>
@@ -20064,10 +20003,10 @@
             <p:cNvPr id="46" name="Picture 45">
               <a:extLst>
                 <a:ext uri="{FF2B5EF4-FFF2-40B4-BE49-F238E27FC236}">
-                  <a16:creationId xmlns:a16="http://schemas.microsoft.com/office/drawing/2014/main" xmlns="" id="{8725CE5D-088A-4522-9817-4B485D6E7F83}"/>
+                  <a16:creationId xmlns:a16="http://schemas.microsoft.com/office/drawing/2014/main" id="{8725CE5D-088A-4522-9817-4B485D6E7F83}"/>
                 </a:ext>
                 <a:ext uri="{C183D7F6-B498-43B3-948B-1728B52AA6E4}">
-                  <adec:decorative xmlns:adec="http://schemas.microsoft.com/office/drawing/2017/decorative" xmlns="" val="1"/>
+                  <adec:decorative xmlns:adec="http://schemas.microsoft.com/office/drawing/2017/decorative" val="1"/>
                 </a:ext>
               </a:extLst>
             </p:cNvPr>
@@ -20077,7 +20016,7 @@
             <p:nvPr>
               <p:extLst>
                 <p:ext uri="{386F3935-93C4-4BCD-93E2-E3B085C9AB24}">
-                  <p16:designElem xmlns:p16="http://schemas.microsoft.com/office/powerpoint/2015/main" xmlns="" val="1"/>
+                  <p16:designElem xmlns:p16="http://schemas.microsoft.com/office/powerpoint/2015/main" val="1"/>
                 </p:ext>
               </p:extLst>
             </p:nvPr>
@@ -20109,7 +20048,7 @@
           <p:cNvPr id="2" name="Title 1">
             <a:extLst>
               <a:ext uri="{FF2B5EF4-FFF2-40B4-BE49-F238E27FC236}">
-                <a16:creationId xmlns:a16="http://schemas.microsoft.com/office/drawing/2014/main" xmlns="" id="{DDE24DE7-ACFF-4227-A288-DC4B6D02398F}"/>
+                <a16:creationId xmlns:a16="http://schemas.microsoft.com/office/drawing/2014/main" id="{DDE24DE7-ACFF-4227-A288-DC4B6D02398F}"/>
               </a:ext>
             </a:extLst>
           </p:cNvPr>
@@ -20151,7 +20090,7 @@
           <p:cNvPr id="3" name="Content Placeholder 2">
             <a:extLst>
               <a:ext uri="{FF2B5EF4-FFF2-40B4-BE49-F238E27FC236}">
-                <a16:creationId xmlns:a16="http://schemas.microsoft.com/office/drawing/2014/main" xmlns="" id="{1BF44313-E19B-46ED-8A97-0C5DF06C8E80}"/>
+                <a16:creationId xmlns:a16="http://schemas.microsoft.com/office/drawing/2014/main" id="{1BF44313-E19B-46ED-8A97-0C5DF06C8E80}"/>
               </a:ext>
             </a:extLst>
           </p:cNvPr>
@@ -20196,7 +20135,7 @@
           <p:cNvPr id="7" name="Graphic 6" descr="Marker">
             <a:extLst>
               <a:ext uri="{FF2B5EF4-FFF2-40B4-BE49-F238E27FC236}">
-                <a16:creationId xmlns:a16="http://schemas.microsoft.com/office/drawing/2014/main" xmlns="" id="{B6EB6C55-2B82-431B-A05F-41F3DF765D9F}"/>
+                <a16:creationId xmlns:a16="http://schemas.microsoft.com/office/drawing/2014/main" id="{B6EB6C55-2B82-431B-A05F-41F3DF765D9F}"/>
               </a:ext>
             </a:extLst>
           </p:cNvPr>
@@ -20212,7 +20151,7 @@
                 <a14:useLocalDpi xmlns:a14="http://schemas.microsoft.com/office/drawing/2010/main" val="0"/>
               </a:ext>
               <a:ext uri="{96DAC541-7B7A-43D3-8B79-37D633B846F1}">
-                <asvg:svgBlip xmlns:asvg="http://schemas.microsoft.com/office/drawing/2016/SVG/main" xmlns="" r:embed="rId7"/>
+                <asvg:svgBlip xmlns:asvg="http://schemas.microsoft.com/office/drawing/2016/SVG/main" r:embed="rId7"/>
               </a:ext>
             </a:extLst>
           </a:blip>
@@ -20404,10 +20343,10 @@
           <p:cNvPr id="9" name="Rectangle 8">
             <a:extLst>
               <a:ext uri="{FF2B5EF4-FFF2-40B4-BE49-F238E27FC236}">
-                <a16:creationId xmlns:a16="http://schemas.microsoft.com/office/drawing/2014/main" xmlns="" id="{4E78424C-6FD0-41F8-9CAA-5DC19C42359F}"/>
+                <a16:creationId xmlns:a16="http://schemas.microsoft.com/office/drawing/2014/main" id="{4E78424C-6FD0-41F8-9CAA-5DC19C42359F}"/>
               </a:ext>
               <a:ext uri="{C183D7F6-B498-43B3-948B-1728B52AA6E4}">
-                <adec:decorative xmlns:adec="http://schemas.microsoft.com/office/drawing/2017/decorative" xmlns="" val="1"/>
+                <adec:decorative xmlns:adec="http://schemas.microsoft.com/office/drawing/2017/decorative" val="1"/>
               </a:ext>
             </a:extLst>
           </p:cNvPr>
@@ -20417,7 +20356,7 @@
           <p:nvPr>
             <p:extLst>
               <p:ext uri="{386F3935-93C4-4BCD-93E2-E3B085C9AB24}">
-                <p16:designElem xmlns:p16="http://schemas.microsoft.com/office/powerpoint/2015/main" xmlns="" val="1"/>
+                <p16:designElem xmlns:p16="http://schemas.microsoft.com/office/powerpoint/2015/main" val="1"/>
               </p:ext>
             </p:extLst>
           </p:nvPr>
@@ -20464,7 +20403,7 @@
           <p:cNvPr id="2" name="Title 1">
             <a:extLst>
               <a:ext uri="{FF2B5EF4-FFF2-40B4-BE49-F238E27FC236}">
-                <a16:creationId xmlns:a16="http://schemas.microsoft.com/office/drawing/2014/main" xmlns="" id="{1407B1FD-3B02-4946-84C7-67C9697E16F7}"/>
+                <a16:creationId xmlns:a16="http://schemas.microsoft.com/office/drawing/2014/main" id="{1407B1FD-3B02-4946-84C7-67C9697E16F7}"/>
               </a:ext>
             </a:extLst>
           </p:cNvPr>
@@ -20503,10 +20442,10 @@
           <p:cNvPr id="11" name="Freeform: Shape 10">
             <a:extLst>
               <a:ext uri="{FF2B5EF4-FFF2-40B4-BE49-F238E27FC236}">
-                <a16:creationId xmlns:a16="http://schemas.microsoft.com/office/drawing/2014/main" xmlns="" id="{DD136760-57DC-4301-8BEA-B71AD2D13905}"/>
+                <a16:creationId xmlns:a16="http://schemas.microsoft.com/office/drawing/2014/main" id="{DD136760-57DC-4301-8BEA-B71AD2D13905}"/>
               </a:ext>
               <a:ext uri="{C183D7F6-B498-43B3-948B-1728B52AA6E4}">
-                <adec:decorative xmlns:adec="http://schemas.microsoft.com/office/drawing/2017/decorative" xmlns="" val="1"/>
+                <adec:decorative xmlns:adec="http://schemas.microsoft.com/office/drawing/2017/decorative" val="1"/>
               </a:ext>
             </a:extLst>
           </p:cNvPr>
@@ -20516,7 +20455,7 @@
           <p:nvPr>
             <p:extLst>
               <p:ext uri="{386F3935-93C4-4BCD-93E2-E3B085C9AB24}">
-                <p16:designElem xmlns:p16="http://schemas.microsoft.com/office/powerpoint/2015/main" xmlns="" val="1"/>
+                <p16:designElem xmlns:p16="http://schemas.microsoft.com/office/powerpoint/2015/main" val="1"/>
               </p:ext>
             </p:extLst>
           </p:nvPr>
@@ -20995,10 +20934,10 @@
           <p:cNvPr id="13" name="Freeform 11">
             <a:extLst>
               <a:ext uri="{FF2B5EF4-FFF2-40B4-BE49-F238E27FC236}">
-                <a16:creationId xmlns:a16="http://schemas.microsoft.com/office/drawing/2014/main" xmlns="" id="{BDC58DEA-1307-4F44-AD47-E613D8B76A89}"/>
+                <a16:creationId xmlns:a16="http://schemas.microsoft.com/office/drawing/2014/main" id="{BDC58DEA-1307-4F44-AD47-E613D8B76A89}"/>
               </a:ext>
               <a:ext uri="{C183D7F6-B498-43B3-948B-1728B52AA6E4}">
-                <adec:decorative xmlns:adec="http://schemas.microsoft.com/office/drawing/2017/decorative" xmlns="" val="1"/>
+                <adec:decorative xmlns:adec="http://schemas.microsoft.com/office/drawing/2017/decorative" val="1"/>
               </a:ext>
             </a:extLst>
           </p:cNvPr>
@@ -21008,7 +20947,7 @@
           <p:nvPr>
             <p:extLst>
               <p:ext uri="{386F3935-93C4-4BCD-93E2-E3B085C9AB24}">
-                <p16:designElem xmlns:p16="http://schemas.microsoft.com/office/powerpoint/2015/main" xmlns="" val="1"/>
+                <p16:designElem xmlns:p16="http://schemas.microsoft.com/office/powerpoint/2015/main" val="1"/>
               </p:ext>
             </p:extLst>
           </p:nvPr>
@@ -21347,10 +21286,10 @@
           <p:cNvPr id="15" name="Rectangle 14">
             <a:extLst>
               <a:ext uri="{FF2B5EF4-FFF2-40B4-BE49-F238E27FC236}">
-                <a16:creationId xmlns:a16="http://schemas.microsoft.com/office/drawing/2014/main" xmlns="" id="{C99B912D-1E4B-42AF-A2BE-CFEFEC916EE7}"/>
+                <a16:creationId xmlns:a16="http://schemas.microsoft.com/office/drawing/2014/main" id="{C99B912D-1E4B-42AF-A2BE-CFEFEC916EE7}"/>
               </a:ext>
               <a:ext uri="{C183D7F6-B498-43B3-948B-1728B52AA6E4}">
-                <adec:decorative xmlns:adec="http://schemas.microsoft.com/office/drawing/2017/decorative" xmlns="" val="1"/>
+                <adec:decorative xmlns:adec="http://schemas.microsoft.com/office/drawing/2017/decorative" val="1"/>
               </a:ext>
             </a:extLst>
           </p:cNvPr>
@@ -21360,7 +21299,7 @@
           <p:nvPr>
             <p:extLst>
               <p:ext uri="{386F3935-93C4-4BCD-93E2-E3B085C9AB24}">
-                <p16:designElem xmlns:p16="http://schemas.microsoft.com/office/powerpoint/2015/main" xmlns="" val="1"/>
+                <p16:designElem xmlns:p16="http://schemas.microsoft.com/office/powerpoint/2015/main" val="1"/>
               </p:ext>
             </p:extLst>
           </p:nvPr>
@@ -21400,7 +21339,7 @@
           <p:cNvPr id="5" name="Content Placeholder 2">
             <a:extLst>
               <a:ext uri="{FF2B5EF4-FFF2-40B4-BE49-F238E27FC236}">
-                <a16:creationId xmlns:a16="http://schemas.microsoft.com/office/drawing/2014/main" xmlns="" id="{87CF6268-1C54-4040-BD87-73BE4604789A}"/>
+                <a16:creationId xmlns:a16="http://schemas.microsoft.com/office/drawing/2014/main" id="{87CF6268-1C54-4040-BD87-73BE4604789A}"/>
               </a:ext>
             </a:extLst>
           </p:cNvPr>
@@ -21485,10 +21424,10 @@
           <p:cNvPr id="8" name="Picture 7">
             <a:extLst>
               <a:ext uri="{FF2B5EF4-FFF2-40B4-BE49-F238E27FC236}">
-                <a16:creationId xmlns:a16="http://schemas.microsoft.com/office/drawing/2014/main" xmlns="" id="{91B28F63-CF00-448F-B141-FE33C33B1891}"/>
+                <a16:creationId xmlns:a16="http://schemas.microsoft.com/office/drawing/2014/main" id="{91B28F63-CF00-448F-B141-FE33C33B1891}"/>
               </a:ext>
               <a:ext uri="{C183D7F6-B498-43B3-948B-1728B52AA6E4}">
-                <adec:decorative xmlns:adec="http://schemas.microsoft.com/office/drawing/2017/decorative" xmlns="" val="1"/>
+                <adec:decorative xmlns:adec="http://schemas.microsoft.com/office/drawing/2017/decorative" val="1"/>
               </a:ext>
             </a:extLst>
           </p:cNvPr>
@@ -21498,7 +21437,7 @@
           <p:nvPr>
             <p:extLst>
               <p:ext uri="{386F3935-93C4-4BCD-93E2-E3B085C9AB24}">
-                <p16:designElem xmlns:p16="http://schemas.microsoft.com/office/powerpoint/2015/main" xmlns="" val="1"/>
+                <p16:designElem xmlns:p16="http://schemas.microsoft.com/office/powerpoint/2015/main" val="1"/>
               </p:ext>
             </p:extLst>
           </p:nvPr>
@@ -21529,10 +21468,10 @@
           <p:cNvPr id="10" name="Picture 9">
             <a:extLst>
               <a:ext uri="{FF2B5EF4-FFF2-40B4-BE49-F238E27FC236}">
-                <a16:creationId xmlns:a16="http://schemas.microsoft.com/office/drawing/2014/main" xmlns="" id="{2AE609E2-8522-44E4-9077-980E5BCF3E14}"/>
+                <a16:creationId xmlns:a16="http://schemas.microsoft.com/office/drawing/2014/main" id="{2AE609E2-8522-44E4-9077-980E5BCF3E14}"/>
               </a:ext>
               <a:ext uri="{C183D7F6-B498-43B3-948B-1728B52AA6E4}">
-                <adec:decorative xmlns:adec="http://schemas.microsoft.com/office/drawing/2017/decorative" xmlns="" val="1"/>
+                <adec:decorative xmlns:adec="http://schemas.microsoft.com/office/drawing/2017/decorative" val="1"/>
               </a:ext>
             </a:extLst>
           </p:cNvPr>
@@ -21542,7 +21481,7 @@
           <p:nvPr>
             <p:extLst>
               <p:ext uri="{386F3935-93C4-4BCD-93E2-E3B085C9AB24}">
-                <p16:designElem xmlns:p16="http://schemas.microsoft.com/office/powerpoint/2015/main" xmlns="" val="1"/>
+                <p16:designElem xmlns:p16="http://schemas.microsoft.com/office/powerpoint/2015/main" val="1"/>
               </p:ext>
             </p:extLst>
           </p:nvPr>
@@ -21573,10 +21512,10 @@
           <p:cNvPr id="12" name="Oval 11">
             <a:extLst>
               <a:ext uri="{FF2B5EF4-FFF2-40B4-BE49-F238E27FC236}">
-                <a16:creationId xmlns:a16="http://schemas.microsoft.com/office/drawing/2014/main" xmlns="" id="{4FA533C5-33E3-4611-AF9F-72811D8B26A6}"/>
+                <a16:creationId xmlns:a16="http://schemas.microsoft.com/office/drawing/2014/main" id="{4FA533C5-33E3-4611-AF9F-72811D8B26A6}"/>
               </a:ext>
               <a:ext uri="{C183D7F6-B498-43B3-948B-1728B52AA6E4}">
-                <adec:decorative xmlns:adec="http://schemas.microsoft.com/office/drawing/2017/decorative" xmlns="" val="1"/>
+                <adec:decorative xmlns:adec="http://schemas.microsoft.com/office/drawing/2017/decorative" val="1"/>
               </a:ext>
             </a:extLst>
           </p:cNvPr>
@@ -21586,7 +21525,7 @@
           <p:nvPr>
             <p:extLst>
               <p:ext uri="{386F3935-93C4-4BCD-93E2-E3B085C9AB24}">
-                <p16:designElem xmlns:p16="http://schemas.microsoft.com/office/powerpoint/2015/main" xmlns="" val="1"/>
+                <p16:designElem xmlns:p16="http://schemas.microsoft.com/office/powerpoint/2015/main" val="1"/>
               </p:ext>
             </p:extLst>
           </p:nvPr>
@@ -21653,10 +21592,10 @@
           <p:cNvPr id="14" name="Picture 13">
             <a:extLst>
               <a:ext uri="{FF2B5EF4-FFF2-40B4-BE49-F238E27FC236}">
-                <a16:creationId xmlns:a16="http://schemas.microsoft.com/office/drawing/2014/main" xmlns="" id="{8949AD42-25FD-4C3D-9EEE-B7FEC5809988}"/>
+                <a16:creationId xmlns:a16="http://schemas.microsoft.com/office/drawing/2014/main" id="{8949AD42-25FD-4C3D-9EEE-B7FEC5809988}"/>
               </a:ext>
               <a:ext uri="{C183D7F6-B498-43B3-948B-1728B52AA6E4}">
-                <adec:decorative xmlns:adec="http://schemas.microsoft.com/office/drawing/2017/decorative" xmlns="" val="1"/>
+                <adec:decorative xmlns:adec="http://schemas.microsoft.com/office/drawing/2017/decorative" val="1"/>
               </a:ext>
             </a:extLst>
           </p:cNvPr>
@@ -21666,7 +21605,7 @@
           <p:nvPr>
             <p:extLst>
               <p:ext uri="{386F3935-93C4-4BCD-93E2-E3B085C9AB24}">
-                <p16:designElem xmlns:p16="http://schemas.microsoft.com/office/powerpoint/2015/main" xmlns="" val="1"/>
+                <p16:designElem xmlns:p16="http://schemas.microsoft.com/office/powerpoint/2015/main" val="1"/>
               </p:ext>
             </p:extLst>
           </p:nvPr>
@@ -21697,10 +21636,10 @@
           <p:cNvPr id="16" name="Picture 15">
             <a:extLst>
               <a:ext uri="{FF2B5EF4-FFF2-40B4-BE49-F238E27FC236}">
-                <a16:creationId xmlns:a16="http://schemas.microsoft.com/office/drawing/2014/main" xmlns="" id="{6AC7D913-60B7-4603-881B-831DA5D3A940}"/>
+                <a16:creationId xmlns:a16="http://schemas.microsoft.com/office/drawing/2014/main" id="{6AC7D913-60B7-4603-881B-831DA5D3A940}"/>
               </a:ext>
               <a:ext uri="{C183D7F6-B498-43B3-948B-1728B52AA6E4}">
-                <adec:decorative xmlns:adec="http://schemas.microsoft.com/office/drawing/2017/decorative" xmlns="" val="1"/>
+                <adec:decorative xmlns:adec="http://schemas.microsoft.com/office/drawing/2017/decorative" val="1"/>
               </a:ext>
             </a:extLst>
           </p:cNvPr>
@@ -21710,7 +21649,7 @@
           <p:nvPr>
             <p:extLst>
               <p:ext uri="{386F3935-93C4-4BCD-93E2-E3B085C9AB24}">
-                <p16:designElem xmlns:p16="http://schemas.microsoft.com/office/powerpoint/2015/main" xmlns="" val="1"/>
+                <p16:designElem xmlns:p16="http://schemas.microsoft.com/office/powerpoint/2015/main" val="1"/>
               </p:ext>
             </p:extLst>
           </p:nvPr>
@@ -21741,10 +21680,10 @@
           <p:cNvPr id="18" name="Rectangle 17">
             <a:extLst>
               <a:ext uri="{FF2B5EF4-FFF2-40B4-BE49-F238E27FC236}">
-                <a16:creationId xmlns:a16="http://schemas.microsoft.com/office/drawing/2014/main" xmlns="" id="{87F0FDC4-AD8C-47D9-9131-623C98ADB0AE}"/>
+                <a16:creationId xmlns:a16="http://schemas.microsoft.com/office/drawing/2014/main" id="{87F0FDC4-AD8C-47D9-9131-623C98ADB0AE}"/>
               </a:ext>
               <a:ext uri="{C183D7F6-B498-43B3-948B-1728B52AA6E4}">
-                <adec:decorative xmlns:adec="http://schemas.microsoft.com/office/drawing/2017/decorative" xmlns="" val="1"/>
+                <adec:decorative xmlns:adec="http://schemas.microsoft.com/office/drawing/2017/decorative" val="1"/>
               </a:ext>
             </a:extLst>
           </p:cNvPr>
@@ -21754,7 +21693,7 @@
           <p:nvPr>
             <p:extLst>
               <p:ext uri="{386F3935-93C4-4BCD-93E2-E3B085C9AB24}">
-                <p16:designElem xmlns:p16="http://schemas.microsoft.com/office/powerpoint/2015/main" xmlns="" val="1"/>
+                <p16:designElem xmlns:p16="http://schemas.microsoft.com/office/powerpoint/2015/main" val="1"/>
               </p:ext>
             </p:extLst>
           </p:nvPr>
@@ -21794,10 +21733,10 @@
           <p:cNvPr id="20" name="Rectangle 19">
             <a:extLst>
               <a:ext uri="{FF2B5EF4-FFF2-40B4-BE49-F238E27FC236}">
-                <a16:creationId xmlns:a16="http://schemas.microsoft.com/office/drawing/2014/main" xmlns="" id="{E6A222EB-A81E-4238-B08D-AAB1828C8E0B}"/>
+                <a16:creationId xmlns:a16="http://schemas.microsoft.com/office/drawing/2014/main" id="{E6A222EB-A81E-4238-B08D-AAB1828C8E0B}"/>
               </a:ext>
               <a:ext uri="{C183D7F6-B498-43B3-948B-1728B52AA6E4}">
-                <adec:decorative xmlns:adec="http://schemas.microsoft.com/office/drawing/2017/decorative" xmlns="" val="1"/>
+                <adec:decorative xmlns:adec="http://schemas.microsoft.com/office/drawing/2017/decorative" val="1"/>
               </a:ext>
             </a:extLst>
           </p:cNvPr>
@@ -21807,7 +21746,7 @@
           <p:nvPr>
             <p:extLst>
               <p:ext uri="{386F3935-93C4-4BCD-93E2-E3B085C9AB24}">
-                <p16:designElem xmlns:p16="http://schemas.microsoft.com/office/powerpoint/2015/main" xmlns="" val="1"/>
+                <p16:designElem xmlns:p16="http://schemas.microsoft.com/office/powerpoint/2015/main" val="1"/>
               </p:ext>
             </p:extLst>
           </p:nvPr>
@@ -21854,10 +21793,10 @@
           <p:cNvPr id="22" name="Rectangle 21">
             <a:extLst>
               <a:ext uri="{FF2B5EF4-FFF2-40B4-BE49-F238E27FC236}">
-                <a16:creationId xmlns:a16="http://schemas.microsoft.com/office/drawing/2014/main" xmlns="" id="{E014676C-074B-475A-8346-9C901C86CB97}"/>
+                <a16:creationId xmlns:a16="http://schemas.microsoft.com/office/drawing/2014/main" id="{E014676C-074B-475A-8346-9C901C86CB97}"/>
               </a:ext>
               <a:ext uri="{C183D7F6-B498-43B3-948B-1728B52AA6E4}">
-                <adec:decorative xmlns:adec="http://schemas.microsoft.com/office/drawing/2017/decorative" xmlns="" val="1"/>
+                <adec:decorative xmlns:adec="http://schemas.microsoft.com/office/drawing/2017/decorative" val="1"/>
               </a:ext>
             </a:extLst>
           </p:cNvPr>
@@ -21867,7 +21806,7 @@
           <p:nvPr>
             <p:extLst>
               <p:ext uri="{386F3935-93C4-4BCD-93E2-E3B085C9AB24}">
-                <p16:designElem xmlns:p16="http://schemas.microsoft.com/office/powerpoint/2015/main" xmlns="" val="1"/>
+                <p16:designElem xmlns:p16="http://schemas.microsoft.com/office/powerpoint/2015/main" val="1"/>
               </p:ext>
             </p:extLst>
           </p:nvPr>
@@ -21907,10 +21846,10 @@
           <p:cNvPr id="24" name="Straight Connector 23">
             <a:extLst>
               <a:ext uri="{FF2B5EF4-FFF2-40B4-BE49-F238E27FC236}">
-                <a16:creationId xmlns:a16="http://schemas.microsoft.com/office/drawing/2014/main" xmlns="" id="{179C4C8E-197B-4679-AE96-B5147F971C90}"/>
+                <a16:creationId xmlns:a16="http://schemas.microsoft.com/office/drawing/2014/main" id="{179C4C8E-197B-4679-AE96-B5147F971C90}"/>
               </a:ext>
               <a:ext uri="{C183D7F6-B498-43B3-948B-1728B52AA6E4}">
-                <adec:decorative xmlns:adec="http://schemas.microsoft.com/office/drawing/2017/decorative" xmlns="" val="1"/>
+                <adec:decorative xmlns:adec="http://schemas.microsoft.com/office/drawing/2017/decorative" val="1"/>
               </a:ext>
             </a:extLst>
           </p:cNvPr>
@@ -21920,7 +21859,7 @@
           <p:nvPr>
             <p:extLst>
               <p:ext uri="{386F3935-93C4-4BCD-93E2-E3B085C9AB24}">
-                <p16:designElem xmlns:p16="http://schemas.microsoft.com/office/powerpoint/2015/main" xmlns="" val="1"/>
+                <p16:designElem xmlns:p16="http://schemas.microsoft.com/office/powerpoint/2015/main" val="1"/>
               </p:ext>
             </p:extLst>
           </p:nvPr>
@@ -21962,7 +21901,7 @@
           <p:cNvPr id="2" name="Title 1">
             <a:extLst>
               <a:ext uri="{FF2B5EF4-FFF2-40B4-BE49-F238E27FC236}">
-                <a16:creationId xmlns:a16="http://schemas.microsoft.com/office/drawing/2014/main" xmlns="" id="{1F3E3984-C1B8-4094-8C35-AD30981A79DB}"/>
+                <a16:creationId xmlns:a16="http://schemas.microsoft.com/office/drawing/2014/main" id="{1F3E3984-C1B8-4094-8C35-AD30981A79DB}"/>
               </a:ext>
             </a:extLst>
           </p:cNvPr>
@@ -22034,7 +21973,7 @@
           <p:cNvPr id="2" name="Title 1">
             <a:extLst>
               <a:ext uri="{FF2B5EF4-FFF2-40B4-BE49-F238E27FC236}">
-                <a16:creationId xmlns:a16="http://schemas.microsoft.com/office/drawing/2014/main" xmlns="" id="{1F3E3984-C1B8-4094-8C35-AD30981A79DB}"/>
+                <a16:creationId xmlns:a16="http://schemas.microsoft.com/office/drawing/2014/main" id="{1F3E3984-C1B8-4094-8C35-AD30981A79DB}"/>
               </a:ext>
             </a:extLst>
           </p:cNvPr>
@@ -22059,7 +21998,7 @@
           <p:cNvPr id="5" name="Content Placeholder 4" descr="Chart, line chart&#10;&#10;Description automatically generated">
             <a:extLst>
               <a:ext uri="{FF2B5EF4-FFF2-40B4-BE49-F238E27FC236}">
-                <a16:creationId xmlns:a16="http://schemas.microsoft.com/office/drawing/2014/main" xmlns="" id="{0450D618-7C56-4ADA-8656-4C4C6FF7B187}"/>
+                <a16:creationId xmlns:a16="http://schemas.microsoft.com/office/drawing/2014/main" id="{0450D618-7C56-4ADA-8656-4C4C6FF7B187}"/>
               </a:ext>
             </a:extLst>
           </p:cNvPr>
@@ -22124,7 +22063,7 @@
           <p:cNvPr id="2" name="Title 1">
             <a:extLst>
               <a:ext uri="{FF2B5EF4-FFF2-40B4-BE49-F238E27FC236}">
-                <a16:creationId xmlns:a16="http://schemas.microsoft.com/office/drawing/2014/main" xmlns="" id="{1F3E3984-C1B8-4094-8C35-AD30981A79DB}"/>
+                <a16:creationId xmlns:a16="http://schemas.microsoft.com/office/drawing/2014/main" id="{1F3E3984-C1B8-4094-8C35-AD30981A79DB}"/>
               </a:ext>
             </a:extLst>
           </p:cNvPr>
@@ -22149,7 +22088,7 @@
           <p:cNvPr id="5" name="Content Placeholder 4" descr="Chart, line chart, histogram&#10;&#10;Description automatically generated">
             <a:extLst>
               <a:ext uri="{FF2B5EF4-FFF2-40B4-BE49-F238E27FC236}">
-                <a16:creationId xmlns:a16="http://schemas.microsoft.com/office/drawing/2014/main" xmlns="" id="{C4DF1C25-CE9D-4A60-936A-AD41F0D1197B}"/>
+                <a16:creationId xmlns:a16="http://schemas.microsoft.com/office/drawing/2014/main" id="{C4DF1C25-CE9D-4A60-936A-AD41F0D1197B}"/>
               </a:ext>
             </a:extLst>
           </p:cNvPr>
@@ -22238,10 +22177,10 @@
           <p:cNvPr id="31" name="Picture 30">
             <a:extLst>
               <a:ext uri="{FF2B5EF4-FFF2-40B4-BE49-F238E27FC236}">
-                <a16:creationId xmlns:a16="http://schemas.microsoft.com/office/drawing/2014/main" xmlns="" id="{91B28F63-CF00-448F-B141-FE33C33B1891}"/>
+                <a16:creationId xmlns:a16="http://schemas.microsoft.com/office/drawing/2014/main" id="{91B28F63-CF00-448F-B141-FE33C33B1891}"/>
               </a:ext>
               <a:ext uri="{C183D7F6-B498-43B3-948B-1728B52AA6E4}">
-                <adec:decorative xmlns:adec="http://schemas.microsoft.com/office/drawing/2017/decorative" xmlns="" val="1"/>
+                <adec:decorative xmlns:adec="http://schemas.microsoft.com/office/drawing/2017/decorative" val="1"/>
               </a:ext>
             </a:extLst>
           </p:cNvPr>
@@ -22251,7 +22190,7 @@
           <p:nvPr>
             <p:extLst>
               <p:ext uri="{386F3935-93C4-4BCD-93E2-E3B085C9AB24}">
-                <p16:designElem xmlns:p16="http://schemas.microsoft.com/office/powerpoint/2015/main" xmlns="" val="1"/>
+                <p16:designElem xmlns:p16="http://schemas.microsoft.com/office/powerpoint/2015/main" val="1"/>
               </p:ext>
             </p:extLst>
           </p:nvPr>
@@ -22282,10 +22221,10 @@
           <p:cNvPr id="33" name="Picture 32">
             <a:extLst>
               <a:ext uri="{FF2B5EF4-FFF2-40B4-BE49-F238E27FC236}">
-                <a16:creationId xmlns:a16="http://schemas.microsoft.com/office/drawing/2014/main" xmlns="" id="{2AE609E2-8522-44E4-9077-980E5BCF3E14}"/>
+                <a16:creationId xmlns:a16="http://schemas.microsoft.com/office/drawing/2014/main" id="{2AE609E2-8522-44E4-9077-980E5BCF3E14}"/>
               </a:ext>
               <a:ext uri="{C183D7F6-B498-43B3-948B-1728B52AA6E4}">
-                <adec:decorative xmlns:adec="http://schemas.microsoft.com/office/drawing/2017/decorative" xmlns="" val="1"/>
+                <adec:decorative xmlns:adec="http://schemas.microsoft.com/office/drawing/2017/decorative" val="1"/>
               </a:ext>
             </a:extLst>
           </p:cNvPr>
@@ -22295,7 +22234,7 @@
           <p:nvPr>
             <p:extLst>
               <p:ext uri="{386F3935-93C4-4BCD-93E2-E3B085C9AB24}">
-                <p16:designElem xmlns:p16="http://schemas.microsoft.com/office/powerpoint/2015/main" xmlns="" val="1"/>
+                <p16:designElem xmlns:p16="http://schemas.microsoft.com/office/powerpoint/2015/main" val="1"/>
               </p:ext>
             </p:extLst>
           </p:nvPr>
@@ -22326,10 +22265,10 @@
           <p:cNvPr id="35" name="Oval 34">
             <a:extLst>
               <a:ext uri="{FF2B5EF4-FFF2-40B4-BE49-F238E27FC236}">
-                <a16:creationId xmlns:a16="http://schemas.microsoft.com/office/drawing/2014/main" xmlns="" id="{4FA533C5-33E3-4611-AF9F-72811D8B26A6}"/>
+                <a16:creationId xmlns:a16="http://schemas.microsoft.com/office/drawing/2014/main" id="{4FA533C5-33E3-4611-AF9F-72811D8B26A6}"/>
               </a:ext>
               <a:ext uri="{C183D7F6-B498-43B3-948B-1728B52AA6E4}">
-                <adec:decorative xmlns:adec="http://schemas.microsoft.com/office/drawing/2017/decorative" xmlns="" val="1"/>
+                <adec:decorative xmlns:adec="http://schemas.microsoft.com/office/drawing/2017/decorative" val="1"/>
               </a:ext>
             </a:extLst>
           </p:cNvPr>
@@ -22339,7 +22278,7 @@
           <p:nvPr>
             <p:extLst>
               <p:ext uri="{386F3935-93C4-4BCD-93E2-E3B085C9AB24}">
-                <p16:designElem xmlns:p16="http://schemas.microsoft.com/office/powerpoint/2015/main" xmlns="" val="1"/>
+                <p16:designElem xmlns:p16="http://schemas.microsoft.com/office/powerpoint/2015/main" val="1"/>
               </p:ext>
             </p:extLst>
           </p:nvPr>
@@ -22406,10 +22345,10 @@
           <p:cNvPr id="37" name="Picture 36">
             <a:extLst>
               <a:ext uri="{FF2B5EF4-FFF2-40B4-BE49-F238E27FC236}">
-                <a16:creationId xmlns:a16="http://schemas.microsoft.com/office/drawing/2014/main" xmlns="" id="{8949AD42-25FD-4C3D-9EEE-B7FEC5809988}"/>
+                <a16:creationId xmlns:a16="http://schemas.microsoft.com/office/drawing/2014/main" id="{8949AD42-25FD-4C3D-9EEE-B7FEC5809988}"/>
               </a:ext>
               <a:ext uri="{C183D7F6-B498-43B3-948B-1728B52AA6E4}">
-                <adec:decorative xmlns:adec="http://schemas.microsoft.com/office/drawing/2017/decorative" xmlns="" val="1"/>
+                <adec:decorative xmlns:adec="http://schemas.microsoft.com/office/drawing/2017/decorative" val="1"/>
               </a:ext>
             </a:extLst>
           </p:cNvPr>
@@ -22419,7 +22358,7 @@
           <p:nvPr>
             <p:extLst>
               <p:ext uri="{386F3935-93C4-4BCD-93E2-E3B085C9AB24}">
-                <p16:designElem xmlns:p16="http://schemas.microsoft.com/office/powerpoint/2015/main" xmlns="" val="1"/>
+                <p16:designElem xmlns:p16="http://schemas.microsoft.com/office/powerpoint/2015/main" val="1"/>
               </p:ext>
             </p:extLst>
           </p:nvPr>
@@ -22450,10 +22389,10 @@
           <p:cNvPr id="39" name="Picture 38">
             <a:extLst>
               <a:ext uri="{FF2B5EF4-FFF2-40B4-BE49-F238E27FC236}">
-                <a16:creationId xmlns:a16="http://schemas.microsoft.com/office/drawing/2014/main" xmlns="" id="{6AC7D913-60B7-4603-881B-831DA5D3A940}"/>
+                <a16:creationId xmlns:a16="http://schemas.microsoft.com/office/drawing/2014/main" id="{6AC7D913-60B7-4603-881B-831DA5D3A940}"/>
               </a:ext>
               <a:ext uri="{C183D7F6-B498-43B3-948B-1728B52AA6E4}">
-                <adec:decorative xmlns:adec="http://schemas.microsoft.com/office/drawing/2017/decorative" xmlns="" val="1"/>
+                <adec:decorative xmlns:adec="http://schemas.microsoft.com/office/drawing/2017/decorative" val="1"/>
               </a:ext>
             </a:extLst>
           </p:cNvPr>
@@ -22463,7 +22402,7 @@
           <p:nvPr>
             <p:extLst>
               <p:ext uri="{386F3935-93C4-4BCD-93E2-E3B085C9AB24}">
-                <p16:designElem xmlns:p16="http://schemas.microsoft.com/office/powerpoint/2015/main" xmlns="" val="1"/>
+                <p16:designElem xmlns:p16="http://schemas.microsoft.com/office/powerpoint/2015/main" val="1"/>
               </p:ext>
             </p:extLst>
           </p:nvPr>
@@ -22494,10 +22433,10 @@
           <p:cNvPr id="41" name="Rectangle 40">
             <a:extLst>
               <a:ext uri="{FF2B5EF4-FFF2-40B4-BE49-F238E27FC236}">
-                <a16:creationId xmlns:a16="http://schemas.microsoft.com/office/drawing/2014/main" xmlns="" id="{87F0FDC4-AD8C-47D9-9131-623C98ADB0AE}"/>
+                <a16:creationId xmlns:a16="http://schemas.microsoft.com/office/drawing/2014/main" id="{87F0FDC4-AD8C-47D9-9131-623C98ADB0AE}"/>
               </a:ext>
               <a:ext uri="{C183D7F6-B498-43B3-948B-1728B52AA6E4}">
-                <adec:decorative xmlns:adec="http://schemas.microsoft.com/office/drawing/2017/decorative" xmlns="" val="1"/>
+                <adec:decorative xmlns:adec="http://schemas.microsoft.com/office/drawing/2017/decorative" val="1"/>
               </a:ext>
             </a:extLst>
           </p:cNvPr>
@@ -22507,7 +22446,7 @@
           <p:nvPr>
             <p:extLst>
               <p:ext uri="{386F3935-93C4-4BCD-93E2-E3B085C9AB24}">
-                <p16:designElem xmlns:p16="http://schemas.microsoft.com/office/powerpoint/2015/main" xmlns="" val="1"/>
+                <p16:designElem xmlns:p16="http://schemas.microsoft.com/office/powerpoint/2015/main" val="1"/>
               </p:ext>
             </p:extLst>
           </p:nvPr>
@@ -22547,10 +22486,10 @@
           <p:cNvPr id="43" name="Rectangle 42">
             <a:extLst>
               <a:ext uri="{FF2B5EF4-FFF2-40B4-BE49-F238E27FC236}">
-                <a16:creationId xmlns:a16="http://schemas.microsoft.com/office/drawing/2014/main" xmlns="" id="{E6A222EB-A81E-4238-B08D-AAB1828C8E0B}"/>
+                <a16:creationId xmlns:a16="http://schemas.microsoft.com/office/drawing/2014/main" id="{E6A222EB-A81E-4238-B08D-AAB1828C8E0B}"/>
               </a:ext>
               <a:ext uri="{C183D7F6-B498-43B3-948B-1728B52AA6E4}">
-                <adec:decorative xmlns:adec="http://schemas.microsoft.com/office/drawing/2017/decorative" xmlns="" val="1"/>
+                <adec:decorative xmlns:adec="http://schemas.microsoft.com/office/drawing/2017/decorative" val="1"/>
               </a:ext>
             </a:extLst>
           </p:cNvPr>
@@ -22560,7 +22499,7 @@
           <p:nvPr>
             <p:extLst>
               <p:ext uri="{386F3935-93C4-4BCD-93E2-E3B085C9AB24}">
-                <p16:designElem xmlns:p16="http://schemas.microsoft.com/office/powerpoint/2015/main" xmlns="" val="1"/>
+                <p16:designElem xmlns:p16="http://schemas.microsoft.com/office/powerpoint/2015/main" val="1"/>
               </p:ext>
             </p:extLst>
           </p:nvPr>
@@ -22607,10 +22546,10 @@
           <p:cNvPr id="45" name="Rectangle 44">
             <a:extLst>
               <a:ext uri="{FF2B5EF4-FFF2-40B4-BE49-F238E27FC236}">
-                <a16:creationId xmlns:a16="http://schemas.microsoft.com/office/drawing/2014/main" xmlns="" id="{E014676C-074B-475A-8346-9C901C86CB97}"/>
+                <a16:creationId xmlns:a16="http://schemas.microsoft.com/office/drawing/2014/main" id="{E014676C-074B-475A-8346-9C901C86CB97}"/>
               </a:ext>
               <a:ext uri="{C183D7F6-B498-43B3-948B-1728B52AA6E4}">
-                <adec:decorative xmlns:adec="http://schemas.microsoft.com/office/drawing/2017/decorative" xmlns="" val="1"/>
+                <adec:decorative xmlns:adec="http://schemas.microsoft.com/office/drawing/2017/decorative" val="1"/>
               </a:ext>
             </a:extLst>
           </p:cNvPr>
@@ -22620,7 +22559,7 @@
           <p:nvPr>
             <p:extLst>
               <p:ext uri="{386F3935-93C4-4BCD-93E2-E3B085C9AB24}">
-                <p16:designElem xmlns:p16="http://schemas.microsoft.com/office/powerpoint/2015/main" xmlns="" val="1"/>
+                <p16:designElem xmlns:p16="http://schemas.microsoft.com/office/powerpoint/2015/main" val="1"/>
               </p:ext>
             </p:extLst>
           </p:nvPr>
@@ -22660,10 +22599,10 @@
           <p:cNvPr id="47" name="Straight Connector 46">
             <a:extLst>
               <a:ext uri="{FF2B5EF4-FFF2-40B4-BE49-F238E27FC236}">
-                <a16:creationId xmlns:a16="http://schemas.microsoft.com/office/drawing/2014/main" xmlns="" id="{179C4C8E-197B-4679-AE96-B5147F971C90}"/>
+                <a16:creationId xmlns:a16="http://schemas.microsoft.com/office/drawing/2014/main" id="{179C4C8E-197B-4679-AE96-B5147F971C90}"/>
               </a:ext>
               <a:ext uri="{C183D7F6-B498-43B3-948B-1728B52AA6E4}">
-                <adec:decorative xmlns:adec="http://schemas.microsoft.com/office/drawing/2017/decorative" xmlns="" val="1"/>
+                <adec:decorative xmlns:adec="http://schemas.microsoft.com/office/drawing/2017/decorative" val="1"/>
               </a:ext>
             </a:extLst>
           </p:cNvPr>
@@ -22673,7 +22612,7 @@
           <p:nvPr>
             <p:extLst>
               <p:ext uri="{386F3935-93C4-4BCD-93E2-E3B085C9AB24}">
-                <p16:designElem xmlns:p16="http://schemas.microsoft.com/office/powerpoint/2015/main" xmlns="" val="1"/>
+                <p16:designElem xmlns:p16="http://schemas.microsoft.com/office/powerpoint/2015/main" val="1"/>
               </p:ext>
             </p:extLst>
           </p:nvPr>
@@ -22715,7 +22654,7 @@
           <p:cNvPr id="2" name="Title 1">
             <a:extLst>
               <a:ext uri="{FF2B5EF4-FFF2-40B4-BE49-F238E27FC236}">
-                <a16:creationId xmlns:a16="http://schemas.microsoft.com/office/drawing/2014/main" xmlns="" id="{950A93D4-9BA4-4FD6-919F-F1EAB2636F2F}"/>
+                <a16:creationId xmlns:a16="http://schemas.microsoft.com/office/drawing/2014/main" id="{950A93D4-9BA4-4FD6-919F-F1EAB2636F2F}"/>
               </a:ext>
             </a:extLst>
           </p:cNvPr>
@@ -23117,7 +23056,7 @@
   <a:extraClrSchemeLst/>
   <a:extLst>
     <a:ext uri="{05A4C25C-085E-4340-85A3-A5531E510DB2}">
-      <thm15:themeFamily xmlns:thm15="http://schemas.microsoft.com/office/thememl/2012/main" xmlns="" name="Ion" id="{B8441ADB-2E43-4AF7-B97A-BD870242C6A8}" vid="{292E63A9-BB86-4E3D-B92A-7223C6510D2E}"/>
+      <thm15:themeFamily xmlns:thm15="http://schemas.microsoft.com/office/thememl/2012/main" name="Ion" id="{B8441ADB-2E43-4AF7-B97A-BD870242C6A8}" vid="{292E63A9-BB86-4E3D-B92A-7223C6510D2E}"/>
     </a:ext>
   </a:extLst>
 </a:theme>

</xml_diff>